<commit_message>
futures example & more introduction
</commit_message>
<xml_diff>
--- a/Functional Design Patterns for OO Practitioners.pptx
+++ b/Functional Design Patterns for OO Practitioners.pptx
@@ -14,12 +14,12 @@
     <p:sldId id="256" r:id="rId2"/>
     <p:sldId id="265" r:id="rId3"/>
     <p:sldId id="268" r:id="rId4"/>
-    <p:sldId id="269" r:id="rId5"/>
-    <p:sldId id="270" r:id="rId6"/>
-    <p:sldId id="271" r:id="rId7"/>
-    <p:sldId id="272" r:id="rId8"/>
-    <p:sldId id="273" r:id="rId9"/>
-    <p:sldId id="281" r:id="rId10"/>
+    <p:sldId id="281" r:id="rId5"/>
+    <p:sldId id="269" r:id="rId6"/>
+    <p:sldId id="270" r:id="rId7"/>
+    <p:sldId id="271" r:id="rId8"/>
+    <p:sldId id="272" r:id="rId9"/>
+    <p:sldId id="273" r:id="rId10"/>
     <p:sldId id="274" r:id="rId11"/>
     <p:sldId id="266" r:id="rId12"/>
     <p:sldId id="257" r:id="rId13"/>
@@ -291,7 +291,7 @@
               <a:rPr lang="de-DE" smtClean="0">
                 <a:latin typeface="AA Zuehlke" pitchFamily="2" charset="0"/>
               </a:rPr>
-              <a:t>15.09.2015</a:t>
+              <a:t>18.09.2015</a:t>
             </a:fld>
             <a:endParaRPr lang="de-DE">
               <a:latin typeface="AA Zuehlke" pitchFamily="2" charset="0"/>
@@ -469,7 +469,7 @@
             <a:fld id="{A6966AE6-B72D-4967-9CA3-8469D2863705}" type="datetimeFigureOut">
               <a:rPr lang="en-US" smtClean="0"/>
               <a:pPr/>
-              <a:t>9/15/2015</a:t>
+              <a:t>9/18/2015</a:t>
             </a:fld>
             <a:endParaRPr lang="en-US" dirty="0"/>
           </a:p>
@@ -5433,7 +5433,23 @@
             </a:r>
             <a:r>
               <a:rPr lang="de-CH" dirty="0" smtClean="0"/>
-              <a:t> «Gang </a:t>
+              <a:t> </a:t>
+            </a:r>
+            <a:r>
+              <a:rPr lang="de-CH" dirty="0" err="1" smtClean="0"/>
+              <a:t>authoritative</a:t>
+            </a:r>
+            <a:r>
+              <a:rPr lang="de-CH" dirty="0" smtClean="0"/>
+              <a:t> </a:t>
+            </a:r>
+            <a:r>
+              <a:rPr lang="de-CH" dirty="0" err="1" smtClean="0"/>
+              <a:t>list</a:t>
+            </a:r>
+            <a:r>
+              <a:rPr lang="de-CH" dirty="0" smtClean="0"/>
+              <a:t> </a:t>
             </a:r>
             <a:r>
               <a:rPr lang="de-CH" dirty="0" err="1" smtClean="0"/>
@@ -5441,7 +5457,7 @@
             </a:r>
             <a:r>
               <a:rPr lang="de-CH" dirty="0" smtClean="0"/>
-              <a:t> 4» in </a:t>
+              <a:t> </a:t>
             </a:r>
             <a:r>
               <a:rPr lang="de-CH" dirty="0" err="1" smtClean="0"/>
@@ -5453,11 +5469,31 @@
             </a:r>
             <a:r>
               <a:rPr lang="de-CH" dirty="0" err="1" smtClean="0"/>
-              <a:t>programming</a:t>
+              <a:t>patterns</a:t>
+            </a:r>
+            <a:r>
+              <a:rPr lang="de-CH" dirty="0"/>
+              <a:t> (like «Gang </a:t>
+            </a:r>
+            <a:r>
+              <a:rPr lang="de-CH" dirty="0" err="1"/>
+              <a:t>of</a:t>
+            </a:r>
+            <a:r>
+              <a:rPr lang="de-CH" dirty="0"/>
+              <a:t> 4</a:t>
             </a:r>
             <a:r>
               <a:rPr lang="de-CH" dirty="0" smtClean="0"/>
-              <a:t>.</a:t>
+              <a:t>» </a:t>
+            </a:r>
+            <a:r>
+              <a:rPr lang="de-CH" dirty="0" err="1" smtClean="0"/>
+              <a:t>patterns</a:t>
+            </a:r>
+            <a:r>
+              <a:rPr lang="de-CH" dirty="0" smtClean="0"/>
+              <a:t> in OO).</a:t>
             </a:r>
             <a:endParaRPr lang="de-CH" dirty="0"/>
           </a:p>
@@ -5484,7 +5520,7 @@
             </a:r>
             <a:r>
               <a:rPr lang="de-CH" dirty="0" err="1" smtClean="0"/>
-              <a:t>patterns</a:t>
+              <a:t>pattern</a:t>
             </a:r>
             <a:r>
               <a:rPr lang="de-CH" dirty="0" smtClean="0"/>
@@ -5522,7 +5558,6 @@
               <a:rPr lang="de-CH" dirty="0" smtClean="0"/>
               <a:t>.</a:t>
             </a:r>
-            <a:endParaRPr lang="de-CH" dirty="0" smtClean="0"/>
           </a:p>
           <a:p>
             <a:pPr marL="342900" indent="-342900">
@@ -5530,12 +5565,8 @@
               <a:buChar char="•"/>
             </a:pPr>
             <a:r>
-              <a:rPr lang="de-CH" dirty="0" smtClean="0"/>
-              <a:t>Focus on </a:t>
-            </a:r>
-            <a:r>
               <a:rPr lang="de-CH" dirty="0" err="1" smtClean="0"/>
-              <a:t>composition</a:t>
+              <a:t>Highly</a:t>
             </a:r>
             <a:r>
               <a:rPr lang="de-CH" dirty="0" smtClean="0"/>
@@ -5543,55 +5574,7 @@
             </a:r>
             <a:r>
               <a:rPr lang="de-CH" dirty="0" err="1" smtClean="0"/>
-              <a:t>of</a:t>
-            </a:r>
-            <a:r>
-              <a:rPr lang="de-CH" dirty="0" smtClean="0"/>
-              <a:t> </a:t>
-            </a:r>
-            <a:r>
-              <a:rPr lang="de-CH" dirty="0" err="1" smtClean="0"/>
-              <a:t>functions</a:t>
-            </a:r>
-            <a:r>
-              <a:rPr lang="de-CH" dirty="0" smtClean="0"/>
-              <a:t> </a:t>
-            </a:r>
-            <a:r>
-              <a:rPr lang="de-CH" dirty="0" err="1" smtClean="0"/>
-              <a:t>rather</a:t>
-            </a:r>
-            <a:r>
-              <a:rPr lang="de-CH" dirty="0" smtClean="0"/>
-              <a:t> </a:t>
-            </a:r>
-            <a:r>
-              <a:rPr lang="de-CH" dirty="0" err="1" smtClean="0"/>
-              <a:t>than</a:t>
-            </a:r>
-            <a:r>
-              <a:rPr lang="de-CH" dirty="0" smtClean="0"/>
-              <a:t> </a:t>
-            </a:r>
-            <a:r>
-              <a:rPr lang="de-CH" dirty="0" err="1" smtClean="0"/>
-              <a:t>composition</a:t>
-            </a:r>
-            <a:r>
-              <a:rPr lang="de-CH" dirty="0" smtClean="0"/>
-              <a:t> </a:t>
-            </a:r>
-            <a:r>
-              <a:rPr lang="de-CH" dirty="0" err="1" smtClean="0"/>
-              <a:t>of</a:t>
-            </a:r>
-            <a:r>
-              <a:rPr lang="de-CH" dirty="0" smtClean="0"/>
-              <a:t> </a:t>
-            </a:r>
-            <a:r>
-              <a:rPr lang="de-CH" dirty="0" err="1" smtClean="0"/>
-              <a:t>objects</a:t>
+              <a:t>language-dependent</a:t>
             </a:r>
             <a:endParaRPr lang="de-CH" dirty="0" smtClean="0"/>
           </a:p>
@@ -5602,7 +5585,130 @@
             </a:pPr>
             <a:r>
               <a:rPr lang="de-CH" dirty="0" smtClean="0"/>
-              <a:t>More like </a:t>
+              <a:t>Focus on </a:t>
+            </a:r>
+            <a:r>
+              <a:rPr lang="de-CH" dirty="0" err="1" smtClean="0"/>
+              <a:t>composition</a:t>
+            </a:r>
+            <a:r>
+              <a:rPr lang="de-CH" dirty="0" smtClean="0"/>
+              <a:t> </a:t>
+            </a:r>
+            <a:r>
+              <a:rPr lang="de-CH" dirty="0" err="1" smtClean="0"/>
+              <a:t>of</a:t>
+            </a:r>
+            <a:r>
+              <a:rPr lang="de-CH" dirty="0" smtClean="0"/>
+              <a:t> </a:t>
+            </a:r>
+            <a:r>
+              <a:rPr lang="de-CH" dirty="0" err="1" smtClean="0"/>
+              <a:t>functions</a:t>
+            </a:r>
+            <a:r>
+              <a:rPr lang="de-CH" dirty="0" smtClean="0"/>
+              <a:t> </a:t>
+            </a:r>
+            <a:r>
+              <a:rPr lang="de-CH" dirty="0" err="1" smtClean="0"/>
+              <a:t>rather</a:t>
+            </a:r>
+            <a:r>
+              <a:rPr lang="de-CH" dirty="0" smtClean="0"/>
+              <a:t> </a:t>
+            </a:r>
+            <a:r>
+              <a:rPr lang="de-CH" dirty="0" err="1" smtClean="0"/>
+              <a:t>than</a:t>
+            </a:r>
+            <a:r>
+              <a:rPr lang="de-CH" dirty="0" smtClean="0"/>
+              <a:t> </a:t>
+            </a:r>
+            <a:r>
+              <a:rPr lang="de-CH" dirty="0" err="1" smtClean="0"/>
+              <a:t>composition</a:t>
+            </a:r>
+            <a:r>
+              <a:rPr lang="de-CH" dirty="0" smtClean="0"/>
+              <a:t> </a:t>
+            </a:r>
+            <a:r>
+              <a:rPr lang="de-CH" dirty="0" err="1" smtClean="0"/>
+              <a:t>of</a:t>
+            </a:r>
+            <a:r>
+              <a:rPr lang="de-CH" dirty="0" smtClean="0"/>
+              <a:t> </a:t>
+            </a:r>
+            <a:r>
+              <a:rPr lang="de-CH" dirty="0" err="1" smtClean="0"/>
+              <a:t>objects</a:t>
+            </a:r>
+            <a:endParaRPr lang="de-CH" dirty="0" smtClean="0"/>
+          </a:p>
+          <a:p>
+            <a:pPr marL="342900" indent="-342900">
+              <a:buFont typeface="Arial" panose="020B0604020202020204" pitchFamily="34" charset="0"/>
+              <a:buChar char="•"/>
+            </a:pPr>
+            <a:r>
+              <a:rPr lang="de-CH" dirty="0" err="1" smtClean="0"/>
+              <a:t>Our</a:t>
+            </a:r>
+            <a:r>
+              <a:rPr lang="de-CH" dirty="0" smtClean="0"/>
+              <a:t> </a:t>
+            </a:r>
+            <a:r>
+              <a:rPr lang="de-CH" dirty="0" err="1" smtClean="0"/>
+              <a:t>collection</a:t>
+            </a:r>
+            <a:r>
+              <a:rPr lang="de-CH" dirty="0" smtClean="0"/>
+              <a:t> </a:t>
+            </a:r>
+            <a:r>
+              <a:rPr lang="de-CH" dirty="0" err="1" smtClean="0"/>
+              <a:t>consists</a:t>
+            </a:r>
+            <a:r>
+              <a:rPr lang="de-CH" dirty="0" smtClean="0"/>
+              <a:t> </a:t>
+            </a:r>
+            <a:r>
+              <a:rPr lang="de-CH" dirty="0" err="1" smtClean="0"/>
+              <a:t>of</a:t>
+            </a:r>
+            <a:r>
+              <a:rPr lang="de-CH" dirty="0" smtClean="0"/>
+              <a:t> </a:t>
+            </a:r>
+            <a:r>
+              <a:rPr lang="de-CH" dirty="0" err="1" smtClean="0"/>
+              <a:t>ideas</a:t>
+            </a:r>
+            <a:r>
+              <a:rPr lang="de-CH" dirty="0" smtClean="0"/>
+              <a:t>, </a:t>
+            </a:r>
+            <a:r>
+              <a:rPr lang="de-CH" dirty="0" err="1" smtClean="0"/>
+              <a:t>recipes</a:t>
+            </a:r>
+            <a:r>
+              <a:rPr lang="de-CH" dirty="0" smtClean="0"/>
+              <a:t> </a:t>
+            </a:r>
+            <a:r>
+              <a:rPr lang="de-CH" dirty="0" err="1" smtClean="0"/>
+              <a:t>and</a:t>
+            </a:r>
+            <a:r>
+              <a:rPr lang="de-CH" dirty="0" smtClean="0"/>
+              <a:t> </a:t>
             </a:r>
             <a:r>
               <a:rPr lang="de-CH" dirty="0" err="1" smtClean="0"/>
@@ -5610,19 +5716,7 @@
             </a:r>
             <a:r>
               <a:rPr lang="de-CH" dirty="0" smtClean="0"/>
-              <a:t>, </a:t>
-            </a:r>
-            <a:r>
-              <a:rPr lang="de-CH" dirty="0" err="1" smtClean="0"/>
-              <a:t>ideas</a:t>
-            </a:r>
-            <a:r>
-              <a:rPr lang="de-CH" dirty="0" smtClean="0"/>
-              <a:t>, </a:t>
-            </a:r>
-            <a:r>
-              <a:rPr lang="de-CH" dirty="0" err="1" smtClean="0"/>
-              <a:t>recipes</a:t>
+              <a:t>.</a:t>
             </a:r>
             <a:endParaRPr lang="de-CH" dirty="0" smtClean="0"/>
           </a:p>
@@ -5948,11 +6042,7 @@
             </a:pPr>
             <a:r>
               <a:rPr lang="en-US" dirty="0" smtClean="0"/>
-              <a:t>In </a:t>
-            </a:r>
-            <a:r>
-              <a:rPr lang="en-US" dirty="0" smtClean="0"/>
-              <a:t>OO: Like implementing a template method or passing a callback object</a:t>
+              <a:t>In OO: Like implementing a template method or passing a callback object</a:t>
             </a:r>
           </a:p>
           <a:p>
@@ -5962,13 +6052,8 @@
             </a:pPr>
             <a:r>
               <a:rPr lang="en-US" dirty="0" smtClean="0"/>
-              <a:t>Doesn’t this inevitably lead to a mess? </a:t>
-            </a:r>
-            <a:r>
-              <a:rPr lang="en-US" dirty="0" smtClean="0"/>
-              <a:t>What about callback hell?</a:t>
-            </a:r>
-            <a:endParaRPr lang="en-US" dirty="0" smtClean="0"/>
+              <a:t>Doesn’t this inevitably lead to a mess? What about callback hell?</a:t>
+            </a:r>
           </a:p>
           <a:p>
             <a:pPr marL="342900" indent="-342900">
@@ -6004,7 +6089,6 @@
               <a:rPr lang="en-US" dirty="0" smtClean="0"/>
               <a:t>Use well-known, generic higher-order functions</a:t>
             </a:r>
-            <a:endParaRPr lang="en-US" dirty="0" smtClean="0"/>
           </a:p>
         </p:txBody>
       </p:sp>
@@ -6141,102 +6225,144 @@
           <a:bodyPr/>
           <a:lstStyle/>
           <a:p>
+            <a:r>
+              <a:rPr lang="en-US" dirty="0" smtClean="0"/>
+              <a:t>filter</a:t>
+            </a:r>
+            <a:r>
+              <a:rPr lang="en-US" dirty="0"/>
+              <a:t> </a:t>
+            </a:r>
+            <a:r>
+              <a:rPr lang="en-US" baseline="30000" dirty="0">
+                <a:solidFill>
+                  <a:srgbClr val="FF0000"/>
+                </a:solidFill>
+              </a:rPr>
+              <a:t>Scala</a:t>
+            </a:r>
+            <a:r>
+              <a:rPr lang="en-US" baseline="30000" dirty="0"/>
+              <a:t>, </a:t>
+            </a:r>
+            <a:r>
+              <a:rPr lang="en-US" baseline="30000" dirty="0">
+                <a:solidFill>
+                  <a:schemeClr val="accent4">
+                    <a:lumMod val="50000"/>
+                  </a:schemeClr>
+                </a:solidFill>
+              </a:rPr>
+              <a:t>Java</a:t>
+            </a:r>
+            <a:r>
+              <a:rPr lang="en-US" baseline="30000" dirty="0"/>
+              <a:t>, </a:t>
+            </a:r>
+            <a:r>
+              <a:rPr lang="en-US" baseline="30000" dirty="0" smtClean="0">
+                <a:solidFill>
+                  <a:schemeClr val="tx2">
+                    <a:lumMod val="50000"/>
+                  </a:schemeClr>
+                </a:solidFill>
+              </a:rPr>
+              <a:t>Haskell</a:t>
+            </a:r>
+          </a:p>
+          <a:p>
+            <a:r>
+              <a:rPr lang="en-US" dirty="0" err="1" smtClean="0"/>
+              <a:t>findAll</a:t>
+            </a:r>
+            <a:r>
+              <a:rPr lang="en-US" dirty="0" smtClean="0"/>
+              <a:t> </a:t>
+            </a:r>
+            <a:r>
+              <a:rPr lang="en-US" baseline="30000" dirty="0">
+                <a:solidFill>
+                  <a:schemeClr val="accent3">
+                    <a:lumMod val="75000"/>
+                  </a:schemeClr>
+                </a:solidFill>
+              </a:rPr>
+              <a:t>Groovy</a:t>
+            </a:r>
+            <a:endParaRPr lang="en-US" dirty="0"/>
+          </a:p>
+          <a:p>
             <a:pPr marL="342900" indent="-342900">
               <a:buFont typeface="Arial" panose="020B0604020202020204" pitchFamily="34" charset="0"/>
               <a:buChar char="•"/>
             </a:pPr>
-            <a:r>
-              <a:rPr lang="en-US" dirty="0"/>
-              <a:t>map </a:t>
-            </a:r>
-            <a:r>
-              <a:rPr lang="en-US" baseline="30000" dirty="0">
-                <a:solidFill>
-                  <a:srgbClr val="FF0000"/>
-                </a:solidFill>
-              </a:rPr>
-              <a:t>Scala</a:t>
-            </a:r>
-            <a:r>
-              <a:rPr lang="en-US" baseline="30000" dirty="0"/>
-              <a:t>, </a:t>
-            </a:r>
-            <a:r>
-              <a:rPr lang="en-US" baseline="30000" dirty="0">
-                <a:solidFill>
-                  <a:schemeClr val="accent4">
-                    <a:lumMod val="50000"/>
-                  </a:schemeClr>
-                </a:solidFill>
-              </a:rPr>
-              <a:t>Java</a:t>
-            </a:r>
-            <a:r>
-              <a:rPr lang="en-US" baseline="30000" dirty="0"/>
-              <a:t>, </a:t>
-            </a:r>
-            <a:r>
-              <a:rPr lang="en-US" baseline="30000" dirty="0">
-                <a:solidFill>
-                  <a:schemeClr val="tx2">
-                    <a:lumMod val="50000"/>
-                  </a:schemeClr>
-                </a:solidFill>
-              </a:rPr>
-              <a:t>Haskell </a:t>
-            </a:r>
-            <a:r>
-              <a:rPr lang="en-US" dirty="0"/>
-              <a:t>/ collect </a:t>
-            </a:r>
-            <a:r>
-              <a:rPr lang="en-US" baseline="30000" dirty="0">
-                <a:solidFill>
-                  <a:schemeClr val="accent3">
-                    <a:lumMod val="75000"/>
-                  </a:schemeClr>
-                </a:solidFill>
-              </a:rPr>
-              <a:t>Groovy</a:t>
-            </a:r>
-            <a:r>
-              <a:rPr lang="en-US" dirty="0"/>
-              <a:t>: </a:t>
-            </a:r>
-          </a:p>
-          <a:p>
-            <a:pPr marL="700088" lvl="1" indent="-342900">
-              <a:buFont typeface="Arial" panose="020B0604020202020204" pitchFamily="34" charset="0"/>
-              <a:buChar char="•"/>
-            </a:pPr>
-            <a:r>
-              <a:rPr lang="en-US" dirty="0"/>
-              <a:t>List(1,2,3).map(x =&gt; f(x)) == List(f(1), f(2), f(3))</a:t>
-            </a:r>
+            <a:endParaRPr lang="en-US" dirty="0" smtClean="0"/>
           </a:p>
           <a:p>
             <a:pPr marL="342900" indent="-342900">
               <a:buFont typeface="Arial" panose="020B0604020202020204" pitchFamily="34" charset="0"/>
               <a:buChar char="•"/>
             </a:pPr>
+            <a:endParaRPr lang="en-US" dirty="0" smtClean="0"/>
+          </a:p>
+          <a:p>
             <a:r>
               <a:rPr lang="en-US" dirty="0" smtClean="0"/>
-              <a:t>filter/</a:t>
-            </a:r>
-            <a:r>
-              <a:rPr lang="en-US" dirty="0" err="1" smtClean="0"/>
-              <a:t>findAll</a:t>
-            </a:r>
-            <a:endParaRPr lang="en-US" dirty="0"/>
-          </a:p>
-          <a:p>
-            <a:pPr marL="700088" lvl="1" indent="-342900">
-              <a:buFont typeface="Arial" panose="020B0604020202020204" pitchFamily="34" charset="0"/>
-              <a:buChar char="•"/>
-            </a:pPr>
+              <a:t>map </a:t>
+            </a:r>
+            <a:r>
+              <a:rPr lang="en-US" baseline="30000" dirty="0">
+                <a:solidFill>
+                  <a:srgbClr val="FF0000"/>
+                </a:solidFill>
+              </a:rPr>
+              <a:t>Scala</a:t>
+            </a:r>
+            <a:r>
+              <a:rPr lang="en-US" baseline="30000" dirty="0"/>
+              <a:t>, </a:t>
+            </a:r>
+            <a:r>
+              <a:rPr lang="en-US" baseline="30000" dirty="0">
+                <a:solidFill>
+                  <a:schemeClr val="accent4">
+                    <a:lumMod val="50000"/>
+                  </a:schemeClr>
+                </a:solidFill>
+              </a:rPr>
+              <a:t>Java</a:t>
+            </a:r>
+            <a:r>
+              <a:rPr lang="en-US" baseline="30000" dirty="0"/>
+              <a:t>, </a:t>
+            </a:r>
+            <a:r>
+              <a:rPr lang="en-US" baseline="30000" dirty="0">
+                <a:solidFill>
+                  <a:schemeClr val="tx2">
+                    <a:lumMod val="50000"/>
+                  </a:schemeClr>
+                </a:solidFill>
+              </a:rPr>
+              <a:t>Haskell </a:t>
+            </a:r>
             <a:r>
               <a:rPr lang="en-US" dirty="0"/>
-              <a:t>List(1,2,3).filter(x =&gt; x &gt; 1) == List(2,3)</a:t>
+              <a:t>/ collect </a:t>
+            </a:r>
+            <a:r>
+              <a:rPr lang="en-US" baseline="30000" dirty="0">
+                <a:solidFill>
+                  <a:schemeClr val="accent3">
+                    <a:lumMod val="75000"/>
+                  </a:schemeClr>
+                </a:solidFill>
+              </a:rPr>
+              <a:t>Groovy</a:t>
+            </a:r>
+            <a:r>
+              <a:rPr lang="en-US" dirty="0"/>
+              <a:t>: </a:t>
             </a:r>
           </a:p>
           <a:p>
@@ -6244,55 +6370,16 @@
               <a:buFont typeface="Arial" panose="020B0604020202020204" pitchFamily="34" charset="0"/>
               <a:buChar char="•"/>
             </a:pPr>
-            <a:r>
-              <a:rPr lang="en-US" dirty="0" smtClean="0"/>
-              <a:t>fold </a:t>
-            </a:r>
-            <a:r>
-              <a:rPr lang="en-US" baseline="30000" dirty="0"/>
-              <a:t>Scala, Java, Haskell</a:t>
-            </a:r>
-            <a:r>
-              <a:rPr lang="en-US" dirty="0"/>
-              <a:t>/reduce </a:t>
-            </a:r>
-            <a:r>
-              <a:rPr lang="en-US" baseline="30000" dirty="0"/>
-              <a:t>Groovy</a:t>
-            </a:r>
-            <a:endParaRPr lang="en-US" dirty="0"/>
-          </a:p>
-          <a:p>
-            <a:pPr marL="700088" lvl="1" indent="-342900">
-              <a:buFont typeface="Arial" panose="020B0604020202020204" pitchFamily="34" charset="0"/>
-              <a:buChar char="•"/>
-            </a:pPr>
-            <a:r>
-              <a:rPr lang="en-US" dirty="0"/>
-              <a:t>List(1,2,3).fold(zero, (</a:t>
-            </a:r>
-            <a:r>
-              <a:rPr lang="en-US" dirty="0" err="1"/>
-              <a:t>acc</a:t>
-            </a:r>
-            <a:r>
-              <a:rPr lang="en-US" dirty="0"/>
-              <a:t>, x) =&gt; f(</a:t>
-            </a:r>
-            <a:r>
-              <a:rPr lang="en-US" dirty="0" err="1"/>
-              <a:t>acc</a:t>
-            </a:r>
-            <a:r>
-              <a:rPr lang="en-US" dirty="0"/>
-              <a:t>, x)) == f(f(f(zero,1), 2), 3)</a:t>
-            </a:r>
+            <a:endParaRPr lang="en-US" dirty="0" smtClean="0"/>
           </a:p>
           <a:p>
             <a:pPr marL="342900" indent="-342900">
               <a:buFont typeface="Arial" panose="020B0604020202020204" pitchFamily="34" charset="0"/>
               <a:buChar char="•"/>
             </a:pPr>
+            <a:endParaRPr lang="en-US" dirty="0" smtClean="0"/>
+          </a:p>
+          <a:p>
             <a:r>
               <a:rPr lang="en-US" dirty="0" err="1" smtClean="0"/>
               <a:t>flatMap</a:t>
@@ -6369,26 +6456,33 @@
             </a:r>
           </a:p>
           <a:p>
-            <a:pPr marL="700088" lvl="1" indent="-342900">
+            <a:pPr marL="342900" indent="-342900">
               <a:buFont typeface="Arial" panose="020B0604020202020204" pitchFamily="34" charset="0"/>
               <a:buChar char="•"/>
             </a:pPr>
+            <a:endParaRPr lang="en-US" dirty="0" smtClean="0"/>
+          </a:p>
+          <a:p>
+            <a:pPr marL="342900" indent="-342900">
+              <a:buFont typeface="Arial" panose="020B0604020202020204" pitchFamily="34" charset="0"/>
+              <a:buChar char="•"/>
+            </a:pPr>
+            <a:endParaRPr lang="en-US" dirty="0"/>
+          </a:p>
+          <a:p>
             <a:r>
               <a:rPr lang="en-US" dirty="0" smtClean="0"/>
-              <a:t>List(10,20,30</a:t>
+              <a:t>fold, reduce, exists, </a:t>
+            </a:r>
+            <a:r>
+              <a:rPr lang="en-US" dirty="0" err="1" smtClean="0"/>
+              <a:t>foreach</a:t>
             </a:r>
             <a:r>
               <a:rPr lang="en-US" dirty="0" smtClean="0"/>
-              <a:t>).</a:t>
-            </a:r>
-            <a:r>
-              <a:rPr lang="en-US" dirty="0" err="1" smtClean="0"/>
-              <a:t>flatMap</a:t>
-            </a:r>
-            <a:r>
-              <a:rPr lang="en-US" dirty="0" smtClean="0"/>
-              <a:t>(x =&gt; List(x+1,x+2)) == List(11,12,21,22,31,32)</a:t>
-            </a:r>
+              <a:t>…</a:t>
+            </a:r>
+            <a:endParaRPr lang="en-US" dirty="0" smtClean="0"/>
           </a:p>
         </p:txBody>
       </p:sp>
@@ -6458,6 +6552,1157 @@
               <a:t>The most useful ones</a:t>
             </a:r>
             <a:endParaRPr lang="en-US" dirty="0"/>
+          </a:p>
+        </p:txBody>
+      </p:sp>
+      <p:grpSp>
+        <p:nvGrpSpPr>
+          <p:cNvPr id="13" name="Group 12"/>
+          <p:cNvGrpSpPr/>
+          <p:nvPr/>
+        </p:nvGrpSpPr>
+        <p:grpSpPr>
+          <a:xfrm>
+            <a:off x="4583832" y="1761748"/>
+            <a:ext cx="432048" cy="432048"/>
+            <a:chOff x="2279576" y="2276872"/>
+            <a:chExt cx="432048" cy="432048"/>
+          </a:xfrm>
+        </p:grpSpPr>
+        <p:sp>
+          <p:nvSpPr>
+            <p:cNvPr id="11" name="Rounded Rectangle 10"/>
+            <p:cNvSpPr/>
+            <p:nvPr/>
+          </p:nvSpPr>
+          <p:spPr>
+            <a:xfrm>
+              <a:off x="2279576" y="2276872"/>
+              <a:ext cx="432048" cy="432048"/>
+            </a:xfrm>
+            <a:prstGeom prst="roundRect">
+              <a:avLst/>
+            </a:prstGeom>
+            <a:solidFill>
+              <a:srgbClr val="0070C0"/>
+            </a:solidFill>
+            <a:ln w="76200">
+              <a:noFill/>
+            </a:ln>
+          </p:spPr>
+          <p:style>
+            <a:lnRef idx="2">
+              <a:schemeClr val="accent1">
+                <a:shade val="50000"/>
+              </a:schemeClr>
+            </a:lnRef>
+            <a:fillRef idx="1">
+              <a:schemeClr val="accent1"/>
+            </a:fillRef>
+            <a:effectRef idx="0">
+              <a:schemeClr val="accent1"/>
+            </a:effectRef>
+            <a:fontRef idx="minor">
+              <a:schemeClr val="lt1"/>
+            </a:fontRef>
+          </p:style>
+          <p:txBody>
+            <a:bodyPr rtlCol="0" anchor="ctr"/>
+            <a:lstStyle/>
+            <a:p>
+              <a:pPr algn="ctr"/>
+              <a:endParaRPr lang="en-US" sz="2200" dirty="0" err="1" smtClean="0">
+                <a:ln w="76200">
+                  <a:noFill/>
+                </a:ln>
+                <a:latin typeface="AA Zuehlke" pitchFamily="2" charset="0"/>
+              </a:endParaRPr>
+            </a:p>
+          </p:txBody>
+        </p:sp>
+        <p:sp>
+          <p:nvSpPr>
+            <p:cNvPr id="12" name="TextBox 11"/>
+            <p:cNvSpPr txBox="1"/>
+            <p:nvPr/>
+          </p:nvSpPr>
+          <p:spPr>
+            <a:xfrm>
+              <a:off x="2279576" y="2295255"/>
+              <a:ext cx="432048" cy="360040"/>
+            </a:xfrm>
+            <a:prstGeom prst="rect">
+              <a:avLst/>
+            </a:prstGeom>
+            <a:noFill/>
+          </p:spPr>
+          <p:txBody>
+            <a:bodyPr wrap="square" rtlCol="0">
+              <a:noAutofit/>
+            </a:bodyPr>
+            <a:lstStyle/>
+            <a:p>
+              <a:pPr algn="ctr"/>
+              <a:r>
+                <a:rPr lang="en-US" sz="2200" dirty="0" smtClean="0">
+                  <a:solidFill>
+                    <a:schemeClr val="bg1"/>
+                  </a:solidFill>
+                  <a:latin typeface="AA Zuehlke" pitchFamily="2" charset="0"/>
+                </a:rPr>
+                <a:t>1</a:t>
+              </a:r>
+              <a:endParaRPr lang="en-US" sz="2200" dirty="0" smtClean="0">
+                <a:solidFill>
+                  <a:schemeClr val="bg1"/>
+                </a:solidFill>
+                <a:latin typeface="AA Zuehlke" pitchFamily="2" charset="0"/>
+              </a:endParaRPr>
+            </a:p>
+          </p:txBody>
+        </p:sp>
+      </p:grpSp>
+      <p:grpSp>
+        <p:nvGrpSpPr>
+          <p:cNvPr id="14" name="Group 13"/>
+          <p:cNvGrpSpPr/>
+          <p:nvPr/>
+        </p:nvGrpSpPr>
+        <p:grpSpPr>
+          <a:xfrm>
+            <a:off x="5360301" y="1761748"/>
+            <a:ext cx="432048" cy="432048"/>
+            <a:chOff x="2279576" y="2276872"/>
+            <a:chExt cx="432048" cy="432048"/>
+          </a:xfrm>
+        </p:grpSpPr>
+        <p:sp>
+          <p:nvSpPr>
+            <p:cNvPr id="15" name="Rounded Rectangle 14"/>
+            <p:cNvSpPr/>
+            <p:nvPr/>
+          </p:nvSpPr>
+          <p:spPr>
+            <a:xfrm>
+              <a:off x="2279576" y="2276872"/>
+              <a:ext cx="432048" cy="432048"/>
+            </a:xfrm>
+            <a:prstGeom prst="roundRect">
+              <a:avLst/>
+            </a:prstGeom>
+            <a:solidFill>
+              <a:srgbClr val="0070C0"/>
+            </a:solidFill>
+            <a:ln w="76200">
+              <a:noFill/>
+            </a:ln>
+          </p:spPr>
+          <p:style>
+            <a:lnRef idx="2">
+              <a:schemeClr val="accent1">
+                <a:shade val="50000"/>
+              </a:schemeClr>
+            </a:lnRef>
+            <a:fillRef idx="1">
+              <a:schemeClr val="accent1"/>
+            </a:fillRef>
+            <a:effectRef idx="0">
+              <a:schemeClr val="accent1"/>
+            </a:effectRef>
+            <a:fontRef idx="minor">
+              <a:schemeClr val="lt1"/>
+            </a:fontRef>
+          </p:style>
+          <p:txBody>
+            <a:bodyPr rtlCol="0" anchor="ctr"/>
+            <a:lstStyle/>
+            <a:p>
+              <a:pPr algn="ctr"/>
+              <a:endParaRPr lang="en-US" sz="2200" dirty="0" err="1" smtClean="0">
+                <a:ln w="76200">
+                  <a:noFill/>
+                </a:ln>
+                <a:latin typeface="AA Zuehlke" pitchFamily="2" charset="0"/>
+              </a:endParaRPr>
+            </a:p>
+          </p:txBody>
+        </p:sp>
+        <p:sp>
+          <p:nvSpPr>
+            <p:cNvPr id="16" name="TextBox 15"/>
+            <p:cNvSpPr txBox="1"/>
+            <p:nvPr/>
+          </p:nvSpPr>
+          <p:spPr>
+            <a:xfrm>
+              <a:off x="2279576" y="2295255"/>
+              <a:ext cx="432048" cy="360040"/>
+            </a:xfrm>
+            <a:prstGeom prst="rect">
+              <a:avLst/>
+            </a:prstGeom>
+            <a:noFill/>
+          </p:spPr>
+          <p:txBody>
+            <a:bodyPr wrap="square" rtlCol="0">
+              <a:noAutofit/>
+            </a:bodyPr>
+            <a:lstStyle/>
+            <a:p>
+              <a:pPr algn="ctr"/>
+              <a:r>
+                <a:rPr lang="en-US" sz="2200" dirty="0" smtClean="0">
+                  <a:solidFill>
+                    <a:schemeClr val="bg1"/>
+                  </a:solidFill>
+                  <a:latin typeface="AA Zuehlke" pitchFamily="2" charset="0"/>
+                </a:rPr>
+                <a:t>2</a:t>
+              </a:r>
+              <a:endParaRPr lang="en-US" sz="2200" dirty="0" smtClean="0">
+                <a:solidFill>
+                  <a:schemeClr val="bg1"/>
+                </a:solidFill>
+                <a:latin typeface="AA Zuehlke" pitchFamily="2" charset="0"/>
+              </a:endParaRPr>
+            </a:p>
+          </p:txBody>
+        </p:sp>
+      </p:grpSp>
+      <p:grpSp>
+        <p:nvGrpSpPr>
+          <p:cNvPr id="17" name="Group 16"/>
+          <p:cNvGrpSpPr/>
+          <p:nvPr/>
+        </p:nvGrpSpPr>
+        <p:grpSpPr>
+          <a:xfrm>
+            <a:off x="6136770" y="1761748"/>
+            <a:ext cx="432048" cy="432048"/>
+            <a:chOff x="2279576" y="2276872"/>
+            <a:chExt cx="432048" cy="432048"/>
+          </a:xfrm>
+        </p:grpSpPr>
+        <p:sp>
+          <p:nvSpPr>
+            <p:cNvPr id="18" name="Rounded Rectangle 17"/>
+            <p:cNvSpPr/>
+            <p:nvPr/>
+          </p:nvSpPr>
+          <p:spPr>
+            <a:xfrm>
+              <a:off x="2279576" y="2276872"/>
+              <a:ext cx="432048" cy="432048"/>
+            </a:xfrm>
+            <a:prstGeom prst="roundRect">
+              <a:avLst/>
+            </a:prstGeom>
+            <a:solidFill>
+              <a:srgbClr val="0070C0"/>
+            </a:solidFill>
+            <a:ln w="76200">
+              <a:noFill/>
+            </a:ln>
+          </p:spPr>
+          <p:style>
+            <a:lnRef idx="2">
+              <a:schemeClr val="accent1">
+                <a:shade val="50000"/>
+              </a:schemeClr>
+            </a:lnRef>
+            <a:fillRef idx="1">
+              <a:schemeClr val="accent1"/>
+            </a:fillRef>
+            <a:effectRef idx="0">
+              <a:schemeClr val="accent1"/>
+            </a:effectRef>
+            <a:fontRef idx="minor">
+              <a:schemeClr val="lt1"/>
+            </a:fontRef>
+          </p:style>
+          <p:txBody>
+            <a:bodyPr rtlCol="0" anchor="ctr"/>
+            <a:lstStyle/>
+            <a:p>
+              <a:pPr algn="ctr"/>
+              <a:endParaRPr lang="en-US" sz="2200" dirty="0" err="1" smtClean="0">
+                <a:ln w="76200">
+                  <a:noFill/>
+                </a:ln>
+                <a:latin typeface="AA Zuehlke" pitchFamily="2" charset="0"/>
+              </a:endParaRPr>
+            </a:p>
+          </p:txBody>
+        </p:sp>
+        <p:sp>
+          <p:nvSpPr>
+            <p:cNvPr id="19" name="TextBox 18"/>
+            <p:cNvSpPr txBox="1"/>
+            <p:nvPr/>
+          </p:nvSpPr>
+          <p:spPr>
+            <a:xfrm>
+              <a:off x="2279576" y="2295255"/>
+              <a:ext cx="432048" cy="360040"/>
+            </a:xfrm>
+            <a:prstGeom prst="rect">
+              <a:avLst/>
+            </a:prstGeom>
+            <a:noFill/>
+          </p:spPr>
+          <p:txBody>
+            <a:bodyPr wrap="square" rtlCol="0">
+              <a:noAutofit/>
+            </a:bodyPr>
+            <a:lstStyle/>
+            <a:p>
+              <a:pPr algn="ctr"/>
+              <a:r>
+                <a:rPr lang="en-US" sz="2200" dirty="0" smtClean="0">
+                  <a:solidFill>
+                    <a:schemeClr val="bg1"/>
+                  </a:solidFill>
+                  <a:latin typeface="AA Zuehlke" pitchFamily="2" charset="0"/>
+                </a:rPr>
+                <a:t>3</a:t>
+              </a:r>
+              <a:endParaRPr lang="en-US" sz="2200" dirty="0" smtClean="0">
+                <a:solidFill>
+                  <a:schemeClr val="bg1"/>
+                </a:solidFill>
+                <a:latin typeface="AA Zuehlke" pitchFamily="2" charset="0"/>
+              </a:endParaRPr>
+            </a:p>
+          </p:txBody>
+        </p:sp>
+      </p:grpSp>
+      <p:grpSp>
+        <p:nvGrpSpPr>
+          <p:cNvPr id="20" name="Group 19"/>
+          <p:cNvGrpSpPr/>
+          <p:nvPr/>
+        </p:nvGrpSpPr>
+        <p:grpSpPr>
+          <a:xfrm>
+            <a:off x="6913240" y="1761748"/>
+            <a:ext cx="432048" cy="432048"/>
+            <a:chOff x="2279576" y="2276872"/>
+            <a:chExt cx="432048" cy="432048"/>
+          </a:xfrm>
+        </p:grpSpPr>
+        <p:sp>
+          <p:nvSpPr>
+            <p:cNvPr id="21" name="Rounded Rectangle 20"/>
+            <p:cNvSpPr/>
+            <p:nvPr/>
+          </p:nvSpPr>
+          <p:spPr>
+            <a:xfrm>
+              <a:off x="2279576" y="2276872"/>
+              <a:ext cx="432048" cy="432048"/>
+            </a:xfrm>
+            <a:prstGeom prst="roundRect">
+              <a:avLst/>
+            </a:prstGeom>
+            <a:solidFill>
+              <a:srgbClr val="0070C0"/>
+            </a:solidFill>
+            <a:ln w="76200">
+              <a:noFill/>
+            </a:ln>
+          </p:spPr>
+          <p:style>
+            <a:lnRef idx="2">
+              <a:schemeClr val="accent1">
+                <a:shade val="50000"/>
+              </a:schemeClr>
+            </a:lnRef>
+            <a:fillRef idx="1">
+              <a:schemeClr val="accent1"/>
+            </a:fillRef>
+            <a:effectRef idx="0">
+              <a:schemeClr val="accent1"/>
+            </a:effectRef>
+            <a:fontRef idx="minor">
+              <a:schemeClr val="lt1"/>
+            </a:fontRef>
+          </p:style>
+          <p:txBody>
+            <a:bodyPr rtlCol="0" anchor="ctr"/>
+            <a:lstStyle/>
+            <a:p>
+              <a:pPr algn="ctr"/>
+              <a:endParaRPr lang="en-US" sz="2200" dirty="0" err="1" smtClean="0">
+                <a:ln w="76200">
+                  <a:noFill/>
+                </a:ln>
+                <a:latin typeface="AA Zuehlke" pitchFamily="2" charset="0"/>
+              </a:endParaRPr>
+            </a:p>
+          </p:txBody>
+        </p:sp>
+        <p:sp>
+          <p:nvSpPr>
+            <p:cNvPr id="22" name="TextBox 21"/>
+            <p:cNvSpPr txBox="1"/>
+            <p:nvPr/>
+          </p:nvSpPr>
+          <p:spPr>
+            <a:xfrm>
+              <a:off x="2279576" y="2295255"/>
+              <a:ext cx="432048" cy="360040"/>
+            </a:xfrm>
+            <a:prstGeom prst="rect">
+              <a:avLst/>
+            </a:prstGeom>
+            <a:noFill/>
+          </p:spPr>
+          <p:txBody>
+            <a:bodyPr wrap="square" rtlCol="0">
+              <a:noAutofit/>
+            </a:bodyPr>
+            <a:lstStyle/>
+            <a:p>
+              <a:pPr algn="ctr"/>
+              <a:r>
+                <a:rPr lang="en-US" sz="2200" dirty="0" smtClean="0">
+                  <a:solidFill>
+                    <a:schemeClr val="bg1"/>
+                  </a:solidFill>
+                  <a:latin typeface="AA Zuehlke" pitchFamily="2" charset="0"/>
+                </a:rPr>
+                <a:t>4</a:t>
+              </a:r>
+              <a:endParaRPr lang="en-US" sz="2200" dirty="0" smtClean="0">
+                <a:solidFill>
+                  <a:schemeClr val="bg1"/>
+                </a:solidFill>
+                <a:latin typeface="AA Zuehlke" pitchFamily="2" charset="0"/>
+              </a:endParaRPr>
+            </a:p>
+          </p:txBody>
+        </p:sp>
+      </p:grpSp>
+      <p:cxnSp>
+        <p:nvCxnSpPr>
+          <p:cNvPr id="24" name="Straight Arrow Connector 23"/>
+          <p:cNvCxnSpPr/>
+          <p:nvPr/>
+        </p:nvCxnSpPr>
+        <p:spPr>
+          <a:xfrm>
+            <a:off x="5015879" y="1977772"/>
+            <a:ext cx="344422" cy="0"/>
+          </a:xfrm>
+          <a:prstGeom prst="straightConnector1">
+            <a:avLst/>
+          </a:prstGeom>
+          <a:ln w="25400">
+            <a:solidFill>
+              <a:schemeClr val="tx2"/>
+            </a:solidFill>
+            <a:tailEnd type="triangle"/>
+          </a:ln>
+        </p:spPr>
+        <p:style>
+          <a:lnRef idx="1">
+            <a:schemeClr val="accent1"/>
+          </a:lnRef>
+          <a:fillRef idx="0">
+            <a:schemeClr val="accent1"/>
+          </a:fillRef>
+          <a:effectRef idx="0">
+            <a:schemeClr val="accent1"/>
+          </a:effectRef>
+          <a:fontRef idx="minor">
+            <a:schemeClr val="tx1"/>
+          </a:fontRef>
+        </p:style>
+      </p:cxnSp>
+      <p:cxnSp>
+        <p:nvCxnSpPr>
+          <p:cNvPr id="25" name="Straight Arrow Connector 24"/>
+          <p:cNvCxnSpPr/>
+          <p:nvPr/>
+        </p:nvCxnSpPr>
+        <p:spPr>
+          <a:xfrm>
+            <a:off x="5792349" y="1977772"/>
+            <a:ext cx="344422" cy="0"/>
+          </a:xfrm>
+          <a:prstGeom prst="straightConnector1">
+            <a:avLst/>
+          </a:prstGeom>
+          <a:ln w="25400">
+            <a:solidFill>
+              <a:schemeClr val="tx2"/>
+            </a:solidFill>
+            <a:tailEnd type="triangle"/>
+          </a:ln>
+        </p:spPr>
+        <p:style>
+          <a:lnRef idx="1">
+            <a:schemeClr val="accent1"/>
+          </a:lnRef>
+          <a:fillRef idx="0">
+            <a:schemeClr val="accent1"/>
+          </a:fillRef>
+          <a:effectRef idx="0">
+            <a:schemeClr val="accent1"/>
+          </a:effectRef>
+          <a:fontRef idx="minor">
+            <a:schemeClr val="tx1"/>
+          </a:fontRef>
+        </p:style>
+      </p:cxnSp>
+      <p:cxnSp>
+        <p:nvCxnSpPr>
+          <p:cNvPr id="26" name="Straight Arrow Connector 25"/>
+          <p:cNvCxnSpPr/>
+          <p:nvPr/>
+        </p:nvCxnSpPr>
+        <p:spPr>
+          <a:xfrm>
+            <a:off x="6568818" y="1977772"/>
+            <a:ext cx="344422" cy="0"/>
+          </a:xfrm>
+          <a:prstGeom prst="straightConnector1">
+            <a:avLst/>
+          </a:prstGeom>
+          <a:ln w="25400">
+            <a:solidFill>
+              <a:schemeClr val="tx2"/>
+            </a:solidFill>
+            <a:tailEnd type="triangle"/>
+          </a:ln>
+        </p:spPr>
+        <p:style>
+          <a:lnRef idx="1">
+            <a:schemeClr val="accent1"/>
+          </a:lnRef>
+          <a:fillRef idx="0">
+            <a:schemeClr val="accent1"/>
+          </a:fillRef>
+          <a:effectRef idx="0">
+            <a:schemeClr val="accent1"/>
+          </a:effectRef>
+          <a:fontRef idx="minor">
+            <a:schemeClr val="tx1"/>
+          </a:fontRef>
+        </p:style>
+      </p:cxnSp>
+      <p:grpSp>
+        <p:nvGrpSpPr>
+          <p:cNvPr id="27" name="Group 26"/>
+          <p:cNvGrpSpPr/>
+          <p:nvPr/>
+        </p:nvGrpSpPr>
+        <p:grpSpPr>
+          <a:xfrm>
+            <a:off x="4583831" y="2687889"/>
+            <a:ext cx="432048" cy="432048"/>
+            <a:chOff x="2279576" y="2276872"/>
+            <a:chExt cx="432048" cy="432048"/>
+          </a:xfrm>
+        </p:grpSpPr>
+        <p:sp>
+          <p:nvSpPr>
+            <p:cNvPr id="28" name="Rounded Rectangle 27"/>
+            <p:cNvSpPr/>
+            <p:nvPr/>
+          </p:nvSpPr>
+          <p:spPr>
+            <a:xfrm>
+              <a:off x="2279576" y="2276872"/>
+              <a:ext cx="432048" cy="432048"/>
+            </a:xfrm>
+            <a:prstGeom prst="roundRect">
+              <a:avLst/>
+            </a:prstGeom>
+            <a:solidFill>
+              <a:srgbClr val="0070C0"/>
+            </a:solidFill>
+            <a:ln w="76200">
+              <a:noFill/>
+            </a:ln>
+          </p:spPr>
+          <p:style>
+            <a:lnRef idx="2">
+              <a:schemeClr val="accent1">
+                <a:shade val="50000"/>
+              </a:schemeClr>
+            </a:lnRef>
+            <a:fillRef idx="1">
+              <a:schemeClr val="accent1"/>
+            </a:fillRef>
+            <a:effectRef idx="0">
+              <a:schemeClr val="accent1"/>
+            </a:effectRef>
+            <a:fontRef idx="minor">
+              <a:schemeClr val="lt1"/>
+            </a:fontRef>
+          </p:style>
+          <p:txBody>
+            <a:bodyPr rtlCol="0" anchor="ctr"/>
+            <a:lstStyle/>
+            <a:p>
+              <a:pPr algn="ctr"/>
+              <a:endParaRPr lang="en-US" sz="2200" dirty="0" err="1" smtClean="0">
+                <a:ln w="76200">
+                  <a:noFill/>
+                </a:ln>
+                <a:latin typeface="AA Zuehlke" pitchFamily="2" charset="0"/>
+              </a:endParaRPr>
+            </a:p>
+          </p:txBody>
+        </p:sp>
+        <p:sp>
+          <p:nvSpPr>
+            <p:cNvPr id="29" name="TextBox 28"/>
+            <p:cNvSpPr txBox="1"/>
+            <p:nvPr/>
+          </p:nvSpPr>
+          <p:spPr>
+            <a:xfrm>
+              <a:off x="2279576" y="2295255"/>
+              <a:ext cx="432048" cy="360040"/>
+            </a:xfrm>
+            <a:prstGeom prst="rect">
+              <a:avLst/>
+            </a:prstGeom>
+            <a:noFill/>
+          </p:spPr>
+          <p:txBody>
+            <a:bodyPr wrap="square" rtlCol="0">
+              <a:noAutofit/>
+            </a:bodyPr>
+            <a:lstStyle/>
+            <a:p>
+              <a:pPr algn="ctr"/>
+              <a:r>
+                <a:rPr lang="en-US" sz="2200" dirty="0" smtClean="0">
+                  <a:solidFill>
+                    <a:schemeClr val="bg1"/>
+                  </a:solidFill>
+                  <a:latin typeface="AA Zuehlke" pitchFamily="2" charset="0"/>
+                </a:rPr>
+                <a:t>1</a:t>
+              </a:r>
+              <a:endParaRPr lang="en-US" sz="2200" dirty="0" smtClean="0">
+                <a:solidFill>
+                  <a:schemeClr val="bg1"/>
+                </a:solidFill>
+                <a:latin typeface="AA Zuehlke" pitchFamily="2" charset="0"/>
+              </a:endParaRPr>
+            </a:p>
+          </p:txBody>
+        </p:sp>
+      </p:grpSp>
+      <p:grpSp>
+        <p:nvGrpSpPr>
+          <p:cNvPr id="30" name="Group 29"/>
+          <p:cNvGrpSpPr/>
+          <p:nvPr/>
+        </p:nvGrpSpPr>
+        <p:grpSpPr>
+          <a:xfrm>
+            <a:off x="5360300" y="2687889"/>
+            <a:ext cx="432048" cy="432048"/>
+            <a:chOff x="2279576" y="2276872"/>
+            <a:chExt cx="432048" cy="432048"/>
+          </a:xfrm>
+        </p:grpSpPr>
+        <p:sp>
+          <p:nvSpPr>
+            <p:cNvPr id="31" name="Rounded Rectangle 30"/>
+            <p:cNvSpPr/>
+            <p:nvPr/>
+          </p:nvSpPr>
+          <p:spPr>
+            <a:xfrm>
+              <a:off x="2279576" y="2276872"/>
+              <a:ext cx="432048" cy="432048"/>
+            </a:xfrm>
+            <a:prstGeom prst="roundRect">
+              <a:avLst/>
+            </a:prstGeom>
+            <a:solidFill>
+              <a:srgbClr val="0070C0"/>
+            </a:solidFill>
+            <a:ln w="76200">
+              <a:noFill/>
+            </a:ln>
+          </p:spPr>
+          <p:style>
+            <a:lnRef idx="2">
+              <a:schemeClr val="accent1">
+                <a:shade val="50000"/>
+              </a:schemeClr>
+            </a:lnRef>
+            <a:fillRef idx="1">
+              <a:schemeClr val="accent1"/>
+            </a:fillRef>
+            <a:effectRef idx="0">
+              <a:schemeClr val="accent1"/>
+            </a:effectRef>
+            <a:fontRef idx="minor">
+              <a:schemeClr val="lt1"/>
+            </a:fontRef>
+          </p:style>
+          <p:txBody>
+            <a:bodyPr rtlCol="0" anchor="ctr"/>
+            <a:lstStyle/>
+            <a:p>
+              <a:pPr algn="ctr"/>
+              <a:endParaRPr lang="en-US" sz="2200" dirty="0" err="1" smtClean="0">
+                <a:ln w="76200">
+                  <a:noFill/>
+                </a:ln>
+                <a:latin typeface="AA Zuehlke" pitchFamily="2" charset="0"/>
+              </a:endParaRPr>
+            </a:p>
+          </p:txBody>
+        </p:sp>
+        <p:sp>
+          <p:nvSpPr>
+            <p:cNvPr id="32" name="TextBox 31"/>
+            <p:cNvSpPr txBox="1"/>
+            <p:nvPr/>
+          </p:nvSpPr>
+          <p:spPr>
+            <a:xfrm>
+              <a:off x="2279576" y="2295255"/>
+              <a:ext cx="432048" cy="360040"/>
+            </a:xfrm>
+            <a:prstGeom prst="rect">
+              <a:avLst/>
+            </a:prstGeom>
+            <a:noFill/>
+          </p:spPr>
+          <p:txBody>
+            <a:bodyPr wrap="square" rtlCol="0">
+              <a:noAutofit/>
+            </a:bodyPr>
+            <a:lstStyle/>
+            <a:p>
+              <a:pPr algn="ctr"/>
+              <a:r>
+                <a:rPr lang="en-US" sz="2200" dirty="0" smtClean="0">
+                  <a:solidFill>
+                    <a:schemeClr val="bg1"/>
+                  </a:solidFill>
+                  <a:latin typeface="AA Zuehlke" pitchFamily="2" charset="0"/>
+                </a:rPr>
+                <a:t>2</a:t>
+              </a:r>
+              <a:endParaRPr lang="en-US" sz="2200" dirty="0" smtClean="0">
+                <a:solidFill>
+                  <a:schemeClr val="bg1"/>
+                </a:solidFill>
+                <a:latin typeface="AA Zuehlke" pitchFamily="2" charset="0"/>
+              </a:endParaRPr>
+            </a:p>
+          </p:txBody>
+        </p:sp>
+      </p:grpSp>
+      <p:grpSp>
+        <p:nvGrpSpPr>
+          <p:cNvPr id="33" name="Group 32"/>
+          <p:cNvGrpSpPr/>
+          <p:nvPr/>
+        </p:nvGrpSpPr>
+        <p:grpSpPr>
+          <a:xfrm>
+            <a:off x="6136769" y="2687889"/>
+            <a:ext cx="432048" cy="432048"/>
+            <a:chOff x="2279576" y="2276872"/>
+            <a:chExt cx="432048" cy="432048"/>
+          </a:xfrm>
+        </p:grpSpPr>
+        <p:sp>
+          <p:nvSpPr>
+            <p:cNvPr id="34" name="Rounded Rectangle 33"/>
+            <p:cNvSpPr/>
+            <p:nvPr/>
+          </p:nvSpPr>
+          <p:spPr>
+            <a:xfrm>
+              <a:off x="2279576" y="2276872"/>
+              <a:ext cx="432048" cy="432048"/>
+            </a:xfrm>
+            <a:prstGeom prst="roundRect">
+              <a:avLst/>
+            </a:prstGeom>
+            <a:solidFill>
+              <a:srgbClr val="0070C0"/>
+            </a:solidFill>
+            <a:ln w="76200">
+              <a:noFill/>
+            </a:ln>
+          </p:spPr>
+          <p:style>
+            <a:lnRef idx="2">
+              <a:schemeClr val="accent1">
+                <a:shade val="50000"/>
+              </a:schemeClr>
+            </a:lnRef>
+            <a:fillRef idx="1">
+              <a:schemeClr val="accent1"/>
+            </a:fillRef>
+            <a:effectRef idx="0">
+              <a:schemeClr val="accent1"/>
+            </a:effectRef>
+            <a:fontRef idx="minor">
+              <a:schemeClr val="lt1"/>
+            </a:fontRef>
+          </p:style>
+          <p:txBody>
+            <a:bodyPr rtlCol="0" anchor="ctr"/>
+            <a:lstStyle/>
+            <a:p>
+              <a:pPr algn="ctr"/>
+              <a:endParaRPr lang="en-US" sz="2200" dirty="0" err="1" smtClean="0">
+                <a:ln w="76200">
+                  <a:noFill/>
+                </a:ln>
+                <a:latin typeface="AA Zuehlke" pitchFamily="2" charset="0"/>
+              </a:endParaRPr>
+            </a:p>
+          </p:txBody>
+        </p:sp>
+        <p:sp>
+          <p:nvSpPr>
+            <p:cNvPr id="35" name="TextBox 34"/>
+            <p:cNvSpPr txBox="1"/>
+            <p:nvPr/>
+          </p:nvSpPr>
+          <p:spPr>
+            <a:xfrm>
+              <a:off x="2279576" y="2295255"/>
+              <a:ext cx="432048" cy="360040"/>
+            </a:xfrm>
+            <a:prstGeom prst="rect">
+              <a:avLst/>
+            </a:prstGeom>
+            <a:noFill/>
+          </p:spPr>
+          <p:txBody>
+            <a:bodyPr wrap="square" rtlCol="0">
+              <a:noAutofit/>
+            </a:bodyPr>
+            <a:lstStyle/>
+            <a:p>
+              <a:pPr algn="ctr"/>
+              <a:r>
+                <a:rPr lang="en-US" sz="2200" dirty="0" smtClean="0">
+                  <a:solidFill>
+                    <a:schemeClr val="bg1"/>
+                  </a:solidFill>
+                  <a:latin typeface="AA Zuehlke" pitchFamily="2" charset="0"/>
+                </a:rPr>
+                <a:t>3</a:t>
+              </a:r>
+              <a:endParaRPr lang="en-US" sz="2200" dirty="0" smtClean="0">
+                <a:solidFill>
+                  <a:schemeClr val="bg1"/>
+                </a:solidFill>
+                <a:latin typeface="AA Zuehlke" pitchFamily="2" charset="0"/>
+              </a:endParaRPr>
+            </a:p>
+          </p:txBody>
+        </p:sp>
+      </p:grpSp>
+      <p:grpSp>
+        <p:nvGrpSpPr>
+          <p:cNvPr id="36" name="Group 35"/>
+          <p:cNvGrpSpPr/>
+          <p:nvPr/>
+        </p:nvGrpSpPr>
+        <p:grpSpPr>
+          <a:xfrm>
+            <a:off x="6913239" y="2687889"/>
+            <a:ext cx="432048" cy="432048"/>
+            <a:chOff x="2279576" y="2276872"/>
+            <a:chExt cx="432048" cy="432048"/>
+          </a:xfrm>
+        </p:grpSpPr>
+        <p:sp>
+          <p:nvSpPr>
+            <p:cNvPr id="37" name="Rounded Rectangle 36"/>
+            <p:cNvSpPr/>
+            <p:nvPr/>
+          </p:nvSpPr>
+          <p:spPr>
+            <a:xfrm>
+              <a:off x="2279576" y="2276872"/>
+              <a:ext cx="432048" cy="432048"/>
+            </a:xfrm>
+            <a:prstGeom prst="roundRect">
+              <a:avLst/>
+            </a:prstGeom>
+            <a:solidFill>
+              <a:srgbClr val="0070C0"/>
+            </a:solidFill>
+            <a:ln w="76200">
+              <a:noFill/>
+            </a:ln>
+          </p:spPr>
+          <p:style>
+            <a:lnRef idx="2">
+              <a:schemeClr val="accent1">
+                <a:shade val="50000"/>
+              </a:schemeClr>
+            </a:lnRef>
+            <a:fillRef idx="1">
+              <a:schemeClr val="accent1"/>
+            </a:fillRef>
+            <a:effectRef idx="0">
+              <a:schemeClr val="accent1"/>
+            </a:effectRef>
+            <a:fontRef idx="minor">
+              <a:schemeClr val="lt1"/>
+            </a:fontRef>
+          </p:style>
+          <p:txBody>
+            <a:bodyPr rtlCol="0" anchor="ctr"/>
+            <a:lstStyle/>
+            <a:p>
+              <a:pPr algn="ctr"/>
+              <a:endParaRPr lang="en-US" sz="2200" dirty="0" err="1" smtClean="0">
+                <a:ln w="76200">
+                  <a:noFill/>
+                </a:ln>
+                <a:latin typeface="AA Zuehlke" pitchFamily="2" charset="0"/>
+              </a:endParaRPr>
+            </a:p>
+          </p:txBody>
+        </p:sp>
+        <p:sp>
+          <p:nvSpPr>
+            <p:cNvPr id="38" name="TextBox 37"/>
+            <p:cNvSpPr txBox="1"/>
+            <p:nvPr/>
+          </p:nvSpPr>
+          <p:spPr>
+            <a:xfrm>
+              <a:off x="2279576" y="2295255"/>
+              <a:ext cx="432048" cy="360040"/>
+            </a:xfrm>
+            <a:prstGeom prst="rect">
+              <a:avLst/>
+            </a:prstGeom>
+            <a:noFill/>
+          </p:spPr>
+          <p:txBody>
+            <a:bodyPr wrap="square" rtlCol="0">
+              <a:noAutofit/>
+            </a:bodyPr>
+            <a:lstStyle/>
+            <a:p>
+              <a:pPr algn="ctr"/>
+              <a:r>
+                <a:rPr lang="en-US" sz="2200" dirty="0" smtClean="0">
+                  <a:solidFill>
+                    <a:schemeClr val="bg1"/>
+                  </a:solidFill>
+                  <a:latin typeface="AA Zuehlke" pitchFamily="2" charset="0"/>
+                </a:rPr>
+                <a:t>4</a:t>
+              </a:r>
+              <a:endParaRPr lang="en-US" sz="2200" dirty="0" smtClean="0">
+                <a:solidFill>
+                  <a:schemeClr val="bg1"/>
+                </a:solidFill>
+                <a:latin typeface="AA Zuehlke" pitchFamily="2" charset="0"/>
+              </a:endParaRPr>
+            </a:p>
+          </p:txBody>
+        </p:sp>
+      </p:grpSp>
+      <p:cxnSp>
+        <p:nvCxnSpPr>
+          <p:cNvPr id="39" name="Straight Arrow Connector 38"/>
+          <p:cNvCxnSpPr/>
+          <p:nvPr/>
+        </p:nvCxnSpPr>
+        <p:spPr>
+          <a:xfrm>
+            <a:off x="5015878" y="2903913"/>
+            <a:ext cx="344422" cy="0"/>
+          </a:xfrm>
+          <a:prstGeom prst="straightConnector1">
+            <a:avLst/>
+          </a:prstGeom>
+          <a:ln w="25400">
+            <a:solidFill>
+              <a:schemeClr val="tx2"/>
+            </a:solidFill>
+            <a:tailEnd type="triangle"/>
+          </a:ln>
+        </p:spPr>
+        <p:style>
+          <a:lnRef idx="1">
+            <a:schemeClr val="accent1"/>
+          </a:lnRef>
+          <a:fillRef idx="0">
+            <a:schemeClr val="accent1"/>
+          </a:fillRef>
+          <a:effectRef idx="0">
+            <a:schemeClr val="accent1"/>
+          </a:effectRef>
+          <a:fontRef idx="minor">
+            <a:schemeClr val="tx1"/>
+          </a:fontRef>
+        </p:style>
+      </p:cxnSp>
+      <p:cxnSp>
+        <p:nvCxnSpPr>
+          <p:cNvPr id="40" name="Straight Arrow Connector 39"/>
+          <p:cNvCxnSpPr/>
+          <p:nvPr/>
+        </p:nvCxnSpPr>
+        <p:spPr>
+          <a:xfrm>
+            <a:off x="5792348" y="2903913"/>
+            <a:ext cx="344422" cy="0"/>
+          </a:xfrm>
+          <a:prstGeom prst="straightConnector1">
+            <a:avLst/>
+          </a:prstGeom>
+          <a:ln w="25400">
+            <a:solidFill>
+              <a:schemeClr val="tx2"/>
+            </a:solidFill>
+            <a:tailEnd type="triangle"/>
+          </a:ln>
+        </p:spPr>
+        <p:style>
+          <a:lnRef idx="1">
+            <a:schemeClr val="accent1"/>
+          </a:lnRef>
+          <a:fillRef idx="0">
+            <a:schemeClr val="accent1"/>
+          </a:fillRef>
+          <a:effectRef idx="0">
+            <a:schemeClr val="accent1"/>
+          </a:effectRef>
+          <a:fontRef idx="minor">
+            <a:schemeClr val="tx1"/>
+          </a:fontRef>
+        </p:style>
+      </p:cxnSp>
+      <p:cxnSp>
+        <p:nvCxnSpPr>
+          <p:cNvPr id="41" name="Straight Arrow Connector 40"/>
+          <p:cNvCxnSpPr/>
+          <p:nvPr/>
+        </p:nvCxnSpPr>
+        <p:spPr>
+          <a:xfrm>
+            <a:off x="6568817" y="2903913"/>
+            <a:ext cx="344422" cy="0"/>
+          </a:xfrm>
+          <a:prstGeom prst="straightConnector1">
+            <a:avLst/>
+          </a:prstGeom>
+          <a:ln w="25400">
+            <a:solidFill>
+              <a:schemeClr val="tx2"/>
+            </a:solidFill>
+            <a:tailEnd type="triangle"/>
+          </a:ln>
+        </p:spPr>
+        <p:style>
+          <a:lnRef idx="1">
+            <a:schemeClr val="accent1"/>
+          </a:lnRef>
+          <a:fillRef idx="0">
+            <a:schemeClr val="accent1"/>
+          </a:fillRef>
+          <a:effectRef idx="0">
+            <a:schemeClr val="accent1"/>
+          </a:effectRef>
+          <a:fontRef idx="minor">
+            <a:schemeClr val="tx1"/>
+          </a:fontRef>
+        </p:style>
+      </p:cxnSp>
+      <p:sp>
+        <p:nvSpPr>
+          <p:cNvPr id="42" name="Arc 41"/>
+          <p:cNvSpPr/>
+          <p:nvPr/>
+        </p:nvSpPr>
+        <p:spPr>
+          <a:xfrm rot="2614041">
+            <a:off x="6589402" y="1762602"/>
+            <a:ext cx="1463190" cy="1643957"/>
+          </a:xfrm>
+          <a:prstGeom prst="arc">
+            <a:avLst/>
+          </a:prstGeom>
+          <a:ln w="57150">
+            <a:solidFill>
+              <a:srgbClr val="FFC000"/>
+            </a:solidFill>
+            <a:headEnd type="none" w="med" len="med"/>
+            <a:tailEnd type="triangle" w="med" len="med"/>
+          </a:ln>
+        </p:spPr>
+        <p:style>
+          <a:lnRef idx="1">
+            <a:schemeClr val="accent1"/>
+          </a:lnRef>
+          <a:fillRef idx="0">
+            <a:schemeClr val="accent1"/>
+          </a:fillRef>
+          <a:effectRef idx="0">
+            <a:schemeClr val="accent1"/>
+          </a:effectRef>
+          <a:fontRef idx="minor">
+            <a:schemeClr val="tx1"/>
+          </a:fontRef>
+        </p:style>
+        <p:txBody>
+          <a:bodyPr rtlCol="0" anchor="ctr"/>
+          <a:lstStyle/>
+          <a:p>
+            <a:pPr algn="ctr"/>
+            <a:endParaRPr lang="en-US"/>
+          </a:p>
+        </p:txBody>
+      </p:sp>
+      <p:sp>
+        <p:nvSpPr>
+          <p:cNvPr id="43" name="TextBox 42"/>
+          <p:cNvSpPr txBox="1"/>
+          <p:nvPr/>
+        </p:nvSpPr>
+        <p:spPr>
+          <a:xfrm>
+            <a:off x="8203119" y="2280316"/>
+            <a:ext cx="894320" cy="360040"/>
+          </a:xfrm>
+          <a:prstGeom prst="rect">
+            <a:avLst/>
+          </a:prstGeom>
+          <a:noFill/>
+        </p:spPr>
+        <p:txBody>
+          <a:bodyPr wrap="square" rtlCol="0">
+            <a:noAutofit/>
+          </a:bodyPr>
+          <a:lstStyle/>
+          <a:p>
+            <a:r>
+              <a:rPr lang="en-US" sz="2200" smtClean="0">
+                <a:latin typeface="AA Zuehlke" pitchFamily="2" charset="0"/>
+              </a:rPr>
+              <a:t>filter</a:t>
+            </a:r>
+            <a:endParaRPr lang="en-US" sz="2200" dirty="0" smtClean="0">
+              <a:latin typeface="AA Zuehlke" pitchFamily="2" charset="0"/>
+            </a:endParaRPr>
           </a:p>
         </p:txBody>
       </p:sp>
@@ -6551,13 +7796,8 @@
             <a:pPr lvl="1"/>
             <a:r>
               <a:rPr lang="en-US" dirty="0" smtClean="0"/>
-              <a:t>Compute the sum (fold/reduce</a:t>
-            </a:r>
-            <a:r>
-              <a:rPr lang="en-US" dirty="0" smtClean="0"/>
-              <a:t>)</a:t>
-            </a:r>
-            <a:endParaRPr lang="en-US" dirty="0" smtClean="0"/>
+              <a:t>Compute the sum (fold/reduce)</a:t>
+            </a:r>
           </a:p>
           <a:p>
             <a:pPr lvl="1"/>
@@ -6705,7 +7945,6 @@
               <a:rPr lang="en-US" dirty="0" smtClean="0"/>
               <a:t>Suggestions</a:t>
             </a:r>
-            <a:endParaRPr lang="en-US" dirty="0" smtClean="0"/>
           </a:p>
           <a:p>
             <a:pPr lvl="1"/>
@@ -7096,11 +8335,7 @@
             </a:pPr>
             <a:r>
               <a:rPr lang="en-US" dirty="0" smtClean="0"/>
-              <a:t>add some functionality related to the wrapped </a:t>
-            </a:r>
-            <a:r>
-              <a:rPr lang="en-US" dirty="0" smtClean="0"/>
-              <a:t>type</a:t>
+              <a:t>add some functionality related to the wrapped type</a:t>
             </a:r>
           </a:p>
           <a:p>
@@ -7110,7 +8345,19 @@
             </a:pPr>
             <a:r>
               <a:rPr lang="en-US" dirty="0" smtClean="0"/>
-              <a:t>provide a context for some value(s)</a:t>
+              <a:t>“</a:t>
+            </a:r>
+            <a:r>
+              <a:rPr lang="en-US" dirty="0" smtClean="0"/>
+              <a:t>provide </a:t>
+            </a:r>
+            <a:r>
+              <a:rPr lang="en-US" dirty="0" smtClean="0"/>
+              <a:t>a context for some value(s</a:t>
+            </a:r>
+            <a:r>
+              <a:rPr lang="en-US" dirty="0" smtClean="0"/>
+              <a:t>)”</a:t>
             </a:r>
             <a:endParaRPr lang="en-US" dirty="0" smtClean="0"/>
           </a:p>
@@ -7134,15 +8381,7 @@
             </a:pPr>
             <a:r>
               <a:rPr lang="en-US" dirty="0" smtClean="0"/>
-              <a:t>List</a:t>
-            </a:r>
-            <a:r>
-              <a:rPr lang="en-US" dirty="0" smtClean="0"/>
-              <a:t>[T</a:t>
-            </a:r>
-            <a:r>
-              <a:rPr lang="en-US" dirty="0" smtClean="0"/>
-              <a:t>]: combines multiple values of the wrapped type</a:t>
+              <a:t>List[T]: combines multiple values of the wrapped type</a:t>
             </a:r>
             <a:endParaRPr lang="en-US" dirty="0"/>
           </a:p>
@@ -7171,11 +8410,7 @@
             </a:pPr>
             <a:r>
               <a:rPr lang="en-US" dirty="0" smtClean="0"/>
-              <a:t>Future[T]: provides asynchronous computation of a </a:t>
-            </a:r>
-            <a:r>
-              <a:rPr lang="en-US" dirty="0" smtClean="0"/>
-              <a:t>value</a:t>
+              <a:t>Future[T]: provides asynchronous computation of a value</a:t>
             </a:r>
             <a:endParaRPr lang="en-US" dirty="0"/>
           </a:p>
@@ -7208,7 +8443,7 @@
           <a:p>
             <a:r>
               <a:rPr lang="en-US" dirty="0" smtClean="0"/>
-              <a:t>Container Types</a:t>
+              <a:t>Context Types</a:t>
             </a:r>
             <a:endParaRPr lang="en-US" dirty="0"/>
           </a:p>
@@ -7362,6 +8597,80 @@
           </a:p>
         </p:txBody>
       </p:sp>
+      <p:sp>
+        <p:nvSpPr>
+          <p:cNvPr id="11" name="TextBox 10"/>
+          <p:cNvSpPr txBox="1"/>
+          <p:nvPr/>
+        </p:nvSpPr>
+        <p:spPr>
+          <a:xfrm>
+            <a:off x="9007809" y="1070232"/>
+            <a:ext cx="1584176" cy="360040"/>
+          </a:xfrm>
+          <a:prstGeom prst="rect">
+            <a:avLst/>
+          </a:prstGeom>
+          <a:noFill/>
+        </p:spPr>
+        <p:txBody>
+          <a:bodyPr wrap="square" rtlCol="0">
+            <a:noAutofit/>
+          </a:bodyPr>
+          <a:lstStyle/>
+          <a:p>
+            <a:r>
+              <a:rPr lang="en-US" sz="2200" dirty="0" smtClean="0">
+                <a:latin typeface="AA Zuehlke" pitchFamily="2" charset="0"/>
+              </a:rPr>
+              <a:t>Context</a:t>
+            </a:r>
+            <a:endParaRPr lang="en-US" sz="2200" dirty="0" smtClean="0">
+              <a:latin typeface="AA Zuehlke" pitchFamily="2" charset="0"/>
+            </a:endParaRPr>
+          </a:p>
+        </p:txBody>
+      </p:sp>
+      <p:sp>
+        <p:nvSpPr>
+          <p:cNvPr id="12" name="TextBox 11"/>
+          <p:cNvSpPr txBox="1"/>
+          <p:nvPr/>
+        </p:nvSpPr>
+        <p:spPr>
+          <a:xfrm>
+            <a:off x="9079817" y="1934328"/>
+            <a:ext cx="1584176" cy="360040"/>
+          </a:xfrm>
+          <a:prstGeom prst="rect">
+            <a:avLst/>
+          </a:prstGeom>
+          <a:noFill/>
+        </p:spPr>
+        <p:txBody>
+          <a:bodyPr wrap="square" rtlCol="0">
+            <a:noAutofit/>
+          </a:bodyPr>
+          <a:lstStyle/>
+          <a:p>
+            <a:r>
+              <a:rPr lang="en-US" sz="2200" dirty="0" smtClean="0">
+                <a:solidFill>
+                  <a:schemeClr val="bg1"/>
+                </a:solidFill>
+                <a:latin typeface="AA Zuehlke" pitchFamily="2" charset="0"/>
+              </a:rPr>
+              <a:t>Value</a:t>
+            </a:r>
+            <a:endParaRPr lang="en-US" sz="2200" dirty="0" smtClean="0">
+              <a:solidFill>
+                <a:schemeClr val="bg1"/>
+              </a:solidFill>
+              <a:latin typeface="AA Zuehlke" pitchFamily="2" charset="0"/>
+            </a:endParaRPr>
+          </a:p>
+        </p:txBody>
+      </p:sp>
     </p:spTree>
     <p:extLst>
       <p:ext uri="{BB962C8B-B14F-4D97-AF65-F5344CB8AC3E}">
@@ -7467,11 +8776,7 @@
             </a:r>
             <a:r>
               <a:rPr lang="en-US" dirty="0" smtClean="0"/>
-              <a:t>(name: String): </a:t>
-            </a:r>
-            <a:r>
-              <a:rPr lang="en-US" dirty="0" smtClean="0"/>
-              <a:t>Option[User]</a:t>
+              <a:t>(name: String): Option[User]</a:t>
             </a:r>
           </a:p>
           <a:p>
@@ -7480,11 +8785,7 @@
           <a:p>
             <a:r>
               <a:rPr lang="en-US" dirty="0" err="1" smtClean="0"/>
-              <a:t>v</a:t>
-            </a:r>
-            <a:r>
-              <a:rPr lang="en-US" dirty="0" err="1" smtClean="0"/>
-              <a:t>al</a:t>
+              <a:t>val</a:t>
             </a:r>
             <a:r>
               <a:rPr lang="en-US" dirty="0" smtClean="0"/>
@@ -7492,7 +8793,7 @@
             </a:r>
             <a:r>
               <a:rPr lang="en-US" dirty="0" err="1" smtClean="0"/>
-              <a:t>loadUser</a:t>
+              <a:t>findUser</a:t>
             </a:r>
             <a:r>
               <a:rPr lang="en-US" dirty="0" smtClean="0"/>
@@ -7537,7 +8838,7 @@
             </a:r>
             <a:r>
               <a:rPr lang="en-US" dirty="0" err="1" smtClean="0"/>
-              <a:t>loadUser</a:t>
+              <a:t>findUser</a:t>
             </a:r>
             <a:r>
               <a:rPr lang="en-US" dirty="0" smtClean="0"/>
@@ -7765,9 +9066,6 @@
               </a:rPr>
               <a:t>Option</a:t>
             </a:r>
-            <a:endParaRPr lang="en-US" sz="2200" dirty="0" smtClean="0">
-              <a:latin typeface="AA Zuehlke" pitchFamily="2" charset="0"/>
-            </a:endParaRPr>
           </a:p>
         </p:txBody>
       </p:sp>
@@ -7802,12 +9100,6 @@
               </a:rPr>
               <a:t>User</a:t>
             </a:r>
-            <a:endParaRPr lang="en-US" sz="2200" dirty="0" smtClean="0">
-              <a:solidFill>
-                <a:schemeClr val="bg1"/>
-              </a:solidFill>
-              <a:latin typeface="AA Zuehlke" pitchFamily="2" charset="0"/>
-            </a:endParaRPr>
           </a:p>
         </p:txBody>
       </p:sp>
@@ -7821,11 +9113,11 @@
   <p:clrMapOvr>
     <a:masterClrMapping/>
   </p:clrMapOvr>
-  <mc:AlternateContent xmlns:mc="http://schemas.openxmlformats.org/markup-compatibility/2006">
-    <mc:Choice xmlns:p14="http://schemas.microsoft.com/office/powerpoint/2010/main" Requires="p14">
+  <mc:AlternateContent xmlns:mc="http://schemas.openxmlformats.org/markup-compatibility/2006" xmlns:p14="http://schemas.microsoft.com/office/powerpoint/2010/main">
+    <mc:Choice Requires="p14">
       <p:transition spd="slow" p14:dur="2000"/>
     </mc:Choice>
-    <mc:Fallback>
+    <mc:Fallback xmlns="">
       <p:transition spd="slow"/>
     </mc:Fallback>
   </mc:AlternateContent>
@@ -7900,8 +9192,8 @@
               <a:t>john = </a:t>
             </a:r>
             <a:r>
-              <a:rPr lang="en-US" dirty="0" err="1"/>
-              <a:t>loadUser</a:t>
+              <a:rPr lang="en-US" dirty="0" err="1" smtClean="0"/>
+              <a:t>findUser</a:t>
             </a:r>
             <a:r>
               <a:rPr lang="en-US" dirty="0"/>
@@ -7957,8 +9249,8 @@
               <a:t> = </a:t>
             </a:r>
             <a:r>
-              <a:rPr lang="en-US" dirty="0" err="1"/>
-              <a:t>loadUser</a:t>
+              <a:rPr lang="en-US" dirty="0" err="1" smtClean="0"/>
+              <a:t>findUser</a:t>
             </a:r>
             <a:r>
               <a:rPr lang="en-US" dirty="0"/>
@@ -8204,9 +9496,6 @@
               </a:rPr>
               <a:t>Option</a:t>
             </a:r>
-            <a:endParaRPr lang="en-US" sz="2200" dirty="0" smtClean="0">
-              <a:latin typeface="AA Zuehlke" pitchFamily="2" charset="0"/>
-            </a:endParaRPr>
           </a:p>
         </p:txBody>
       </p:sp>
@@ -8241,12 +9530,6 @@
               </a:rPr>
               <a:t>User</a:t>
             </a:r>
-            <a:endParaRPr lang="en-US" sz="2200" dirty="0" smtClean="0">
-              <a:solidFill>
-                <a:schemeClr val="bg1"/>
-              </a:solidFill>
-              <a:latin typeface="AA Zuehlke" pitchFamily="2" charset="0"/>
-            </a:endParaRPr>
           </a:p>
         </p:txBody>
       </p:sp>
@@ -8422,12 +9705,6 @@
               </a:rPr>
               <a:t>User</a:t>
             </a:r>
-            <a:endParaRPr lang="en-US" sz="2200" dirty="0" smtClean="0">
-              <a:solidFill>
-                <a:schemeClr val="bg1"/>
-              </a:solidFill>
-              <a:latin typeface="AA Zuehlke" pitchFamily="2" charset="0"/>
-            </a:endParaRPr>
           </a:p>
         </p:txBody>
       </p:sp>
@@ -8601,9 +9878,6 @@
               </a:rPr>
               <a:t>Option</a:t>
             </a:r>
-            <a:endParaRPr lang="en-US" sz="2200" dirty="0" smtClean="0">
-              <a:latin typeface="AA Zuehlke" pitchFamily="2" charset="0"/>
-            </a:endParaRPr>
           </a:p>
         </p:txBody>
       </p:sp>
@@ -8720,9 +9994,6 @@
               </a:rPr>
               <a:t>map</a:t>
             </a:r>
-            <a:endParaRPr lang="en-US" sz="2200" dirty="0" smtClean="0">
-              <a:latin typeface="AA Zuehlke" pitchFamily="2" charset="0"/>
-            </a:endParaRPr>
           </a:p>
         </p:txBody>
       </p:sp>
@@ -8736,11 +10007,11 @@
   <p:clrMapOvr>
     <a:masterClrMapping/>
   </p:clrMapOvr>
-  <mc:AlternateContent xmlns:mc="http://schemas.openxmlformats.org/markup-compatibility/2006">
-    <mc:Choice xmlns:p14="http://schemas.microsoft.com/office/powerpoint/2010/main" Requires="p14">
+  <mc:AlternateContent xmlns:mc="http://schemas.openxmlformats.org/markup-compatibility/2006" xmlns:p14="http://schemas.microsoft.com/office/powerpoint/2010/main">
+    <mc:Choice Requires="p14">
       <p:transition spd="slow" p14:dur="2000"/>
     </mc:Choice>
-    <mc:Fallback>
+    <mc:Fallback xmlns="">
       <p:transition spd="slow"/>
     </mc:Fallback>
   </mc:AlternateContent>
@@ -8826,7 +10097,6 @@
               <a:rPr lang="de-CH" dirty="0" smtClean="0"/>
               <a:t>:</a:t>
             </a:r>
-            <a:endParaRPr lang="de-CH" dirty="0" smtClean="0"/>
           </a:p>
           <a:p>
             <a:pPr marL="342900" indent="-342900">
@@ -8965,11 +10235,7 @@
             </a:r>
             <a:r>
               <a:rPr lang="de-CH" dirty="0" smtClean="0"/>
-              <a:t> </a:t>
-            </a:r>
-            <a:r>
-              <a:rPr lang="de-CH" dirty="0" smtClean="0"/>
-              <a:t>OO.</a:t>
+              <a:t> OO.</a:t>
             </a:r>
           </a:p>
           <a:p>
@@ -9289,7 +10555,7 @@
             </a:r>
             <a:r>
               <a:rPr lang="en-US" dirty="0" err="1" smtClean="0"/>
-              <a:t>loadOrder</a:t>
+              <a:t>findOrder</a:t>
             </a:r>
             <a:r>
               <a:rPr lang="en-US" dirty="0" smtClean="0"/>
@@ -9333,8 +10599,8 @@
               <a:t>john = </a:t>
             </a:r>
             <a:r>
-              <a:rPr lang="en-US" dirty="0" err="1"/>
-              <a:t>loadUser</a:t>
+              <a:rPr lang="en-US" dirty="0" err="1" smtClean="0"/>
+              <a:t>findUser</a:t>
             </a:r>
             <a:r>
               <a:rPr lang="en-US" dirty="0"/>
@@ -9343,21 +10609,26 @@
           </a:p>
           <a:p>
             <a:r>
-              <a:rPr lang="en-US" dirty="0" err="1"/>
-              <a:t>john.map</a:t>
+              <a:rPr lang="en-US" dirty="0" err="1" smtClean="0"/>
+              <a:t>john.flatMap</a:t>
+            </a:r>
+            <a:r>
+              <a:rPr lang="en-US" dirty="0" smtClean="0"/>
+              <a:t>(user </a:t>
             </a:r>
             <a:r>
               <a:rPr lang="en-US" dirty="0"/>
-              <a:t>(user =&gt; </a:t>
+              <a:t>=&gt; </a:t>
             </a:r>
             <a:r>
               <a:rPr lang="en-US" dirty="0" err="1" smtClean="0"/>
-              <a:t>loadOrder</a:t>
+              <a:t>findOrder</a:t>
             </a:r>
             <a:r>
               <a:rPr lang="en-US" dirty="0" smtClean="0"/>
-              <a:t>(user.id)</a:t>
-            </a:r>
+              <a:t>(user.id))</a:t>
+            </a:r>
+            <a:endParaRPr lang="en-US" dirty="0" smtClean="0"/>
           </a:p>
           <a:p>
             <a:endParaRPr lang="en-US" dirty="0"/>
@@ -9380,8 +10651,8 @@
               <a:t> = </a:t>
             </a:r>
             <a:r>
-              <a:rPr lang="en-US" dirty="0" err="1"/>
-              <a:t>loadUser</a:t>
+              <a:rPr lang="en-US" dirty="0" err="1" smtClean="0"/>
+              <a:t>findUser</a:t>
             </a:r>
             <a:r>
               <a:rPr lang="en-US" dirty="0"/>
@@ -9390,20 +10661,28 @@
           </a:p>
           <a:p>
             <a:r>
-              <a:rPr lang="en-US" dirty="0" err="1"/>
-              <a:t>elvis.map</a:t>
+              <a:rPr lang="en-US" dirty="0" err="1" smtClean="0"/>
+              <a:t>elvis.flatMap</a:t>
+            </a:r>
+            <a:r>
+              <a:rPr lang="en-US" dirty="0" smtClean="0"/>
+              <a:t>(user </a:t>
             </a:r>
             <a:r>
               <a:rPr lang="en-US" dirty="0"/>
-              <a:t>(user =&gt; </a:t>
+              <a:t>=&gt; </a:t>
             </a:r>
             <a:r>
               <a:rPr lang="en-US" dirty="0" err="1" smtClean="0"/>
-              <a:t>loadOrder</a:t>
+              <a:t>findOrder</a:t>
             </a:r>
             <a:r>
               <a:rPr lang="en-US" dirty="0" smtClean="0"/>
-              <a:t>(user.id))</a:t>
+              <a:t>(user.id</a:t>
+            </a:r>
+            <a:r>
+              <a:rPr lang="en-US" dirty="0" smtClean="0"/>
+              <a:t>))</a:t>
             </a:r>
             <a:endParaRPr lang="en-US" dirty="0"/>
           </a:p>
@@ -9618,9 +10897,6 @@
               </a:rPr>
               <a:t>Option</a:t>
             </a:r>
-            <a:endParaRPr lang="en-US" sz="2200" dirty="0" smtClean="0">
-              <a:latin typeface="AA Zuehlke" pitchFamily="2" charset="0"/>
-            </a:endParaRPr>
           </a:p>
         </p:txBody>
       </p:sp>
@@ -9655,12 +10931,6 @@
               </a:rPr>
               <a:t>User</a:t>
             </a:r>
-            <a:endParaRPr lang="en-US" sz="2200" dirty="0" smtClean="0">
-              <a:solidFill>
-                <a:schemeClr val="bg1"/>
-              </a:solidFill>
-              <a:latin typeface="AA Zuehlke" pitchFamily="2" charset="0"/>
-            </a:endParaRPr>
           </a:p>
         </p:txBody>
       </p:sp>
@@ -9836,12 +11106,6 @@
               </a:rPr>
               <a:t>User</a:t>
             </a:r>
-            <a:endParaRPr lang="en-US" sz="2200" dirty="0" smtClean="0">
-              <a:solidFill>
-                <a:schemeClr val="bg1"/>
-              </a:solidFill>
-              <a:latin typeface="AA Zuehlke" pitchFamily="2" charset="0"/>
-            </a:endParaRPr>
           </a:p>
         </p:txBody>
       </p:sp>
@@ -9876,12 +11140,6 @@
               </a:rPr>
               <a:t>Order</a:t>
             </a:r>
-            <a:endParaRPr lang="en-US" sz="2200" dirty="0" smtClean="0">
-              <a:solidFill>
-                <a:schemeClr val="bg1"/>
-              </a:solidFill>
-              <a:latin typeface="AA Zuehlke" pitchFamily="2" charset="0"/>
-            </a:endParaRPr>
           </a:p>
         </p:txBody>
       </p:sp>
@@ -10015,9 +11273,6 @@
               </a:rPr>
               <a:t>Option</a:t>
             </a:r>
-            <a:endParaRPr lang="en-US" sz="2200" dirty="0" smtClean="0">
-              <a:latin typeface="AA Zuehlke" pitchFamily="2" charset="0"/>
-            </a:endParaRPr>
           </a:p>
         </p:txBody>
       </p:sp>
@@ -10052,12 +11307,6 @@
               </a:rPr>
               <a:t>Order</a:t>
             </a:r>
-            <a:endParaRPr lang="en-US" sz="2200" dirty="0" smtClean="0">
-              <a:solidFill>
-                <a:schemeClr val="bg1"/>
-              </a:solidFill>
-              <a:latin typeface="AA Zuehlke" pitchFamily="2" charset="0"/>
-            </a:endParaRPr>
           </a:p>
         </p:txBody>
       </p:sp>
@@ -10201,11 +11450,11 @@
   <p:clrMapOvr>
     <a:masterClrMapping/>
   </p:clrMapOvr>
-  <mc:AlternateContent xmlns:mc="http://schemas.openxmlformats.org/markup-compatibility/2006">
-    <mc:Choice xmlns:p14="http://schemas.microsoft.com/office/powerpoint/2010/main" Requires="p14">
+  <mc:AlternateContent xmlns:mc="http://schemas.openxmlformats.org/markup-compatibility/2006" xmlns:p14="http://schemas.microsoft.com/office/powerpoint/2010/main">
+    <mc:Choice Requires="p14">
       <p:transition spd="slow" p14:dur="2000"/>
     </mc:Choice>
-    <mc:Fallback>
+    <mc:Fallback xmlns="">
       <p:transition spd="slow"/>
     </mc:Fallback>
   </mc:AlternateContent>
@@ -10288,11 +11537,7 @@
             </a:pPr>
             <a:r>
               <a:rPr lang="en-US" dirty="0" smtClean="0"/>
-              <a:t>Used </a:t>
-            </a:r>
-            <a:r>
-              <a:rPr lang="en-US" dirty="0" smtClean="0"/>
-              <a:t>instead of throwing exceptions</a:t>
+              <a:t>Used instead of throwing exceptions</a:t>
             </a:r>
           </a:p>
           <a:p>
@@ -10333,18 +11578,12 @@
               <a:rPr lang="en-US" dirty="0" smtClean="0"/>
               <a:t>(1)</a:t>
             </a:r>
-            <a:endParaRPr lang="en-US" dirty="0" smtClean="0"/>
           </a:p>
           <a:p>
             <a:r>
               <a:rPr lang="en-US" dirty="0" smtClean="0"/>
-              <a:t>&gt; res0: Try[User] = </a:t>
-            </a:r>
-            <a:r>
-              <a:rPr lang="en-US" dirty="0" smtClean="0"/>
-              <a:t>Success(User(1, “John”))</a:t>
-            </a:r>
-            <a:endParaRPr lang="en-US" dirty="0" smtClean="0"/>
+              <a:t>&gt; res0: Try[User] = Success(User(1, “John”))</a:t>
+            </a:r>
           </a:p>
           <a:p>
             <a:r>
@@ -10355,26 +11594,12 @@
               <a:rPr lang="en-US" dirty="0" smtClean="0"/>
               <a:t>(1000)</a:t>
             </a:r>
-            <a:endParaRPr lang="en-US" dirty="0" smtClean="0"/>
           </a:p>
           <a:p>
             <a:r>
               <a:rPr lang="en-US" dirty="0" smtClean="0"/>
-              <a:t>&gt; </a:t>
-            </a:r>
-            <a:r>
-              <a:rPr lang="en-US" dirty="0" smtClean="0"/>
-              <a:t>res1: </a:t>
-            </a:r>
-            <a:r>
-              <a:rPr lang="en-US" dirty="0" smtClean="0"/>
-              <a:t>Try[User] = Failure(Exception(«user </a:t>
-            </a:r>
-            <a:r>
-              <a:rPr lang="en-US" dirty="0" smtClean="0"/>
-              <a:t>does not exist»))</a:t>
-            </a:r>
-            <a:endParaRPr lang="en-US" dirty="0" smtClean="0"/>
+              <a:t>&gt; res1: Try[User] = Failure(Exception(«user does not exist»))</a:t>
+            </a:r>
           </a:p>
           <a:p>
             <a:pPr marL="0" indent="0">
@@ -10579,9 +11804,6 @@
               </a:rPr>
               <a:t>Try</a:t>
             </a:r>
-            <a:endParaRPr lang="en-US" sz="2200" dirty="0" smtClean="0">
-              <a:latin typeface="AA Zuehlke" pitchFamily="2" charset="0"/>
-            </a:endParaRPr>
           </a:p>
         </p:txBody>
       </p:sp>
@@ -10616,12 +11838,6 @@
               </a:rPr>
               <a:t>User</a:t>
             </a:r>
-            <a:endParaRPr lang="en-US" sz="2200" dirty="0" smtClean="0">
-              <a:solidFill>
-                <a:schemeClr val="bg1"/>
-              </a:solidFill>
-              <a:latin typeface="AA Zuehlke" pitchFamily="2" charset="0"/>
-            </a:endParaRPr>
           </a:p>
         </p:txBody>
       </p:sp>
@@ -10635,11 +11851,11 @@
   <p:clrMapOvr>
     <a:masterClrMapping/>
   </p:clrMapOvr>
-  <mc:AlternateContent xmlns:mc="http://schemas.openxmlformats.org/markup-compatibility/2006">
-    <mc:Choice xmlns:p14="http://schemas.microsoft.com/office/powerpoint/2010/main" Requires="p14">
+  <mc:AlternateContent xmlns:mc="http://schemas.openxmlformats.org/markup-compatibility/2006" xmlns:p14="http://schemas.microsoft.com/office/powerpoint/2010/main">
+    <mc:Choice Requires="p14">
       <p:transition spd="slow" p14:dur="2000"/>
     </mc:Choice>
-    <mc:Fallback>
+    <mc:Fallback xmlns="">
       <p:transition spd="slow"/>
     </mc:Fallback>
   </mc:AlternateContent>
@@ -10910,9 +12126,6 @@
               </a:rPr>
               <a:t>Future</a:t>
             </a:r>
-            <a:endParaRPr lang="en-US" sz="2200" dirty="0" smtClean="0">
-              <a:latin typeface="AA Zuehlke" pitchFamily="2" charset="0"/>
-            </a:endParaRPr>
           </a:p>
         </p:txBody>
       </p:sp>
@@ -10947,12 +12160,6 @@
               </a:rPr>
               <a:t>User</a:t>
             </a:r>
-            <a:endParaRPr lang="en-US" sz="2200" dirty="0" smtClean="0">
-              <a:solidFill>
-                <a:schemeClr val="bg1"/>
-              </a:solidFill>
-              <a:latin typeface="AA Zuehlke" pitchFamily="2" charset="0"/>
-            </a:endParaRPr>
           </a:p>
         </p:txBody>
       </p:sp>
@@ -10966,11 +12173,11 @@
   <p:clrMapOvr>
     <a:masterClrMapping/>
   </p:clrMapOvr>
-  <mc:AlternateContent xmlns:mc="http://schemas.openxmlformats.org/markup-compatibility/2006">
-    <mc:Choice xmlns:p14="http://schemas.microsoft.com/office/powerpoint/2010/main" Requires="p14">
+  <mc:AlternateContent xmlns:mc="http://schemas.openxmlformats.org/markup-compatibility/2006" xmlns:p14="http://schemas.microsoft.com/office/powerpoint/2010/main">
+    <mc:Choice Requires="p14">
       <p:transition spd="slow" p14:dur="2000"/>
     </mc:Choice>
-    <mc:Fallback>
+    <mc:Fallback xmlns="">
       <p:transition spd="slow"/>
     </mc:Fallback>
   </mc:AlternateContent>
@@ -11045,6 +12252,13 @@
               <a:buFont typeface="Arial" panose="020B0604020202020204" pitchFamily="34" charset="0"/>
               <a:buChar char="•"/>
             </a:pPr>
+            <a:endParaRPr lang="en-US" dirty="0" smtClean="0"/>
+          </a:p>
+          <a:p>
+            <a:r>
+              <a:rPr lang="en-US" dirty="0" smtClean="0"/>
+              <a:t>Java 8 Support:</a:t>
+            </a:r>
             <a:endParaRPr lang="en-US" dirty="0"/>
           </a:p>
           <a:p>
@@ -11054,7 +12268,7 @@
             </a:pPr>
             <a:r>
               <a:rPr lang="en-US" dirty="0" smtClean="0"/>
-              <a:t>Good language support for Option/Optional/Maybe</a:t>
+              <a:t>Optional</a:t>
             </a:r>
           </a:p>
           <a:p>
@@ -11063,24 +12277,42 @@
               <a:buChar char="•"/>
             </a:pPr>
             <a:r>
+              <a:rPr lang="en-US" dirty="0" err="1" smtClean="0"/>
+              <a:t>CompletableFuture</a:t>
+            </a:r>
+            <a:r>
               <a:rPr lang="en-US" dirty="0" smtClean="0"/>
-              <a:t>Try is less widely supported</a:t>
-            </a:r>
-          </a:p>
-          <a:p>
-            <a:pPr marL="342900" indent="-342900">
-              <a:buFont typeface="Arial" panose="020B0604020202020204" pitchFamily="34" charset="0"/>
-              <a:buChar char="•"/>
-            </a:pPr>
+              <a:t>: </a:t>
+            </a:r>
             <a:r>
               <a:rPr lang="en-US" dirty="0" err="1" smtClean="0"/>
-              <a:t>Composable</a:t>
+              <a:t>thenApply</a:t>
+            </a:r>
+            <a:r>
+              <a:rPr lang="en-US" dirty="0"/>
+              <a:t> </a:t>
             </a:r>
             <a:r>
               <a:rPr lang="en-US" dirty="0" smtClean="0"/>
-              <a:t> Future still missing in Java</a:t>
-            </a:r>
-            <a:endParaRPr lang="en-US" dirty="0"/>
+              <a:t>(map), </a:t>
+            </a:r>
+            <a:r>
+              <a:rPr lang="en-US" dirty="0" err="1" smtClean="0"/>
+              <a:t>thenCompose</a:t>
+            </a:r>
+            <a:r>
+              <a:rPr lang="en-US" dirty="0" smtClean="0"/>
+              <a:t> (</a:t>
+            </a:r>
+            <a:r>
+              <a:rPr lang="en-US" dirty="0" err="1" smtClean="0"/>
+              <a:t>flatMap</a:t>
+            </a:r>
+            <a:r>
+              <a:rPr lang="en-US" dirty="0" smtClean="0"/>
+              <a:t>)</a:t>
+            </a:r>
+            <a:endParaRPr lang="en-US" dirty="0" smtClean="0"/>
           </a:p>
         </p:txBody>
       </p:sp>
@@ -11771,21 +13003,107 @@
           <a:lstStyle/>
           <a:p>
             <a:r>
-              <a:rPr lang="de-CH" dirty="0" err="1"/>
+              <a:rPr lang="en-US" dirty="0" smtClean="0"/>
               <a:t>Introduction</a:t>
             </a:r>
+            <a:endParaRPr lang="en-US" dirty="0"/>
+          </a:p>
+        </p:txBody>
+      </p:sp>
+      <p:sp>
+        <p:nvSpPr>
+          <p:cNvPr id="3" name="Content Placeholder 2"/>
+          <p:cNvSpPr>
+            <a:spLocks noGrp="1"/>
+          </p:cNvSpPr>
+          <p:nvPr>
+            <p:ph idx="1"/>
+          </p:nvPr>
+        </p:nvSpPr>
+        <p:spPr/>
+        <p:txBody>
+          <a:bodyPr/>
+          <a:lstStyle/>
+          <a:p>
+            <a:r>
+              <a:rPr lang="en-US" dirty="0" smtClean="0"/>
+              <a:t>It’s all about </a:t>
+            </a:r>
+            <a:r>
+              <a:rPr lang="en-US" b="1" dirty="0" smtClean="0"/>
+              <a:t>transforming </a:t>
+            </a:r>
+            <a:r>
+              <a:rPr lang="en-US" b="1" dirty="0" smtClean="0"/>
+              <a:t>values</a:t>
+            </a:r>
+          </a:p>
+          <a:p>
+            <a:endParaRPr lang="en-US" dirty="0" smtClean="0"/>
+          </a:p>
+          <a:p>
+            <a:endParaRPr lang="en-US" dirty="0" smtClean="0"/>
+          </a:p>
+          <a:p>
+            <a:r>
+              <a:rPr lang="en-US" dirty="0" smtClean="0"/>
+              <a:t>Concepts </a:t>
+            </a:r>
+            <a:r>
+              <a:rPr lang="en-US" dirty="0" smtClean="0"/>
+              <a:t>focus </a:t>
+            </a:r>
+            <a:r>
+              <a:rPr lang="en-US" dirty="0" smtClean="0"/>
+              <a:t>on </a:t>
+            </a:r>
+            <a:r>
+              <a:rPr lang="en-US" b="1" dirty="0" smtClean="0"/>
+              <a:t>expressing </a:t>
+            </a:r>
+            <a:r>
+              <a:rPr lang="en-US" b="1" dirty="0" smtClean="0"/>
+              <a:t>and composing value </a:t>
+            </a:r>
+            <a:r>
+              <a:rPr lang="en-US" b="1" dirty="0" smtClean="0"/>
+              <a:t>transformations</a:t>
+            </a:r>
+            <a:endParaRPr lang="en-US" b="1" dirty="0" smtClean="0"/>
+          </a:p>
+        </p:txBody>
+      </p:sp>
+      <p:sp>
+        <p:nvSpPr>
+          <p:cNvPr id="4" name="Date Placeholder 3"/>
+          <p:cNvSpPr>
+            <a:spLocks noGrp="1"/>
+          </p:cNvSpPr>
+          <p:nvPr>
+            <p:ph type="dt" sz="half" idx="10"/>
+          </p:nvPr>
+        </p:nvSpPr>
+        <p:spPr/>
+        <p:txBody>
+          <a:bodyPr/>
+          <a:lstStyle/>
+          <a:p>
+            <a:r>
+              <a:rPr lang="de-CH" smtClean="0"/>
+              <a:t>14. September 2015</a:t>
+            </a:r>
             <a:endParaRPr lang="de-CH" dirty="0"/>
           </a:p>
         </p:txBody>
       </p:sp>
       <p:sp>
         <p:nvSpPr>
-          <p:cNvPr id="3" name="Content Placeholder 2"/>
-          <p:cNvSpPr>
-            <a:spLocks noGrp="1"/>
-          </p:cNvSpPr>
-          <p:nvPr>
-            <p:ph idx="1"/>
+          <p:cNvPr id="5" name="Footer Placeholder 4"/>
+          <p:cNvSpPr>
+            <a:spLocks noGrp="1"/>
+          </p:cNvSpPr>
+          <p:nvPr>
+            <p:ph type="ftr" sz="quarter" idx="11"/>
           </p:nvPr>
         </p:nvSpPr>
         <p:spPr/>
@@ -11793,80 +13111,11 @@
           <a:bodyPr/>
           <a:lstStyle/>
           <a:p>
-            <a:pPr marL="342900" indent="-342900">
-              <a:buFont typeface="Wingdings" panose="05000000000000000000" pitchFamily="2" charset="2"/>
-              <a:buChar char="Ø"/>
-            </a:pPr>
-            <a:r>
-              <a:rPr lang="de-CH" b="1" dirty="0"/>
-              <a:t>First-class </a:t>
-            </a:r>
-            <a:r>
-              <a:rPr lang="de-CH" b="1" dirty="0" err="1" smtClean="0"/>
-              <a:t>and</a:t>
-            </a:r>
-            <a:r>
-              <a:rPr lang="de-CH" b="1" dirty="0" smtClean="0"/>
-              <a:t> </a:t>
-            </a:r>
-            <a:r>
-              <a:rPr lang="de-CH" b="1" dirty="0" err="1" smtClean="0"/>
-              <a:t>higher</a:t>
-            </a:r>
-            <a:r>
-              <a:rPr lang="de-CH" b="1" dirty="0" smtClean="0"/>
-              <a:t>-order </a:t>
-            </a:r>
-            <a:r>
-              <a:rPr lang="de-CH" b="1" dirty="0" err="1" smtClean="0"/>
-              <a:t>functions</a:t>
-            </a:r>
-            <a:endParaRPr lang="de-CH" b="1" dirty="0" smtClean="0"/>
-          </a:p>
-          <a:p>
-            <a:pPr marL="342900" indent="-342900">
-              <a:buFont typeface="Wingdings" panose="05000000000000000000" pitchFamily="2" charset="2"/>
-              <a:buChar char="Ø"/>
-            </a:pPr>
-            <a:r>
-              <a:rPr lang="de-CH" b="1" dirty="0" smtClean="0"/>
-              <a:t>Pure </a:t>
-            </a:r>
-            <a:r>
-              <a:rPr lang="de-CH" b="1" dirty="0" err="1" smtClean="0"/>
-              <a:t>functions</a:t>
-            </a:r>
-            <a:endParaRPr lang="de-CH" b="1" dirty="0" smtClean="0"/>
-          </a:p>
-          <a:p>
-            <a:pPr marL="342900" indent="-342900">
-              <a:buFont typeface="Wingdings" panose="05000000000000000000" pitchFamily="2" charset="2"/>
-              <a:buChar char="Ø"/>
-            </a:pPr>
-            <a:r>
-              <a:rPr lang="de-CH" b="1" dirty="0" err="1" smtClean="0"/>
-              <a:t>Immutability</a:t>
-            </a:r>
-            <a:endParaRPr lang="de-CH" b="1" dirty="0" smtClean="0"/>
-          </a:p>
-          <a:p>
-            <a:pPr marL="342900" indent="-342900">
-              <a:buFont typeface="Wingdings" panose="05000000000000000000" pitchFamily="2" charset="2"/>
-              <a:buChar char="Ø"/>
-            </a:pPr>
-            <a:r>
-              <a:rPr lang="de-CH" b="1" dirty="0" err="1" smtClean="0"/>
-              <a:t>Lazy</a:t>
-            </a:r>
-            <a:r>
-              <a:rPr lang="de-CH" b="1" dirty="0" smtClean="0"/>
-              <a:t> </a:t>
-            </a:r>
-            <a:r>
-              <a:rPr lang="de-CH" b="1" dirty="0" err="1" smtClean="0"/>
-              <a:t>evaluation</a:t>
-            </a:r>
-            <a:endParaRPr lang="de-CH" b="1" dirty="0" smtClean="0"/>
+            <a:r>
+              <a:rPr lang="en-US" smtClean="0"/>
+              <a:t>Functional Design Patterns for OO Practitioners</a:t>
+            </a:r>
+            <a:endParaRPr lang="de-CH" dirty="0"/>
           </a:p>
         </p:txBody>
       </p:sp>
@@ -11886,92 +13135,686 @@
           <a:lstStyle/>
           <a:p>
             <a:r>
-              <a:rPr lang="de-CH" dirty="0" err="1"/>
-              <a:t>Functional</a:t>
-            </a:r>
-            <a:r>
-              <a:rPr lang="de-CH" dirty="0"/>
-              <a:t> </a:t>
-            </a:r>
-            <a:r>
-              <a:rPr lang="de-CH" dirty="0" err="1"/>
-              <a:t>programming</a:t>
-            </a:r>
-            <a:r>
-              <a:rPr lang="de-CH" dirty="0"/>
-              <a:t> in a </a:t>
-            </a:r>
-            <a:r>
-              <a:rPr lang="de-CH" dirty="0" err="1"/>
-              <a:t>nutshell</a:t>
-            </a:r>
-            <a:endParaRPr lang="de-CH" dirty="0"/>
-          </a:p>
-        </p:txBody>
-      </p:sp>
-      <p:sp>
-        <p:nvSpPr>
-          <p:cNvPr id="9" name="Footer Placeholder 8"/>
-          <p:cNvSpPr>
-            <a:spLocks noGrp="1"/>
-          </p:cNvSpPr>
-          <p:nvPr>
-            <p:ph type="ftr" sz="quarter" idx="11"/>
-          </p:nvPr>
-        </p:nvSpPr>
-        <p:spPr/>
-        <p:txBody>
-          <a:bodyPr/>
-          <a:lstStyle/>
-          <a:p>
-            <a:r>
-              <a:rPr lang="de-CH" smtClean="0"/>
-              <a:t>Rezepte aus der funktionalen Programmierung | ico</a:t>
-            </a:r>
-            <a:endParaRPr lang="de-CH" dirty="0"/>
-          </a:p>
-        </p:txBody>
-      </p:sp>
-      <p:sp>
-        <p:nvSpPr>
-          <p:cNvPr id="11" name="Date Placeholder 10"/>
-          <p:cNvSpPr>
-            <a:spLocks noGrp="1"/>
-          </p:cNvSpPr>
-          <p:nvPr>
-            <p:ph type="dt" sz="half" idx="10"/>
-          </p:nvPr>
-        </p:nvSpPr>
-        <p:spPr/>
-        <p:txBody>
-          <a:bodyPr/>
-          <a:lstStyle/>
-          <a:p>
-            <a:r>
-              <a:rPr lang="de-CH" smtClean="0"/>
-              <a:t>14. November 2014</a:t>
-            </a:r>
-            <a:endParaRPr lang="de-CH" dirty="0"/>
-          </a:p>
-        </p:txBody>
-      </p:sp>
+              <a:rPr lang="en-US" dirty="0" smtClean="0"/>
+              <a:t>Functional Programming in 1 slide</a:t>
+            </a:r>
+            <a:endParaRPr lang="en-US" dirty="0"/>
+          </a:p>
+        </p:txBody>
+      </p:sp>
+      <p:cxnSp>
+        <p:nvCxnSpPr>
+          <p:cNvPr id="9" name="Straight Arrow Connector 8"/>
+          <p:cNvCxnSpPr/>
+          <p:nvPr/>
+        </p:nvCxnSpPr>
+        <p:spPr>
+          <a:xfrm>
+            <a:off x="1991544" y="2639269"/>
+            <a:ext cx="648072" cy="0"/>
+          </a:xfrm>
+          <a:prstGeom prst="straightConnector1">
+            <a:avLst/>
+          </a:prstGeom>
+          <a:ln w="57150">
+            <a:solidFill>
+              <a:srgbClr val="FFC000"/>
+            </a:solidFill>
+            <a:tailEnd type="triangle"/>
+          </a:ln>
+        </p:spPr>
+        <p:style>
+          <a:lnRef idx="1">
+            <a:schemeClr val="accent1"/>
+          </a:lnRef>
+          <a:fillRef idx="0">
+            <a:schemeClr val="accent1"/>
+          </a:fillRef>
+          <a:effectRef idx="0">
+            <a:schemeClr val="accent1"/>
+          </a:effectRef>
+          <a:fontRef idx="minor">
+            <a:schemeClr val="tx1"/>
+          </a:fontRef>
+        </p:style>
+      </p:cxnSp>
+      <p:sp>
+        <p:nvSpPr>
+          <p:cNvPr id="10" name="TextBox 9"/>
+          <p:cNvSpPr txBox="1"/>
+          <p:nvPr/>
+        </p:nvSpPr>
+        <p:spPr>
+          <a:xfrm>
+            <a:off x="1271464" y="2423245"/>
+            <a:ext cx="720080" cy="360040"/>
+          </a:xfrm>
+          <a:prstGeom prst="rect">
+            <a:avLst/>
+          </a:prstGeom>
+          <a:noFill/>
+        </p:spPr>
+        <p:txBody>
+          <a:bodyPr wrap="square" rtlCol="0">
+            <a:noAutofit/>
+          </a:bodyPr>
+          <a:lstStyle/>
+          <a:p>
+            <a:pPr algn="ctr"/>
+            <a:r>
+              <a:rPr lang="en-US" sz="2200" b="1" dirty="0" smtClean="0">
+                <a:solidFill>
+                  <a:schemeClr val="accent4">
+                    <a:lumMod val="50000"/>
+                  </a:schemeClr>
+                </a:solidFill>
+                <a:latin typeface="AA Zuehlke" pitchFamily="2" charset="0"/>
+              </a:rPr>
+              <a:t>x</a:t>
+            </a:r>
+            <a:endParaRPr lang="en-US" sz="2200" b="1" dirty="0" smtClean="0">
+              <a:solidFill>
+                <a:schemeClr val="accent4">
+                  <a:lumMod val="50000"/>
+                </a:schemeClr>
+              </a:solidFill>
+              <a:latin typeface="AA Zuehlke" pitchFamily="2" charset="0"/>
+            </a:endParaRPr>
+          </a:p>
+        </p:txBody>
+      </p:sp>
+      <p:sp>
+        <p:nvSpPr>
+          <p:cNvPr id="11" name="TextBox 10"/>
+          <p:cNvSpPr txBox="1"/>
+          <p:nvPr/>
+        </p:nvSpPr>
+        <p:spPr>
+          <a:xfrm>
+            <a:off x="2711624" y="2406948"/>
+            <a:ext cx="576064" cy="360040"/>
+          </a:xfrm>
+          <a:prstGeom prst="rect">
+            <a:avLst/>
+          </a:prstGeom>
+          <a:noFill/>
+        </p:spPr>
+        <p:txBody>
+          <a:bodyPr wrap="square" rtlCol="0">
+            <a:noAutofit/>
+          </a:bodyPr>
+          <a:lstStyle/>
+          <a:p>
+            <a:pPr algn="ctr"/>
+            <a:r>
+              <a:rPr lang="en-US" sz="2200" b="1" dirty="0" smtClean="0">
+                <a:solidFill>
+                  <a:srgbClr val="00B050"/>
+                </a:solidFill>
+                <a:latin typeface="AA Zuehlke" pitchFamily="2" charset="0"/>
+              </a:rPr>
+              <a:t>y</a:t>
+            </a:r>
+            <a:endParaRPr lang="en-US" sz="2200" b="1" dirty="0" smtClean="0">
+              <a:solidFill>
+                <a:srgbClr val="00B050"/>
+              </a:solidFill>
+              <a:latin typeface="AA Zuehlke" pitchFamily="2" charset="0"/>
+            </a:endParaRPr>
+          </a:p>
+        </p:txBody>
+      </p:sp>
+      <p:cxnSp>
+        <p:nvCxnSpPr>
+          <p:cNvPr id="20" name="Straight Arrow Connector 19"/>
+          <p:cNvCxnSpPr/>
+          <p:nvPr/>
+        </p:nvCxnSpPr>
+        <p:spPr>
+          <a:xfrm>
+            <a:off x="4799856" y="2639269"/>
+            <a:ext cx="648072" cy="0"/>
+          </a:xfrm>
+          <a:prstGeom prst="straightConnector1">
+            <a:avLst/>
+          </a:prstGeom>
+          <a:ln w="57150">
+            <a:solidFill>
+              <a:srgbClr val="FFC000"/>
+            </a:solidFill>
+            <a:tailEnd type="triangle"/>
+          </a:ln>
+        </p:spPr>
+        <p:style>
+          <a:lnRef idx="1">
+            <a:schemeClr val="accent1"/>
+          </a:lnRef>
+          <a:fillRef idx="0">
+            <a:schemeClr val="accent1"/>
+          </a:fillRef>
+          <a:effectRef idx="0">
+            <a:schemeClr val="accent1"/>
+          </a:effectRef>
+          <a:fontRef idx="minor">
+            <a:schemeClr val="tx1"/>
+          </a:fontRef>
+        </p:style>
+      </p:cxnSp>
+      <p:sp>
+        <p:nvSpPr>
+          <p:cNvPr id="21" name="TextBox 20"/>
+          <p:cNvSpPr txBox="1"/>
+          <p:nvPr/>
+        </p:nvSpPr>
+        <p:spPr>
+          <a:xfrm>
+            <a:off x="4079776" y="2423245"/>
+            <a:ext cx="720080" cy="360040"/>
+          </a:xfrm>
+          <a:prstGeom prst="rect">
+            <a:avLst/>
+          </a:prstGeom>
+          <a:noFill/>
+        </p:spPr>
+        <p:txBody>
+          <a:bodyPr wrap="square" rtlCol="0">
+            <a:noAutofit/>
+          </a:bodyPr>
+          <a:lstStyle/>
+          <a:p>
+            <a:pPr algn="ctr"/>
+            <a:r>
+              <a:rPr lang="en-US" sz="2200" b="1" dirty="0">
+                <a:solidFill>
+                  <a:srgbClr val="00B050"/>
+                </a:solidFill>
+                <a:latin typeface="AA Zuehlke" pitchFamily="2" charset="0"/>
+              </a:rPr>
+              <a:t>y</a:t>
+            </a:r>
+            <a:endParaRPr lang="en-US" sz="2200" b="1" dirty="0" smtClean="0">
+              <a:solidFill>
+                <a:srgbClr val="00B050"/>
+              </a:solidFill>
+              <a:latin typeface="AA Zuehlke" pitchFamily="2" charset="0"/>
+            </a:endParaRPr>
+          </a:p>
+        </p:txBody>
+      </p:sp>
+      <p:sp>
+        <p:nvSpPr>
+          <p:cNvPr id="22" name="TextBox 21"/>
+          <p:cNvSpPr txBox="1"/>
+          <p:nvPr/>
+        </p:nvSpPr>
+        <p:spPr>
+          <a:xfrm>
+            <a:off x="5519936" y="2406948"/>
+            <a:ext cx="576064" cy="360040"/>
+          </a:xfrm>
+          <a:prstGeom prst="rect">
+            <a:avLst/>
+          </a:prstGeom>
+          <a:noFill/>
+        </p:spPr>
+        <p:txBody>
+          <a:bodyPr wrap="square" rtlCol="0">
+            <a:noAutofit/>
+          </a:bodyPr>
+          <a:lstStyle/>
+          <a:p>
+            <a:pPr algn="ctr"/>
+            <a:r>
+              <a:rPr lang="en-US" sz="2200" b="1" dirty="0" smtClean="0">
+                <a:solidFill>
+                  <a:schemeClr val="accent1"/>
+                </a:solidFill>
+                <a:latin typeface="AA Zuehlke" pitchFamily="2" charset="0"/>
+              </a:rPr>
+              <a:t>z</a:t>
+            </a:r>
+            <a:endParaRPr lang="en-US" sz="2200" b="1" dirty="0" smtClean="0">
+              <a:solidFill>
+                <a:schemeClr val="accent1"/>
+              </a:solidFill>
+              <a:latin typeface="AA Zuehlke" pitchFamily="2" charset="0"/>
+            </a:endParaRPr>
+          </a:p>
+        </p:txBody>
+      </p:sp>
+      <p:sp>
+        <p:nvSpPr>
+          <p:cNvPr id="23" name="Rounded Rectangle 22"/>
+          <p:cNvSpPr/>
+          <p:nvPr/>
+        </p:nvSpPr>
+        <p:spPr>
+          <a:xfrm>
+            <a:off x="5519936" y="4653136"/>
+            <a:ext cx="720080" cy="720080"/>
+          </a:xfrm>
+          <a:prstGeom prst="roundRect">
+            <a:avLst/>
+          </a:prstGeom>
+          <a:solidFill>
+            <a:srgbClr val="0070C0"/>
+          </a:solidFill>
+          <a:ln w="76200">
+            <a:noFill/>
+          </a:ln>
+        </p:spPr>
+        <p:style>
+          <a:lnRef idx="2">
+            <a:schemeClr val="accent1">
+              <a:shade val="50000"/>
+            </a:schemeClr>
+          </a:lnRef>
+          <a:fillRef idx="1">
+            <a:schemeClr val="accent1"/>
+          </a:fillRef>
+          <a:effectRef idx="0">
+            <a:schemeClr val="accent1"/>
+          </a:effectRef>
+          <a:fontRef idx="minor">
+            <a:schemeClr val="lt1"/>
+          </a:fontRef>
+        </p:style>
+        <p:txBody>
+          <a:bodyPr rtlCol="0" anchor="ctr"/>
+          <a:lstStyle/>
+          <a:p>
+            <a:pPr algn="ctr"/>
+            <a:endParaRPr lang="en-US" sz="2200" dirty="0" err="1" smtClean="0">
+              <a:ln w="76200">
+                <a:noFill/>
+              </a:ln>
+              <a:latin typeface="AA Zuehlke" pitchFamily="2" charset="0"/>
+            </a:endParaRPr>
+          </a:p>
+        </p:txBody>
+      </p:sp>
+      <p:cxnSp>
+        <p:nvCxnSpPr>
+          <p:cNvPr id="25" name="Straight Arrow Connector 24"/>
+          <p:cNvCxnSpPr>
+            <a:stCxn id="23" idx="3"/>
+            <a:endCxn id="29" idx="1"/>
+          </p:cNvCxnSpPr>
+          <p:nvPr/>
+        </p:nvCxnSpPr>
+        <p:spPr>
+          <a:xfrm>
+            <a:off x="6240016" y="5013176"/>
+            <a:ext cx="648072" cy="0"/>
+          </a:xfrm>
+          <a:prstGeom prst="straightConnector1">
+            <a:avLst/>
+          </a:prstGeom>
+          <a:ln w="57150">
+            <a:solidFill>
+              <a:srgbClr val="FFC000"/>
+            </a:solidFill>
+            <a:tailEnd type="triangle"/>
+          </a:ln>
+        </p:spPr>
+        <p:style>
+          <a:lnRef idx="1">
+            <a:schemeClr val="accent1"/>
+          </a:lnRef>
+          <a:fillRef idx="0">
+            <a:schemeClr val="accent1"/>
+          </a:fillRef>
+          <a:effectRef idx="0">
+            <a:schemeClr val="accent1"/>
+          </a:effectRef>
+          <a:fontRef idx="minor">
+            <a:schemeClr val="tx1"/>
+          </a:fontRef>
+        </p:style>
+      </p:cxnSp>
+      <p:sp>
+        <p:nvSpPr>
+          <p:cNvPr id="29" name="Rounded Rectangle 28"/>
+          <p:cNvSpPr/>
+          <p:nvPr/>
+        </p:nvSpPr>
+        <p:spPr>
+          <a:xfrm>
+            <a:off x="6888088" y="4653136"/>
+            <a:ext cx="720080" cy="720080"/>
+          </a:xfrm>
+          <a:prstGeom prst="roundRect">
+            <a:avLst/>
+          </a:prstGeom>
+          <a:solidFill>
+            <a:schemeClr val="accent1"/>
+          </a:solidFill>
+          <a:ln w="76200">
+            <a:noFill/>
+          </a:ln>
+        </p:spPr>
+        <p:style>
+          <a:lnRef idx="2">
+            <a:schemeClr val="accent1">
+              <a:shade val="50000"/>
+            </a:schemeClr>
+          </a:lnRef>
+          <a:fillRef idx="1">
+            <a:schemeClr val="accent1"/>
+          </a:fillRef>
+          <a:effectRef idx="0">
+            <a:schemeClr val="accent1"/>
+          </a:effectRef>
+          <a:fontRef idx="minor">
+            <a:schemeClr val="lt1"/>
+          </a:fontRef>
+        </p:style>
+        <p:txBody>
+          <a:bodyPr rtlCol="0" anchor="ctr"/>
+          <a:lstStyle/>
+          <a:p>
+            <a:pPr algn="ctr"/>
+            <a:endParaRPr lang="en-US" sz="2200" dirty="0" err="1" smtClean="0">
+              <a:ln w="76200">
+                <a:noFill/>
+              </a:ln>
+              <a:latin typeface="AA Zuehlke" pitchFamily="2" charset="0"/>
+            </a:endParaRPr>
+          </a:p>
+        </p:txBody>
+      </p:sp>
+      <p:sp>
+        <p:nvSpPr>
+          <p:cNvPr id="39" name="Rounded Rectangle 38"/>
+          <p:cNvSpPr/>
+          <p:nvPr/>
+        </p:nvSpPr>
+        <p:spPr>
+          <a:xfrm>
+            <a:off x="2063552" y="4077072"/>
+            <a:ext cx="720080" cy="720080"/>
+          </a:xfrm>
+          <a:prstGeom prst="roundRect">
+            <a:avLst/>
+          </a:prstGeom>
+          <a:solidFill>
+            <a:srgbClr val="0070C0"/>
+          </a:solidFill>
+          <a:ln w="76200">
+            <a:noFill/>
+          </a:ln>
+        </p:spPr>
+        <p:style>
+          <a:lnRef idx="2">
+            <a:schemeClr val="accent1">
+              <a:shade val="50000"/>
+            </a:schemeClr>
+          </a:lnRef>
+          <a:fillRef idx="1">
+            <a:schemeClr val="accent1"/>
+          </a:fillRef>
+          <a:effectRef idx="0">
+            <a:schemeClr val="accent1"/>
+          </a:effectRef>
+          <a:fontRef idx="minor">
+            <a:schemeClr val="lt1"/>
+          </a:fontRef>
+        </p:style>
+        <p:txBody>
+          <a:bodyPr rtlCol="0" anchor="ctr"/>
+          <a:lstStyle/>
+          <a:p>
+            <a:pPr algn="ctr"/>
+            <a:endParaRPr lang="en-US" sz="2200" dirty="0" err="1" smtClean="0">
+              <a:ln w="76200">
+                <a:noFill/>
+              </a:ln>
+              <a:latin typeface="AA Zuehlke" pitchFamily="2" charset="0"/>
+            </a:endParaRPr>
+          </a:p>
+        </p:txBody>
+      </p:sp>
+      <p:sp>
+        <p:nvSpPr>
+          <p:cNvPr id="40" name="Rounded Rectangle 39"/>
+          <p:cNvSpPr/>
+          <p:nvPr/>
+        </p:nvSpPr>
+        <p:spPr>
+          <a:xfrm>
+            <a:off x="3431704" y="4077072"/>
+            <a:ext cx="720080" cy="720080"/>
+          </a:xfrm>
+          <a:prstGeom prst="roundRect">
+            <a:avLst/>
+          </a:prstGeom>
+          <a:solidFill>
+            <a:srgbClr val="00B050"/>
+          </a:solidFill>
+          <a:ln w="76200">
+            <a:noFill/>
+          </a:ln>
+        </p:spPr>
+        <p:style>
+          <a:lnRef idx="2">
+            <a:schemeClr val="accent1">
+              <a:shade val="50000"/>
+            </a:schemeClr>
+          </a:lnRef>
+          <a:fillRef idx="1">
+            <a:schemeClr val="accent1"/>
+          </a:fillRef>
+          <a:effectRef idx="0">
+            <a:schemeClr val="accent1"/>
+          </a:effectRef>
+          <a:fontRef idx="minor">
+            <a:schemeClr val="lt1"/>
+          </a:fontRef>
+        </p:style>
+        <p:txBody>
+          <a:bodyPr rtlCol="0" anchor="ctr"/>
+          <a:lstStyle/>
+          <a:p>
+            <a:pPr algn="ctr"/>
+            <a:endParaRPr lang="en-US" sz="2200" dirty="0" err="1" smtClean="0">
+              <a:ln w="76200">
+                <a:noFill/>
+              </a:ln>
+              <a:latin typeface="AA Zuehlke" pitchFamily="2" charset="0"/>
+            </a:endParaRPr>
+          </a:p>
+        </p:txBody>
+      </p:sp>
+      <p:cxnSp>
+        <p:nvCxnSpPr>
+          <p:cNvPr id="41" name="Straight Arrow Connector 40"/>
+          <p:cNvCxnSpPr>
+            <a:stCxn id="39" idx="3"/>
+            <a:endCxn id="40" idx="1"/>
+          </p:cNvCxnSpPr>
+          <p:nvPr/>
+        </p:nvCxnSpPr>
+        <p:spPr>
+          <a:xfrm>
+            <a:off x="2783632" y="4437112"/>
+            <a:ext cx="648072" cy="0"/>
+          </a:xfrm>
+          <a:prstGeom prst="straightConnector1">
+            <a:avLst/>
+          </a:prstGeom>
+          <a:ln w="57150">
+            <a:solidFill>
+              <a:srgbClr val="FFC000"/>
+            </a:solidFill>
+            <a:tailEnd type="triangle"/>
+          </a:ln>
+        </p:spPr>
+        <p:style>
+          <a:lnRef idx="1">
+            <a:schemeClr val="accent1"/>
+          </a:lnRef>
+          <a:fillRef idx="0">
+            <a:schemeClr val="accent1"/>
+          </a:fillRef>
+          <a:effectRef idx="0">
+            <a:schemeClr val="accent1"/>
+          </a:effectRef>
+          <a:fontRef idx="minor">
+            <a:schemeClr val="tx1"/>
+          </a:fontRef>
+        </p:style>
+      </p:cxnSp>
+      <p:sp>
+        <p:nvSpPr>
+          <p:cNvPr id="44" name="Rounded Rectangle 43"/>
+          <p:cNvSpPr/>
+          <p:nvPr/>
+        </p:nvSpPr>
+        <p:spPr>
+          <a:xfrm>
+            <a:off x="2084585" y="5178172"/>
+            <a:ext cx="720080" cy="720080"/>
+          </a:xfrm>
+          <a:prstGeom prst="roundRect">
+            <a:avLst/>
+          </a:prstGeom>
+          <a:solidFill>
+            <a:srgbClr val="00B050"/>
+          </a:solidFill>
+          <a:ln w="76200">
+            <a:noFill/>
+          </a:ln>
+        </p:spPr>
+        <p:style>
+          <a:lnRef idx="2">
+            <a:schemeClr val="accent1">
+              <a:shade val="50000"/>
+            </a:schemeClr>
+          </a:lnRef>
+          <a:fillRef idx="1">
+            <a:schemeClr val="accent1"/>
+          </a:fillRef>
+          <a:effectRef idx="0">
+            <a:schemeClr val="accent1"/>
+          </a:effectRef>
+          <a:fontRef idx="minor">
+            <a:schemeClr val="lt1"/>
+          </a:fontRef>
+        </p:style>
+        <p:txBody>
+          <a:bodyPr rtlCol="0" anchor="ctr"/>
+          <a:lstStyle/>
+          <a:p>
+            <a:pPr algn="ctr"/>
+            <a:endParaRPr lang="en-US" sz="2200" dirty="0" err="1" smtClean="0">
+              <a:ln w="76200">
+                <a:noFill/>
+              </a:ln>
+              <a:latin typeface="AA Zuehlke" pitchFamily="2" charset="0"/>
+            </a:endParaRPr>
+          </a:p>
+        </p:txBody>
+      </p:sp>
+      <p:sp>
+        <p:nvSpPr>
+          <p:cNvPr id="45" name="Rounded Rectangle 44"/>
+          <p:cNvSpPr/>
+          <p:nvPr/>
+        </p:nvSpPr>
+        <p:spPr>
+          <a:xfrm>
+            <a:off x="3452737" y="5178172"/>
+            <a:ext cx="720080" cy="720080"/>
+          </a:xfrm>
+          <a:prstGeom prst="roundRect">
+            <a:avLst/>
+          </a:prstGeom>
+          <a:solidFill>
+            <a:schemeClr val="accent1"/>
+          </a:solidFill>
+          <a:ln w="76200">
+            <a:noFill/>
+          </a:ln>
+        </p:spPr>
+        <p:style>
+          <a:lnRef idx="2">
+            <a:schemeClr val="accent1">
+              <a:shade val="50000"/>
+            </a:schemeClr>
+          </a:lnRef>
+          <a:fillRef idx="1">
+            <a:schemeClr val="accent1"/>
+          </a:fillRef>
+          <a:effectRef idx="0">
+            <a:schemeClr val="accent1"/>
+          </a:effectRef>
+          <a:fontRef idx="minor">
+            <a:schemeClr val="lt1"/>
+          </a:fontRef>
+        </p:style>
+        <p:txBody>
+          <a:bodyPr rtlCol="0" anchor="ctr"/>
+          <a:lstStyle/>
+          <a:p>
+            <a:pPr algn="ctr"/>
+            <a:endParaRPr lang="en-US" sz="2200" dirty="0" err="1" smtClean="0">
+              <a:ln w="76200">
+                <a:noFill/>
+              </a:ln>
+              <a:latin typeface="AA Zuehlke" pitchFamily="2" charset="0"/>
+            </a:endParaRPr>
+          </a:p>
+        </p:txBody>
+      </p:sp>
+      <p:cxnSp>
+        <p:nvCxnSpPr>
+          <p:cNvPr id="46" name="Straight Arrow Connector 45"/>
+          <p:cNvCxnSpPr>
+            <a:stCxn id="44" idx="3"/>
+            <a:endCxn id="45" idx="1"/>
+          </p:cNvCxnSpPr>
+          <p:nvPr/>
+        </p:nvCxnSpPr>
+        <p:spPr>
+          <a:xfrm>
+            <a:off x="2804665" y="5538212"/>
+            <a:ext cx="648072" cy="0"/>
+          </a:xfrm>
+          <a:prstGeom prst="straightConnector1">
+            <a:avLst/>
+          </a:prstGeom>
+          <a:ln w="57150">
+            <a:solidFill>
+              <a:srgbClr val="FFC000"/>
+            </a:solidFill>
+            <a:tailEnd type="triangle"/>
+          </a:ln>
+        </p:spPr>
+        <p:style>
+          <a:lnRef idx="1">
+            <a:schemeClr val="accent1"/>
+          </a:lnRef>
+          <a:fillRef idx="0">
+            <a:schemeClr val="accent1"/>
+          </a:fillRef>
+          <a:effectRef idx="0">
+            <a:schemeClr val="accent1"/>
+          </a:effectRef>
+          <a:fontRef idx="minor">
+            <a:schemeClr val="tx1"/>
+          </a:fontRef>
+        </p:style>
+      </p:cxnSp>
     </p:spTree>
     <p:extLst>
       <p:ext uri="{BB962C8B-B14F-4D97-AF65-F5344CB8AC3E}">
-        <p14:creationId xmlns:p14="http://schemas.microsoft.com/office/powerpoint/2010/main" val="290417393"/>
+        <p14:creationId xmlns:p14="http://schemas.microsoft.com/office/powerpoint/2010/main" val="355283669"/>
       </p:ext>
     </p:extLst>
   </p:cSld>
   <p:clrMapOvr>
     <a:masterClrMapping/>
   </p:clrMapOvr>
-  <p:timing>
-    <p:tnLst>
-      <p:par>
-        <p:cTn id="1" dur="indefinite" restart="never" nodeType="tmRoot"/>
-      </p:par>
-    </p:tnLst>
-  </p:timing>
 </p:sld>
 </file>
 
@@ -12008,8 +13851,8 @@
           <a:lstStyle/>
           <a:p>
             <a:r>
-              <a:rPr lang="de-CH" dirty="0" err="1"/>
-              <a:t>Introduction</a:t>
+              <a:rPr lang="de-CH" dirty="0" smtClean="0"/>
+              <a:t>Outline</a:t>
             </a:r>
             <a:endParaRPr lang="de-CH" dirty="0"/>
           </a:p>
@@ -12031,43 +13874,53 @@
           <a:lstStyle/>
           <a:p>
             <a:pPr marL="342900" indent="-342900">
-              <a:buFont typeface="Wingdings" panose="05000000000000000000" pitchFamily="2" charset="2"/>
-              <a:buChar char="Ø"/>
+              <a:buFont typeface="Arial" panose="020B0604020202020204" pitchFamily="34" charset="0"/>
+              <a:buChar char="•"/>
             </a:pPr>
             <a:r>
-              <a:rPr lang="de-CH" b="1" dirty="0"/>
-              <a:t>First-class </a:t>
-            </a:r>
-            <a:r>
-              <a:rPr lang="de-CH" b="1" dirty="0" err="1" smtClean="0"/>
-              <a:t>and</a:t>
-            </a:r>
-            <a:r>
-              <a:rPr lang="de-CH" b="1" dirty="0" smtClean="0"/>
-              <a:t> </a:t>
-            </a:r>
-            <a:r>
-              <a:rPr lang="de-CH" b="1" dirty="0" err="1" smtClean="0"/>
-              <a:t>higher</a:t>
-            </a:r>
-            <a:r>
-              <a:rPr lang="de-CH" b="1" dirty="0" smtClean="0"/>
-              <a:t>-order </a:t>
-            </a:r>
-            <a:r>
-              <a:rPr lang="de-CH" b="1" dirty="0" err="1" smtClean="0"/>
+              <a:rPr lang="de-CH" dirty="0" smtClean="0"/>
+              <a:t>Higher-order </a:t>
+            </a:r>
+            <a:r>
+              <a:rPr lang="de-CH" dirty="0" err="1" smtClean="0"/>
               <a:t>functions</a:t>
             </a:r>
-            <a:endParaRPr lang="de-CH" b="1" dirty="0" smtClean="0"/>
-          </a:p>
-          <a:p>
-            <a:pPr marL="608013" lvl="1" indent="-342900">
-              <a:buFont typeface="Wingdings" panose="05000000000000000000" pitchFamily="2" charset="2"/>
-              <a:buChar char="ü"/>
+            <a:endParaRPr lang="de-CH" dirty="0" smtClean="0"/>
+          </a:p>
+          <a:p>
+            <a:pPr marL="342900" indent="-342900">
+              <a:buFont typeface="Arial" panose="020B0604020202020204" pitchFamily="34" charset="0"/>
+              <a:buChar char="•"/>
             </a:pPr>
             <a:r>
+              <a:rPr lang="de-CH" dirty="0" smtClean="0"/>
+              <a:t>Pure </a:t>
+            </a:r>
+            <a:r>
               <a:rPr lang="de-CH" dirty="0" err="1" smtClean="0"/>
-              <a:t>Functions</a:t>
+              <a:t>functions</a:t>
+            </a:r>
+            <a:endParaRPr lang="de-CH" dirty="0" smtClean="0"/>
+          </a:p>
+          <a:p>
+            <a:pPr marL="342900" indent="-342900">
+              <a:buFont typeface="Arial" panose="020B0604020202020204" pitchFamily="34" charset="0"/>
+              <a:buChar char="•"/>
+            </a:pPr>
+            <a:r>
+              <a:rPr lang="de-CH" dirty="0" err="1" smtClean="0"/>
+              <a:t>Immutability</a:t>
+            </a:r>
+            <a:endParaRPr lang="de-CH" dirty="0" smtClean="0"/>
+          </a:p>
+          <a:p>
+            <a:pPr marL="342900" indent="-342900">
+              <a:buFont typeface="Arial" panose="020B0604020202020204" pitchFamily="34" charset="0"/>
+              <a:buChar char="•"/>
+            </a:pPr>
+            <a:r>
+              <a:rPr lang="de-CH" dirty="0" err="1" smtClean="0"/>
+              <a:t>Lazy</a:t>
             </a:r>
             <a:r>
               <a:rPr lang="de-CH" dirty="0" smtClean="0"/>
@@ -12075,170 +13928,10 @@
             </a:r>
             <a:r>
               <a:rPr lang="de-CH" dirty="0" err="1" smtClean="0"/>
-              <a:t>are</a:t>
-            </a:r>
-            <a:r>
-              <a:rPr lang="de-CH" dirty="0" smtClean="0"/>
-              <a:t> </a:t>
-            </a:r>
-            <a:r>
-              <a:rPr lang="de-CH" dirty="0" err="1" smtClean="0"/>
-              <a:t>objects</a:t>
-            </a:r>
-            <a:r>
-              <a:rPr lang="de-CH" dirty="0" smtClean="0"/>
-              <a:t>, </a:t>
-            </a:r>
-            <a:r>
-              <a:rPr lang="de-CH" dirty="0" err="1" smtClean="0"/>
-              <a:t>too</a:t>
+              <a:t>evaluation</a:t>
             </a:r>
             <a:endParaRPr lang="de-CH" dirty="0" smtClean="0"/>
           </a:p>
-          <a:p>
-            <a:pPr marL="608013" lvl="1" indent="-342900">
-              <a:buFont typeface="Wingdings" panose="05000000000000000000" pitchFamily="2" charset="2"/>
-              <a:buChar char="ü"/>
-            </a:pPr>
-            <a:r>
-              <a:rPr lang="en-US" dirty="0"/>
-              <a:t>Passing functions as arguments to other functions</a:t>
-            </a:r>
-          </a:p>
-          <a:p>
-            <a:pPr marL="608013" lvl="1" indent="-342900">
-              <a:buFont typeface="Wingdings" panose="05000000000000000000" pitchFamily="2" charset="2"/>
-              <a:buChar char="ü"/>
-            </a:pPr>
-            <a:r>
-              <a:rPr lang="de-CH" dirty="0" err="1" smtClean="0"/>
-              <a:t>Examples</a:t>
-            </a:r>
-            <a:r>
-              <a:rPr lang="de-CH" dirty="0" smtClean="0"/>
-              <a:t>: </a:t>
-            </a:r>
-            <a:r>
-              <a:rPr lang="de-CH" dirty="0" err="1" smtClean="0"/>
-              <a:t>List.map</a:t>
-            </a:r>
-            <a:r>
-              <a:rPr lang="de-CH" dirty="0" smtClean="0"/>
-              <a:t>/</a:t>
-            </a:r>
-            <a:r>
-              <a:rPr lang="de-CH" dirty="0" err="1" smtClean="0"/>
-              <a:t>filter</a:t>
-            </a:r>
-            <a:r>
-              <a:rPr lang="de-CH" dirty="0" smtClean="0"/>
-              <a:t>/</a:t>
-            </a:r>
-            <a:r>
-              <a:rPr lang="de-CH" dirty="0" err="1" smtClean="0"/>
-              <a:t>fold</a:t>
-            </a:r>
-            <a:endParaRPr lang="de-CH" dirty="0"/>
-          </a:p>
-          <a:p>
-            <a:pPr marL="342900" indent="-342900">
-              <a:buFont typeface="Wingdings" panose="05000000000000000000" pitchFamily="2" charset="2"/>
-              <a:buChar char="Ø"/>
-            </a:pPr>
-            <a:r>
-              <a:rPr lang="de-CH" dirty="0" smtClean="0">
-                <a:solidFill>
-                  <a:schemeClr val="bg1">
-                    <a:lumMod val="75000"/>
-                  </a:schemeClr>
-                </a:solidFill>
-              </a:rPr>
-              <a:t>Pure </a:t>
-            </a:r>
-            <a:r>
-              <a:rPr lang="de-CH" dirty="0" err="1" smtClean="0">
-                <a:solidFill>
-                  <a:schemeClr val="bg1">
-                    <a:lumMod val="75000"/>
-                  </a:schemeClr>
-                </a:solidFill>
-              </a:rPr>
-              <a:t>functions</a:t>
-            </a:r>
-            <a:endParaRPr lang="de-CH" dirty="0" smtClean="0">
-              <a:solidFill>
-                <a:schemeClr val="bg1">
-                  <a:lumMod val="75000"/>
-                </a:schemeClr>
-              </a:solidFill>
-            </a:endParaRPr>
-          </a:p>
-          <a:p>
-            <a:pPr marL="342900" indent="-342900">
-              <a:buFont typeface="Wingdings" panose="05000000000000000000" pitchFamily="2" charset="2"/>
-              <a:buChar char="Ø"/>
-            </a:pPr>
-            <a:r>
-              <a:rPr lang="de-CH" dirty="0" err="1" smtClean="0">
-                <a:solidFill>
-                  <a:schemeClr val="bg1">
-                    <a:lumMod val="75000"/>
-                  </a:schemeClr>
-                </a:solidFill>
-              </a:rPr>
-              <a:t>Immutability</a:t>
-            </a:r>
-            <a:endParaRPr lang="de-CH" dirty="0" smtClean="0">
-              <a:solidFill>
-                <a:schemeClr val="bg1">
-                  <a:lumMod val="75000"/>
-                </a:schemeClr>
-              </a:solidFill>
-            </a:endParaRPr>
-          </a:p>
-          <a:p>
-            <a:pPr marL="342900" indent="-342900">
-              <a:buFont typeface="Wingdings" panose="05000000000000000000" pitchFamily="2" charset="2"/>
-              <a:buChar char="Ø"/>
-            </a:pPr>
-            <a:r>
-              <a:rPr lang="de-CH" dirty="0" err="1" smtClean="0">
-                <a:solidFill>
-                  <a:schemeClr val="bg1">
-                    <a:lumMod val="75000"/>
-                  </a:schemeClr>
-                </a:solidFill>
-              </a:rPr>
-              <a:t>Lazy</a:t>
-            </a:r>
-            <a:r>
-              <a:rPr lang="de-CH" dirty="0" smtClean="0">
-                <a:solidFill>
-                  <a:schemeClr val="bg1">
-                    <a:lumMod val="75000"/>
-                  </a:schemeClr>
-                </a:solidFill>
-              </a:rPr>
-              <a:t> </a:t>
-            </a:r>
-            <a:r>
-              <a:rPr lang="de-CH" dirty="0" err="1" smtClean="0">
-                <a:solidFill>
-                  <a:schemeClr val="bg1">
-                    <a:lumMod val="75000"/>
-                  </a:schemeClr>
-                </a:solidFill>
-              </a:rPr>
-              <a:t>evaluation</a:t>
-            </a:r>
-            <a:endParaRPr lang="de-CH" dirty="0" smtClean="0">
-              <a:solidFill>
-                <a:schemeClr val="bg1">
-                  <a:lumMod val="75000"/>
-                </a:schemeClr>
-              </a:solidFill>
-            </a:endParaRPr>
-          </a:p>
         </p:txBody>
       </p:sp>
       <p:sp>
@@ -12256,26 +13949,6 @@
           <a:bodyPr/>
           <a:lstStyle/>
           <a:p>
-            <a:r>
-              <a:rPr lang="de-CH" dirty="0" err="1"/>
-              <a:t>Functional</a:t>
-            </a:r>
-            <a:r>
-              <a:rPr lang="de-CH" dirty="0"/>
-              <a:t> </a:t>
-            </a:r>
-            <a:r>
-              <a:rPr lang="de-CH" dirty="0" err="1"/>
-              <a:t>programming</a:t>
-            </a:r>
-            <a:r>
-              <a:rPr lang="de-CH" dirty="0"/>
-              <a:t> in a </a:t>
-            </a:r>
-            <a:r>
-              <a:rPr lang="de-CH" dirty="0" err="1"/>
-              <a:t>nutshell</a:t>
-            </a:r>
             <a:endParaRPr lang="de-CH" dirty="0"/>
           </a:p>
         </p:txBody>
@@ -12305,7 +13978,7 @@
       </p:sp>
       <p:sp>
         <p:nvSpPr>
-          <p:cNvPr id="8" name="Date Placeholder 7"/>
+          <p:cNvPr id="11" name="Date Placeholder 10"/>
           <p:cNvSpPr>
             <a:spLocks noGrp="1"/>
           </p:cNvSpPr>
@@ -12329,7 +14002,7 @@
     </p:spTree>
     <p:extLst>
       <p:ext uri="{BB962C8B-B14F-4D97-AF65-F5344CB8AC3E}">
-        <p14:creationId xmlns:p14="http://schemas.microsoft.com/office/powerpoint/2010/main" val="4192120826"/>
+        <p14:creationId xmlns:p14="http://schemas.microsoft.com/office/powerpoint/2010/main" val="290417393"/>
       </p:ext>
     </p:extLst>
   </p:cSld>
@@ -12406,54 +14079,125 @@
               <a:buChar char="Ø"/>
             </a:pPr>
             <a:r>
-              <a:rPr lang="de-CH" dirty="0">
+              <a:rPr lang="de-CH" b="1" dirty="0"/>
+              <a:t>First-class </a:t>
+            </a:r>
+            <a:r>
+              <a:rPr lang="de-CH" b="1" dirty="0" err="1" smtClean="0"/>
+              <a:t>and</a:t>
+            </a:r>
+            <a:r>
+              <a:rPr lang="de-CH" b="1" dirty="0" smtClean="0"/>
+              <a:t> </a:t>
+            </a:r>
+            <a:r>
+              <a:rPr lang="de-CH" b="1" dirty="0" err="1" smtClean="0"/>
+              <a:t>higher</a:t>
+            </a:r>
+            <a:r>
+              <a:rPr lang="de-CH" b="1" dirty="0" smtClean="0"/>
+              <a:t>-order </a:t>
+            </a:r>
+            <a:r>
+              <a:rPr lang="de-CH" b="1" dirty="0" err="1" smtClean="0"/>
+              <a:t>functions</a:t>
+            </a:r>
+            <a:endParaRPr lang="de-CH" b="1" dirty="0" smtClean="0"/>
+          </a:p>
+          <a:p>
+            <a:pPr marL="608013" lvl="1" indent="-342900">
+              <a:buFont typeface="Wingdings" panose="05000000000000000000" pitchFamily="2" charset="2"/>
+              <a:buChar char="ü"/>
+            </a:pPr>
+            <a:r>
+              <a:rPr lang="de-CH" dirty="0" err="1" smtClean="0"/>
+              <a:t>Functions</a:t>
+            </a:r>
+            <a:r>
+              <a:rPr lang="de-CH" dirty="0" smtClean="0"/>
+              <a:t> </a:t>
+            </a:r>
+            <a:r>
+              <a:rPr lang="de-CH" dirty="0" err="1" smtClean="0"/>
+              <a:t>are</a:t>
+            </a:r>
+            <a:r>
+              <a:rPr lang="de-CH" dirty="0" smtClean="0"/>
+              <a:t> </a:t>
+            </a:r>
+            <a:r>
+              <a:rPr lang="de-CH" dirty="0" err="1" smtClean="0"/>
+              <a:t>objects</a:t>
+            </a:r>
+            <a:r>
+              <a:rPr lang="de-CH" dirty="0" smtClean="0"/>
+              <a:t>, </a:t>
+            </a:r>
+            <a:r>
+              <a:rPr lang="de-CH" dirty="0" err="1" smtClean="0"/>
+              <a:t>too</a:t>
+            </a:r>
+            <a:endParaRPr lang="de-CH" dirty="0" smtClean="0"/>
+          </a:p>
+          <a:p>
+            <a:pPr marL="608013" lvl="1" indent="-342900">
+              <a:buFont typeface="Wingdings" panose="05000000000000000000" pitchFamily="2" charset="2"/>
+              <a:buChar char="ü"/>
+            </a:pPr>
+            <a:r>
+              <a:rPr lang="en-US" dirty="0"/>
+              <a:t>Passing functions as arguments to other functions</a:t>
+            </a:r>
+          </a:p>
+          <a:p>
+            <a:pPr marL="608013" lvl="1" indent="-342900">
+              <a:buFont typeface="Wingdings" panose="05000000000000000000" pitchFamily="2" charset="2"/>
+              <a:buChar char="ü"/>
+            </a:pPr>
+            <a:r>
+              <a:rPr lang="de-CH" dirty="0" err="1" smtClean="0"/>
+              <a:t>Examples</a:t>
+            </a:r>
+            <a:r>
+              <a:rPr lang="de-CH" dirty="0" smtClean="0"/>
+              <a:t>: </a:t>
+            </a:r>
+            <a:r>
+              <a:rPr lang="de-CH" dirty="0" err="1" smtClean="0"/>
+              <a:t>List.map</a:t>
+            </a:r>
+            <a:r>
+              <a:rPr lang="de-CH" dirty="0" smtClean="0"/>
+              <a:t>/</a:t>
+            </a:r>
+            <a:r>
+              <a:rPr lang="de-CH" dirty="0" err="1" smtClean="0"/>
+              <a:t>filter</a:t>
+            </a:r>
+            <a:r>
+              <a:rPr lang="de-CH" dirty="0" smtClean="0"/>
+              <a:t>/</a:t>
+            </a:r>
+            <a:r>
+              <a:rPr lang="de-CH" dirty="0" err="1" smtClean="0"/>
+              <a:t>fold</a:t>
+            </a:r>
+            <a:endParaRPr lang="de-CH" dirty="0"/>
+          </a:p>
+          <a:p>
+            <a:pPr marL="342900" indent="-342900">
+              <a:buFont typeface="Wingdings" panose="05000000000000000000" pitchFamily="2" charset="2"/>
+              <a:buChar char="Ø"/>
+            </a:pPr>
+            <a:r>
+              <a:rPr lang="de-CH" dirty="0" smtClean="0">
                 <a:solidFill>
                   <a:schemeClr val="bg1">
                     <a:lumMod val="75000"/>
                   </a:schemeClr>
                 </a:solidFill>
               </a:rPr>
-              <a:t>First-class </a:t>
-            </a:r>
-            <a:r>
-              <a:rPr lang="de-CH" dirty="0" err="1" smtClean="0">
-                <a:solidFill>
-                  <a:schemeClr val="bg1">
-                    <a:lumMod val="75000"/>
-                  </a:schemeClr>
-                </a:solidFill>
-              </a:rPr>
-              <a:t>and</a:t>
-            </a:r>
-            <a:r>
-              <a:rPr lang="de-CH" dirty="0" smtClean="0">
-                <a:solidFill>
-                  <a:schemeClr val="bg1">
-                    <a:lumMod val="75000"/>
-                  </a:schemeClr>
-                </a:solidFill>
-              </a:rPr>
-              <a:t> </a:t>
-            </a:r>
-            <a:r>
-              <a:rPr lang="de-CH" dirty="0" err="1" smtClean="0">
-                <a:solidFill>
-                  <a:schemeClr val="bg1">
-                    <a:lumMod val="75000"/>
-                  </a:schemeClr>
-                </a:solidFill>
-              </a:rPr>
-              <a:t>higher</a:t>
-            </a:r>
-            <a:r>
-              <a:rPr lang="de-CH" dirty="0" smtClean="0">
-                <a:solidFill>
-                  <a:schemeClr val="bg1">
-                    <a:lumMod val="75000"/>
-                  </a:schemeClr>
-                </a:solidFill>
-              </a:rPr>
-              <a:t>-order </a:t>
+              <a:t>Pure </a:t>
             </a:r>
             <a:r>
               <a:rPr lang="de-CH" dirty="0" err="1" smtClean="0">
@@ -12479,126 +14223,6 @@
               <a:buChar char="Ø"/>
             </a:pPr>
             <a:r>
-              <a:rPr lang="de-CH" b="1" dirty="0" smtClean="0"/>
-              <a:t>Pure </a:t>
-            </a:r>
-            <a:r>
-              <a:rPr lang="de-CH" b="1" dirty="0" err="1" smtClean="0"/>
-              <a:t>functions</a:t>
-            </a:r>
-            <a:endParaRPr lang="de-CH" b="1" dirty="0" smtClean="0"/>
-          </a:p>
-          <a:p>
-            <a:pPr marL="608013" lvl="1" indent="-342900">
-              <a:buFont typeface="Wingdings" panose="05000000000000000000" pitchFamily="2" charset="2"/>
-              <a:buChar char="ü"/>
-            </a:pPr>
-            <a:r>
-              <a:rPr lang="de-CH" dirty="0" err="1" smtClean="0"/>
-              <a:t>No</a:t>
-            </a:r>
-            <a:r>
-              <a:rPr lang="de-CH" dirty="0" smtClean="0"/>
-              <a:t> </a:t>
-            </a:r>
-            <a:r>
-              <a:rPr lang="de-CH" dirty="0" err="1" smtClean="0"/>
-              <a:t>side-effects</a:t>
-            </a:r>
-            <a:endParaRPr lang="de-CH" dirty="0" smtClean="0"/>
-          </a:p>
-          <a:p>
-            <a:pPr marL="608013" lvl="1" indent="-342900">
-              <a:buFont typeface="Wingdings" panose="05000000000000000000" pitchFamily="2" charset="2"/>
-              <a:buChar char="ü"/>
-            </a:pPr>
-            <a:r>
-              <a:rPr lang="de-CH" dirty="0" err="1" smtClean="0"/>
-              <a:t>Functions</a:t>
-            </a:r>
-            <a:r>
-              <a:rPr lang="de-CH" dirty="0" smtClean="0"/>
-              <a:t> </a:t>
-            </a:r>
-            <a:r>
-              <a:rPr lang="de-CH" dirty="0" err="1" smtClean="0"/>
-              <a:t>are</a:t>
-            </a:r>
-            <a:r>
-              <a:rPr lang="de-CH" dirty="0" smtClean="0"/>
-              <a:t> just </a:t>
-            </a:r>
-            <a:r>
-              <a:rPr lang="de-CH" dirty="0" err="1" smtClean="0"/>
-              <a:t>transforming</a:t>
-            </a:r>
-            <a:r>
-              <a:rPr lang="de-CH" dirty="0" smtClean="0"/>
-              <a:t> </a:t>
-            </a:r>
-            <a:r>
-              <a:rPr lang="de-CH" dirty="0" err="1" smtClean="0"/>
-              <a:t>parameter</a:t>
-            </a:r>
-            <a:r>
-              <a:rPr lang="de-CH" dirty="0" smtClean="0"/>
-              <a:t> </a:t>
-            </a:r>
-            <a:r>
-              <a:rPr lang="de-CH" dirty="0" err="1" smtClean="0"/>
-              <a:t>values</a:t>
-            </a:r>
-            <a:r>
-              <a:rPr lang="de-CH" dirty="0" smtClean="0"/>
-              <a:t> </a:t>
-            </a:r>
-            <a:r>
-              <a:rPr lang="de-CH" dirty="0" err="1" smtClean="0"/>
-              <a:t>to</a:t>
-            </a:r>
-            <a:r>
-              <a:rPr lang="de-CH" dirty="0" smtClean="0"/>
-              <a:t> </a:t>
-            </a:r>
-            <a:r>
-              <a:rPr lang="de-CH" dirty="0" err="1" smtClean="0"/>
-              <a:t>return</a:t>
-            </a:r>
-            <a:r>
-              <a:rPr lang="de-CH" dirty="0" smtClean="0"/>
-              <a:t> </a:t>
-            </a:r>
-            <a:r>
-              <a:rPr lang="de-CH" dirty="0" err="1" smtClean="0"/>
-              <a:t>values</a:t>
-            </a:r>
-            <a:endParaRPr lang="de-CH" dirty="0" smtClean="0"/>
-          </a:p>
-          <a:p>
-            <a:pPr marL="608013" lvl="1" indent="-342900">
-              <a:buFont typeface="Wingdings" panose="05000000000000000000" pitchFamily="2" charset="2"/>
-              <a:buChar char="ü"/>
-            </a:pPr>
-            <a:r>
-              <a:rPr lang="de-CH" dirty="0" err="1"/>
-              <a:t>Referential</a:t>
-            </a:r>
-            <a:r>
-              <a:rPr lang="de-CH" dirty="0"/>
-              <a:t> </a:t>
-            </a:r>
-            <a:r>
-              <a:rPr lang="de-CH" dirty="0" err="1"/>
-              <a:t>transparency</a:t>
-            </a:r>
-            <a:endParaRPr lang="de-CH" dirty="0" smtClean="0"/>
-          </a:p>
-          <a:p>
-            <a:pPr marL="342900" indent="-342900">
-              <a:buFont typeface="Wingdings" panose="05000000000000000000" pitchFamily="2" charset="2"/>
-              <a:buChar char="Ø"/>
-            </a:pPr>
-            <a:r>
               <a:rPr lang="de-CH" dirty="0" err="1" smtClean="0">
                 <a:solidFill>
                   <a:schemeClr val="bg1">
@@ -12749,7 +14373,7 @@
     </p:spTree>
     <p:extLst>
       <p:ext uri="{BB962C8B-B14F-4D97-AF65-F5344CB8AC3E}">
-        <p14:creationId xmlns:p14="http://schemas.microsoft.com/office/powerpoint/2010/main" val="144156127"/>
+        <p14:creationId xmlns:p14="http://schemas.microsoft.com/office/powerpoint/2010/main" val="4192120826"/>
       </p:ext>
     </p:extLst>
   </p:cSld>
@@ -12899,6 +14523,426 @@
               <a:buChar char="Ø"/>
             </a:pPr>
             <a:r>
+              <a:rPr lang="de-CH" b="1" dirty="0" smtClean="0"/>
+              <a:t>Pure </a:t>
+            </a:r>
+            <a:r>
+              <a:rPr lang="de-CH" b="1" dirty="0" err="1" smtClean="0"/>
+              <a:t>functions</a:t>
+            </a:r>
+            <a:endParaRPr lang="de-CH" b="1" dirty="0" smtClean="0"/>
+          </a:p>
+          <a:p>
+            <a:pPr marL="608013" lvl="1" indent="-342900">
+              <a:buFont typeface="Wingdings" panose="05000000000000000000" pitchFamily="2" charset="2"/>
+              <a:buChar char="ü"/>
+            </a:pPr>
+            <a:r>
+              <a:rPr lang="de-CH" dirty="0" err="1" smtClean="0"/>
+              <a:t>No</a:t>
+            </a:r>
+            <a:r>
+              <a:rPr lang="de-CH" dirty="0" smtClean="0"/>
+              <a:t> </a:t>
+            </a:r>
+            <a:r>
+              <a:rPr lang="de-CH" dirty="0" err="1" smtClean="0"/>
+              <a:t>side-effects</a:t>
+            </a:r>
+            <a:endParaRPr lang="de-CH" dirty="0" smtClean="0"/>
+          </a:p>
+          <a:p>
+            <a:pPr marL="608013" lvl="1" indent="-342900">
+              <a:buFont typeface="Wingdings" panose="05000000000000000000" pitchFamily="2" charset="2"/>
+              <a:buChar char="ü"/>
+            </a:pPr>
+            <a:r>
+              <a:rPr lang="de-CH" dirty="0" err="1" smtClean="0"/>
+              <a:t>Functions</a:t>
+            </a:r>
+            <a:r>
+              <a:rPr lang="de-CH" dirty="0" smtClean="0"/>
+              <a:t> </a:t>
+            </a:r>
+            <a:r>
+              <a:rPr lang="de-CH" dirty="0" err="1" smtClean="0"/>
+              <a:t>are</a:t>
+            </a:r>
+            <a:r>
+              <a:rPr lang="de-CH" dirty="0" smtClean="0"/>
+              <a:t> just </a:t>
+            </a:r>
+            <a:r>
+              <a:rPr lang="de-CH" dirty="0" err="1" smtClean="0"/>
+              <a:t>transforming</a:t>
+            </a:r>
+            <a:r>
+              <a:rPr lang="de-CH" dirty="0" smtClean="0"/>
+              <a:t> </a:t>
+            </a:r>
+            <a:r>
+              <a:rPr lang="de-CH" dirty="0" err="1" smtClean="0"/>
+              <a:t>parameter</a:t>
+            </a:r>
+            <a:r>
+              <a:rPr lang="de-CH" dirty="0" smtClean="0"/>
+              <a:t> </a:t>
+            </a:r>
+            <a:r>
+              <a:rPr lang="de-CH" dirty="0" err="1" smtClean="0"/>
+              <a:t>values</a:t>
+            </a:r>
+            <a:r>
+              <a:rPr lang="de-CH" dirty="0" smtClean="0"/>
+              <a:t> </a:t>
+            </a:r>
+            <a:r>
+              <a:rPr lang="de-CH" dirty="0" err="1" smtClean="0"/>
+              <a:t>to</a:t>
+            </a:r>
+            <a:r>
+              <a:rPr lang="de-CH" dirty="0" smtClean="0"/>
+              <a:t> </a:t>
+            </a:r>
+            <a:r>
+              <a:rPr lang="de-CH" dirty="0" err="1" smtClean="0"/>
+              <a:t>return</a:t>
+            </a:r>
+            <a:r>
+              <a:rPr lang="de-CH" dirty="0" smtClean="0"/>
+              <a:t> </a:t>
+            </a:r>
+            <a:r>
+              <a:rPr lang="de-CH" dirty="0" err="1" smtClean="0"/>
+              <a:t>values</a:t>
+            </a:r>
+            <a:endParaRPr lang="de-CH" dirty="0" smtClean="0"/>
+          </a:p>
+          <a:p>
+            <a:pPr marL="608013" lvl="1" indent="-342900">
+              <a:buFont typeface="Wingdings" panose="05000000000000000000" pitchFamily="2" charset="2"/>
+              <a:buChar char="ü"/>
+            </a:pPr>
+            <a:r>
+              <a:rPr lang="de-CH" dirty="0" err="1"/>
+              <a:t>Referential</a:t>
+            </a:r>
+            <a:r>
+              <a:rPr lang="de-CH" dirty="0"/>
+              <a:t> </a:t>
+            </a:r>
+            <a:r>
+              <a:rPr lang="de-CH" dirty="0" err="1"/>
+              <a:t>transparency</a:t>
+            </a:r>
+            <a:endParaRPr lang="de-CH" dirty="0" smtClean="0"/>
+          </a:p>
+          <a:p>
+            <a:pPr marL="342900" indent="-342900">
+              <a:buFont typeface="Wingdings" panose="05000000000000000000" pitchFamily="2" charset="2"/>
+              <a:buChar char="Ø"/>
+            </a:pPr>
+            <a:r>
+              <a:rPr lang="de-CH" dirty="0" err="1" smtClean="0">
+                <a:solidFill>
+                  <a:schemeClr val="bg1">
+                    <a:lumMod val="75000"/>
+                  </a:schemeClr>
+                </a:solidFill>
+              </a:rPr>
+              <a:t>Immutability</a:t>
+            </a:r>
+            <a:endParaRPr lang="de-CH" dirty="0" smtClean="0">
+              <a:solidFill>
+                <a:schemeClr val="bg1">
+                  <a:lumMod val="75000"/>
+                </a:schemeClr>
+              </a:solidFill>
+            </a:endParaRPr>
+          </a:p>
+          <a:p>
+            <a:pPr marL="342900" indent="-342900">
+              <a:buFont typeface="Wingdings" panose="05000000000000000000" pitchFamily="2" charset="2"/>
+              <a:buChar char="Ø"/>
+            </a:pPr>
+            <a:r>
+              <a:rPr lang="de-CH" dirty="0" err="1" smtClean="0">
+                <a:solidFill>
+                  <a:schemeClr val="bg1">
+                    <a:lumMod val="75000"/>
+                  </a:schemeClr>
+                </a:solidFill>
+              </a:rPr>
+              <a:t>Lazy</a:t>
+            </a:r>
+            <a:r>
+              <a:rPr lang="de-CH" dirty="0" smtClean="0">
+                <a:solidFill>
+                  <a:schemeClr val="bg1">
+                    <a:lumMod val="75000"/>
+                  </a:schemeClr>
+                </a:solidFill>
+              </a:rPr>
+              <a:t> </a:t>
+            </a:r>
+            <a:r>
+              <a:rPr lang="de-CH" dirty="0" err="1" smtClean="0">
+                <a:solidFill>
+                  <a:schemeClr val="bg1">
+                    <a:lumMod val="75000"/>
+                  </a:schemeClr>
+                </a:solidFill>
+              </a:rPr>
+              <a:t>evaluation</a:t>
+            </a:r>
+            <a:endParaRPr lang="de-CH" dirty="0" smtClean="0">
+              <a:solidFill>
+                <a:schemeClr val="bg1">
+                  <a:lumMod val="75000"/>
+                </a:schemeClr>
+              </a:solidFill>
+            </a:endParaRPr>
+          </a:p>
+        </p:txBody>
+      </p:sp>
+      <p:sp>
+        <p:nvSpPr>
+          <p:cNvPr id="6" name="Text Placeholder 5"/>
+          <p:cNvSpPr>
+            <a:spLocks noGrp="1"/>
+          </p:cNvSpPr>
+          <p:nvPr>
+            <p:ph type="body" sz="quarter" idx="13"/>
+          </p:nvPr>
+        </p:nvSpPr>
+        <p:spPr/>
+        <p:txBody>
+          <a:bodyPr/>
+          <a:lstStyle/>
+          <a:p>
+            <a:r>
+              <a:rPr lang="de-CH" dirty="0" err="1"/>
+              <a:t>Functional</a:t>
+            </a:r>
+            <a:r>
+              <a:rPr lang="de-CH" dirty="0"/>
+              <a:t> </a:t>
+            </a:r>
+            <a:r>
+              <a:rPr lang="de-CH" dirty="0" err="1"/>
+              <a:t>programming</a:t>
+            </a:r>
+            <a:r>
+              <a:rPr lang="de-CH" dirty="0"/>
+              <a:t> in a </a:t>
+            </a:r>
+            <a:r>
+              <a:rPr lang="de-CH" dirty="0" err="1"/>
+              <a:t>nutshell</a:t>
+            </a:r>
+            <a:endParaRPr lang="de-CH" dirty="0"/>
+          </a:p>
+        </p:txBody>
+      </p:sp>
+      <p:sp>
+        <p:nvSpPr>
+          <p:cNvPr id="9" name="Footer Placeholder 8"/>
+          <p:cNvSpPr>
+            <a:spLocks noGrp="1"/>
+          </p:cNvSpPr>
+          <p:nvPr>
+            <p:ph type="ftr" sz="quarter" idx="11"/>
+          </p:nvPr>
+        </p:nvSpPr>
+        <p:spPr/>
+        <p:txBody>
+          <a:bodyPr/>
+          <a:lstStyle/>
+          <a:p>
+            <a:r>
+              <a:rPr lang="de-CH" smtClean="0"/>
+              <a:t>Rezepte aus der funktionalen Programmierung | ico</a:t>
+            </a:r>
+            <a:endParaRPr lang="de-CH" dirty="0"/>
+          </a:p>
+        </p:txBody>
+      </p:sp>
+      <p:sp>
+        <p:nvSpPr>
+          <p:cNvPr id="8" name="Date Placeholder 7"/>
+          <p:cNvSpPr>
+            <a:spLocks noGrp="1"/>
+          </p:cNvSpPr>
+          <p:nvPr>
+            <p:ph type="dt" sz="half" idx="10"/>
+          </p:nvPr>
+        </p:nvSpPr>
+        <p:spPr/>
+        <p:txBody>
+          <a:bodyPr/>
+          <a:lstStyle/>
+          <a:p>
+            <a:r>
+              <a:rPr lang="de-CH" smtClean="0"/>
+              <a:t>14. November 2014</a:t>
+            </a:r>
+            <a:endParaRPr lang="de-CH" dirty="0"/>
+          </a:p>
+        </p:txBody>
+      </p:sp>
+    </p:spTree>
+    <p:extLst>
+      <p:ext uri="{BB962C8B-B14F-4D97-AF65-F5344CB8AC3E}">
+        <p14:creationId xmlns:p14="http://schemas.microsoft.com/office/powerpoint/2010/main" val="144156127"/>
+      </p:ext>
+    </p:extLst>
+  </p:cSld>
+  <p:clrMapOvr>
+    <a:masterClrMapping/>
+  </p:clrMapOvr>
+  <p:timing>
+    <p:tnLst>
+      <p:par>
+        <p:cTn id="1" dur="indefinite" restart="never" nodeType="tmRoot"/>
+      </p:par>
+    </p:tnLst>
+  </p:timing>
+</p:sld>
+</file>
+
+<file path=ppt/slides/slide8.xml><?xml version="1.0" encoding="utf-8"?>
+<p:sld xmlns:a="http://schemas.openxmlformats.org/drawingml/2006/main" xmlns:r="http://schemas.openxmlformats.org/officeDocument/2006/relationships" xmlns:p="http://schemas.openxmlformats.org/presentationml/2006/main">
+  <p:cSld>
+    <p:spTree>
+      <p:nvGrpSpPr>
+        <p:cNvPr id="1" name=""/>
+        <p:cNvGrpSpPr/>
+        <p:nvPr/>
+      </p:nvGrpSpPr>
+      <p:grpSpPr>
+        <a:xfrm>
+          <a:off x="0" y="0"/>
+          <a:ext cx="0" cy="0"/>
+          <a:chOff x="0" y="0"/>
+          <a:chExt cx="0" cy="0"/>
+        </a:xfrm>
+      </p:grpSpPr>
+      <p:sp>
+        <p:nvSpPr>
+          <p:cNvPr id="2" name="Title 1"/>
+          <p:cNvSpPr>
+            <a:spLocks noGrp="1"/>
+          </p:cNvSpPr>
+          <p:nvPr>
+            <p:ph type="title"/>
+          </p:nvPr>
+        </p:nvSpPr>
+        <p:spPr/>
+        <p:txBody>
+          <a:bodyPr/>
+          <a:lstStyle/>
+          <a:p>
+            <a:r>
+              <a:rPr lang="de-CH" dirty="0" err="1"/>
+              <a:t>Introduction</a:t>
+            </a:r>
+            <a:endParaRPr lang="de-CH" dirty="0"/>
+          </a:p>
+        </p:txBody>
+      </p:sp>
+      <p:sp>
+        <p:nvSpPr>
+          <p:cNvPr id="3" name="Content Placeholder 2"/>
+          <p:cNvSpPr>
+            <a:spLocks noGrp="1"/>
+          </p:cNvSpPr>
+          <p:nvPr>
+            <p:ph idx="1"/>
+          </p:nvPr>
+        </p:nvSpPr>
+        <p:spPr/>
+        <p:txBody>
+          <a:bodyPr/>
+          <a:lstStyle/>
+          <a:p>
+            <a:pPr marL="342900" indent="-342900">
+              <a:buFont typeface="Wingdings" panose="05000000000000000000" pitchFamily="2" charset="2"/>
+              <a:buChar char="Ø"/>
+            </a:pPr>
+            <a:r>
+              <a:rPr lang="de-CH" dirty="0">
+                <a:solidFill>
+                  <a:schemeClr val="bg1">
+                    <a:lumMod val="75000"/>
+                  </a:schemeClr>
+                </a:solidFill>
+              </a:rPr>
+              <a:t>First-class </a:t>
+            </a:r>
+            <a:r>
+              <a:rPr lang="de-CH" dirty="0" err="1" smtClean="0">
+                <a:solidFill>
+                  <a:schemeClr val="bg1">
+                    <a:lumMod val="75000"/>
+                  </a:schemeClr>
+                </a:solidFill>
+              </a:rPr>
+              <a:t>and</a:t>
+            </a:r>
+            <a:r>
+              <a:rPr lang="de-CH" dirty="0" smtClean="0">
+                <a:solidFill>
+                  <a:schemeClr val="bg1">
+                    <a:lumMod val="75000"/>
+                  </a:schemeClr>
+                </a:solidFill>
+              </a:rPr>
+              <a:t> </a:t>
+            </a:r>
+            <a:r>
+              <a:rPr lang="de-CH" dirty="0" err="1" smtClean="0">
+                <a:solidFill>
+                  <a:schemeClr val="bg1">
+                    <a:lumMod val="75000"/>
+                  </a:schemeClr>
+                </a:solidFill>
+              </a:rPr>
+              <a:t>higher</a:t>
+            </a:r>
+            <a:r>
+              <a:rPr lang="de-CH" dirty="0" smtClean="0">
+                <a:solidFill>
+                  <a:schemeClr val="bg1">
+                    <a:lumMod val="75000"/>
+                  </a:schemeClr>
+                </a:solidFill>
+              </a:rPr>
+              <a:t>-order </a:t>
+            </a:r>
+            <a:r>
+              <a:rPr lang="de-CH" dirty="0" err="1" smtClean="0">
+                <a:solidFill>
+                  <a:schemeClr val="bg1">
+                    <a:lumMod val="75000"/>
+                  </a:schemeClr>
+                </a:solidFill>
+              </a:rPr>
+              <a:t>functions</a:t>
+            </a:r>
+            <a:endParaRPr lang="de-CH" dirty="0" smtClean="0">
+              <a:solidFill>
+                <a:schemeClr val="bg1">
+                  <a:lumMod val="75000"/>
+                </a:schemeClr>
+              </a:solidFill>
+            </a:endParaRPr>
+          </a:p>
+          <a:p>
+            <a:pPr marL="342900" indent="-342900">
+              <a:buFont typeface="Wingdings" panose="05000000000000000000" pitchFamily="2" charset="2"/>
+              <a:buChar char="Ø"/>
+            </a:pPr>
+            <a:r>
               <a:rPr lang="de-CH" dirty="0" smtClean="0">
                 <a:solidFill>
                   <a:schemeClr val="bg1">
@@ -13165,7 +15209,7 @@
 </p:sld>
 </file>
 
-<file path=ppt/slides/slide8.xml><?xml version="1.0" encoding="utf-8"?>
+<file path=ppt/slides/slide9.xml><?xml version="1.0" encoding="utf-8"?>
 <p:sld xmlns:a="http://schemas.openxmlformats.org/drawingml/2006/main" xmlns:r="http://schemas.openxmlformats.org/officeDocument/2006/relationships" xmlns:p="http://schemas.openxmlformats.org/presentationml/2006/main">
   <p:cSld>
     <p:spTree>
@@ -14373,203 +16417,6 @@
       <p:bldP spid="12" grpId="0" animBg="1"/>
     </p:bldLst>
   </p:timing>
-</p:sld>
-</file>
-
-<file path=ppt/slides/slide9.xml><?xml version="1.0" encoding="utf-8"?>
-<p:sld xmlns:a="http://schemas.openxmlformats.org/drawingml/2006/main" xmlns:r="http://schemas.openxmlformats.org/officeDocument/2006/relationships" xmlns:p="http://schemas.openxmlformats.org/presentationml/2006/main">
-  <p:cSld>
-    <p:spTree>
-      <p:nvGrpSpPr>
-        <p:cNvPr id="1" name=""/>
-        <p:cNvGrpSpPr/>
-        <p:nvPr/>
-      </p:nvGrpSpPr>
-      <p:grpSpPr>
-        <a:xfrm>
-          <a:off x="0" y="0"/>
-          <a:ext cx="0" cy="0"/>
-          <a:chOff x="0" y="0"/>
-          <a:chExt cx="0" cy="0"/>
-        </a:xfrm>
-      </p:grpSpPr>
-      <p:sp>
-        <p:nvSpPr>
-          <p:cNvPr id="2" name="Title 1"/>
-          <p:cNvSpPr>
-            <a:spLocks noGrp="1"/>
-          </p:cNvSpPr>
-          <p:nvPr>
-            <p:ph type="title"/>
-          </p:nvPr>
-        </p:nvSpPr>
-        <p:spPr/>
-        <p:txBody>
-          <a:bodyPr/>
-          <a:lstStyle/>
-          <a:p>
-            <a:r>
-              <a:rPr lang="en-US" dirty="0" smtClean="0"/>
-              <a:t>Introduction</a:t>
-            </a:r>
-            <a:endParaRPr lang="en-US" dirty="0"/>
-          </a:p>
-        </p:txBody>
-      </p:sp>
-      <p:sp>
-        <p:nvSpPr>
-          <p:cNvPr id="3" name="Content Placeholder 2"/>
-          <p:cNvSpPr>
-            <a:spLocks noGrp="1"/>
-          </p:cNvSpPr>
-          <p:nvPr>
-            <p:ph idx="1"/>
-          </p:nvPr>
-        </p:nvSpPr>
-        <p:spPr/>
-        <p:txBody>
-          <a:bodyPr/>
-          <a:lstStyle/>
-          <a:p>
-            <a:r>
-              <a:rPr lang="en-US" dirty="0" smtClean="0"/>
-              <a:t>It’s all about </a:t>
-            </a:r>
-          </a:p>
-          <a:p>
-            <a:pPr marL="342900" indent="-342900">
-              <a:buFont typeface="Arial" panose="020B0604020202020204" pitchFamily="34" charset="0"/>
-              <a:buChar char="•"/>
-            </a:pPr>
-            <a:r>
-              <a:rPr lang="en-US" dirty="0" smtClean="0"/>
-              <a:t>transforming values</a:t>
-            </a:r>
-          </a:p>
-          <a:p>
-            <a:pPr marL="342900" indent="-342900">
-              <a:buFont typeface="Arial" panose="020B0604020202020204" pitchFamily="34" charset="0"/>
-              <a:buChar char="•"/>
-            </a:pPr>
-            <a:r>
-              <a:rPr lang="en-US" dirty="0" smtClean="0"/>
-              <a:t>reducing side effects</a:t>
-            </a:r>
-          </a:p>
-          <a:p>
-            <a:pPr marL="342900" indent="-342900">
-              <a:buFont typeface="Arial" panose="020B0604020202020204" pitchFamily="34" charset="0"/>
-              <a:buChar char="•"/>
-            </a:pPr>
-            <a:endParaRPr lang="en-US" dirty="0"/>
-          </a:p>
-          <a:p>
-            <a:r>
-              <a:rPr lang="en-US" dirty="0" smtClean="0"/>
-              <a:t>Functional programming concepts focus on</a:t>
-            </a:r>
-          </a:p>
-          <a:p>
-            <a:pPr marL="342900" indent="-342900">
-              <a:buFont typeface="Arial" panose="020B0604020202020204" pitchFamily="34" charset="0"/>
-              <a:buChar char="•"/>
-            </a:pPr>
-            <a:r>
-              <a:rPr lang="en-US" dirty="0" smtClean="0"/>
-              <a:t>expressing and composing value transformations</a:t>
-            </a:r>
-          </a:p>
-          <a:p>
-            <a:pPr marL="342900" indent="-342900">
-              <a:buFont typeface="Arial" panose="020B0604020202020204" pitchFamily="34" charset="0"/>
-              <a:buChar char="•"/>
-            </a:pPr>
-            <a:r>
-              <a:rPr lang="en-US" dirty="0" smtClean="0"/>
-              <a:t>encapsulating side effect</a:t>
-            </a:r>
-          </a:p>
-        </p:txBody>
-      </p:sp>
-      <p:sp>
-        <p:nvSpPr>
-          <p:cNvPr id="4" name="Date Placeholder 3"/>
-          <p:cNvSpPr>
-            <a:spLocks noGrp="1"/>
-          </p:cNvSpPr>
-          <p:nvPr>
-            <p:ph type="dt" sz="half" idx="10"/>
-          </p:nvPr>
-        </p:nvSpPr>
-        <p:spPr/>
-        <p:txBody>
-          <a:bodyPr/>
-          <a:lstStyle/>
-          <a:p>
-            <a:r>
-              <a:rPr lang="de-CH" smtClean="0"/>
-              <a:t>14. September 2015</a:t>
-            </a:r>
-            <a:endParaRPr lang="de-CH" dirty="0"/>
-          </a:p>
-        </p:txBody>
-      </p:sp>
-      <p:sp>
-        <p:nvSpPr>
-          <p:cNvPr id="5" name="Footer Placeholder 4"/>
-          <p:cNvSpPr>
-            <a:spLocks noGrp="1"/>
-          </p:cNvSpPr>
-          <p:nvPr>
-            <p:ph type="ftr" sz="quarter" idx="11"/>
-          </p:nvPr>
-        </p:nvSpPr>
-        <p:spPr/>
-        <p:txBody>
-          <a:bodyPr/>
-          <a:lstStyle/>
-          <a:p>
-            <a:r>
-              <a:rPr lang="en-US" smtClean="0"/>
-              <a:t>Functional Design Patterns for OO Practitioners</a:t>
-            </a:r>
-            <a:endParaRPr lang="de-CH" dirty="0"/>
-          </a:p>
-        </p:txBody>
-      </p:sp>
-      <p:sp>
-        <p:nvSpPr>
-          <p:cNvPr id="6" name="Text Placeholder 5"/>
-          <p:cNvSpPr>
-            <a:spLocks noGrp="1"/>
-          </p:cNvSpPr>
-          <p:nvPr>
-            <p:ph type="body" sz="quarter" idx="13"/>
-          </p:nvPr>
-        </p:nvSpPr>
-        <p:spPr/>
-        <p:txBody>
-          <a:bodyPr/>
-          <a:lstStyle/>
-          <a:p>
-            <a:r>
-              <a:rPr lang="en-US" dirty="0" smtClean="0"/>
-              <a:t>Functional Programming in 1 slide</a:t>
-            </a:r>
-            <a:endParaRPr lang="en-US" dirty="0"/>
-          </a:p>
-        </p:txBody>
-      </p:sp>
-    </p:spTree>
-    <p:extLst>
-      <p:ext uri="{BB962C8B-B14F-4D97-AF65-F5344CB8AC3E}">
-        <p14:creationId xmlns:p14="http://schemas.microsoft.com/office/powerpoint/2010/main" val="355283669"/>
-      </p:ext>
-    </p:extLst>
-  </p:cSld>
-  <p:clrMapOvr>
-    <a:masterClrMapping/>
-  </p:clrMapOvr>
 </p:sld>
 </file>
 

</xml_diff>

<commit_message>
added some ideas to the outline slide
</commit_message>
<xml_diff>
--- a/Functional Design Patterns for OO Practitioners.pptx
+++ b/Functional Design Patterns for OO Practitioners.pptx
@@ -67,7 +67,7 @@
       <p:boldItalic r:id="rId51"/>
     </p:embeddedFont>
     <p:embeddedFont>
-      <p:font typeface="AA Zuehlke" panose="02000503060000020004" pitchFamily="2" charset="0"/>
+      <p:font typeface="AA Zuehlke" panose="020B0604020202020204" charset="0"/>
       <p:regular r:id="rId52"/>
       <p:italic r:id="rId53"/>
     </p:embeddedFont>
@@ -314,7 +314,7 @@
               <a:rPr lang="de-DE" smtClean="0">
                 <a:latin typeface="AA Zuehlke" pitchFamily="2" charset="0"/>
               </a:rPr>
-              <a:t>22.09.2015</a:t>
+              <a:t>23.09.2015</a:t>
             </a:fld>
             <a:endParaRPr lang="de-DE">
               <a:latin typeface="AA Zuehlke" pitchFamily="2" charset="0"/>
@@ -492,7 +492,7 @@
             <a:fld id="{A6966AE6-B72D-4967-9CA3-8469D2863705}" type="datetimeFigureOut">
               <a:rPr lang="en-US" smtClean="0"/>
               <a:pPr/>
-              <a:t>9/22/2015</a:t>
+              <a:t>9/23/2015</a:t>
             </a:fld>
             <a:endParaRPr lang="en-US" dirty="0"/>
           </a:p>
@@ -25593,11 +25593,7 @@
             </a:r>
             <a:r>
               <a:rPr lang="en-GB" dirty="0" smtClean="0"/>
-              <a:t> are the links of the value transformation chain</a:t>
-            </a:r>
-            <a:r>
-              <a:rPr lang="en-GB" dirty="0" smtClean="0"/>
-              <a:t>.</a:t>
+              <a:t> are the links of the value transformation chain.</a:t>
             </a:r>
           </a:p>
           <a:p>
@@ -25647,7 +25643,6 @@
               <a:rPr lang="en-GB" dirty="0" smtClean="0"/>
               <a:t>Option = Optional</a:t>
             </a:r>
-            <a:endParaRPr lang="en-GB" dirty="0" smtClean="0"/>
           </a:p>
           <a:p>
             <a:pPr marL="257175" indent="-257175">
@@ -33566,8 +33561,33 @@
             </a:pPr>
             <a:r>
               <a:rPr lang="en-GB" dirty="0"/>
-              <a:t>Pure functions</a:t>
-            </a:r>
+              <a:t>Pure </a:t>
+            </a:r>
+            <a:r>
+              <a:rPr lang="en-GB" dirty="0" smtClean="0"/>
+              <a:t>functions</a:t>
+            </a:r>
+          </a:p>
+          <a:p>
+            <a:pPr marL="522288" lvl="1" indent="-257175">
+              <a:buFont typeface="Arial" panose="020B0604020202020204" pitchFamily="34" charset="0"/>
+              <a:buChar char="•"/>
+            </a:pPr>
+            <a:r>
+              <a:rPr lang="en-GB" dirty="0" smtClean="0"/>
+              <a:t>Benefits</a:t>
+            </a:r>
+          </a:p>
+          <a:p>
+            <a:pPr marL="522288" lvl="1" indent="-257175">
+              <a:buFont typeface="Arial" panose="020B0604020202020204" pitchFamily="34" charset="0"/>
+              <a:buChar char="•"/>
+            </a:pPr>
+            <a:r>
+              <a:rPr lang="en-GB" dirty="0" smtClean="0"/>
+              <a:t>How to raise awareness for side effects</a:t>
+            </a:r>
+            <a:endParaRPr lang="en-GB" dirty="0"/>
           </a:p>
           <a:p>
             <a:pPr marL="257175" indent="-257175">
@@ -33580,6 +33600,45 @@
             </a:r>
           </a:p>
           <a:p>
+            <a:pPr marL="522288" lvl="1" indent="-257175">
+              <a:buFont typeface="Arial" panose="020B0604020202020204" pitchFamily="34" charset="0"/>
+              <a:buChar char="•"/>
+            </a:pPr>
+            <a:r>
+              <a:rPr lang="en-GB" dirty="0" smtClean="0"/>
+              <a:t>Overview and application</a:t>
+            </a:r>
+          </a:p>
+          <a:p>
+            <a:pPr marL="522288" lvl="1" indent="-257175">
+              <a:buFont typeface="Arial" panose="020B0604020202020204" pitchFamily="34" charset="0"/>
+              <a:buChar char="•"/>
+            </a:pPr>
+            <a:r>
+              <a:rPr lang="en-GB" dirty="0" smtClean="0"/>
+              <a:t>Context </a:t>
+            </a:r>
+            <a:r>
+              <a:rPr lang="en-GB" dirty="0" smtClean="0"/>
+              <a:t>types, </a:t>
+            </a:r>
+            <a:r>
+              <a:rPr lang="en-GB" smtClean="0"/>
+              <a:t>function chaining</a:t>
+            </a:r>
+            <a:endParaRPr lang="en-GB" dirty="0" smtClean="0"/>
+          </a:p>
+          <a:p>
+            <a:pPr marL="522288" lvl="1" indent="-257175">
+              <a:buFont typeface="Arial" panose="020B0604020202020204" pitchFamily="34" charset="0"/>
+              <a:buChar char="•"/>
+            </a:pPr>
+            <a:r>
+              <a:rPr lang="en-GB" dirty="0" smtClean="0"/>
+              <a:t>Reactive programming</a:t>
+            </a:r>
+          </a:p>
+          <a:p>
             <a:pPr marL="257175" indent="-257175">
               <a:buFont typeface="Arial" panose="020B0604020202020204" pitchFamily="34" charset="0"/>
               <a:buChar char="•"/>
@@ -33587,6 +33646,26 @@
             <a:r>
               <a:rPr lang="en-GB" dirty="0" smtClean="0"/>
               <a:t>Immutability</a:t>
+            </a:r>
+          </a:p>
+          <a:p>
+            <a:pPr marL="522288" lvl="1" indent="-257175">
+              <a:buFont typeface="Arial" panose="020B0604020202020204" pitchFamily="34" charset="0"/>
+              <a:buChar char="•"/>
+            </a:pPr>
+            <a:r>
+              <a:rPr lang="en-GB" dirty="0" smtClean="0"/>
+              <a:t>Structural sharing</a:t>
+            </a:r>
+          </a:p>
+          <a:p>
+            <a:pPr marL="522288" lvl="1" indent="-257175">
+              <a:buFont typeface="Arial" panose="020B0604020202020204" pitchFamily="34" charset="0"/>
+              <a:buChar char="•"/>
+            </a:pPr>
+            <a:r>
+              <a:rPr lang="en-GB" dirty="0" smtClean="0"/>
+              <a:t>Lenses</a:t>
             </a:r>
           </a:p>
         </p:txBody>

</xml_diff>

<commit_message>
readme & link to repo in slides
</commit_message>
<xml_diff>
--- a/Functional Design Patterns for OO Practitioners.pptx
+++ b/Functional Design Patterns for OO Practitioners.pptx
@@ -61,16 +61,16 @@
   <p:notesSz cx="6858000" cy="9144000"/>
   <p:embeddedFontLst>
     <p:embeddedFont>
-      <p:font typeface="AA Zuehlke" panose="02000503060000020004" pitchFamily="2" charset="0"/>
+      <p:font typeface="Consolas" panose="020B0609020204030204" pitchFamily="49" charset="0"/>
       <p:regular r:id="rId49"/>
-      <p:italic r:id="rId50"/>
+      <p:bold r:id="rId50"/>
+      <p:italic r:id="rId51"/>
+      <p:boldItalic r:id="rId52"/>
     </p:embeddedFont>
     <p:embeddedFont>
-      <p:font typeface="Consolas" panose="020B0609020204030204" pitchFamily="49" charset="0"/>
-      <p:regular r:id="rId51"/>
-      <p:bold r:id="rId52"/>
-      <p:italic r:id="rId53"/>
-      <p:boldItalic r:id="rId54"/>
+      <p:font typeface="AA Zuehlke" panose="02000503060000020004" pitchFamily="2" charset="0"/>
+      <p:regular r:id="rId53"/>
+      <p:italic r:id="rId54"/>
     </p:embeddedFont>
   </p:embeddedFontLst>
   <p:custDataLst>
@@ -1172,6 +1172,13 @@
         </dgm:presLayoutVars>
       </dgm:prSet>
       <dgm:spPr/>
+      <dgm:t>
+        <a:bodyPr/>
+        <a:lstStyle/>
+        <a:p>
+          <a:endParaRPr lang="en-GB"/>
+        </a:p>
+      </dgm:t>
     </dgm:pt>
     <dgm:pt modelId="{7159C691-860A-4D9C-AE25-CCDC36A991BF}" type="pres">
       <dgm:prSet presAssocID="{A891DFA7-A942-4384-8638-CF556EAF8589}" presName="node" presStyleLbl="node1" presStyleIdx="0" presStyleCnt="3" custRadScaleRad="82113">
@@ -1191,10 +1198,24 @@
     <dgm:pt modelId="{BF744900-CDE5-4D5A-9709-AFA782F2725C}" type="pres">
       <dgm:prSet presAssocID="{628B6A62-D463-45C2-8DBC-1358E312F45F}" presName="sibTrans" presStyleLbl="sibTrans2D1" presStyleIdx="0" presStyleCnt="3"/>
       <dgm:spPr/>
+      <dgm:t>
+        <a:bodyPr/>
+        <a:lstStyle/>
+        <a:p>
+          <a:endParaRPr lang="en-GB"/>
+        </a:p>
+      </dgm:t>
     </dgm:pt>
     <dgm:pt modelId="{A8EDE85E-58DB-4AD7-A6A1-E868F824E5F7}" type="pres">
       <dgm:prSet presAssocID="{628B6A62-D463-45C2-8DBC-1358E312F45F}" presName="connectorText" presStyleLbl="sibTrans2D1" presStyleIdx="0" presStyleCnt="3"/>
       <dgm:spPr/>
+      <dgm:t>
+        <a:bodyPr/>
+        <a:lstStyle/>
+        <a:p>
+          <a:endParaRPr lang="en-GB"/>
+        </a:p>
+      </dgm:t>
     </dgm:pt>
     <dgm:pt modelId="{7698213F-A1D5-44DE-B22F-355281BB4C2C}" type="pres">
       <dgm:prSet presAssocID="{BBA8DA42-9C0E-4A79-A5B6-8A142294D300}" presName="node" presStyleLbl="node1" presStyleIdx="1" presStyleCnt="3" custRadScaleRad="113493" custRadScaleInc="-6436">
@@ -1203,14 +1224,35 @@
         </dgm:presLayoutVars>
       </dgm:prSet>
       <dgm:spPr/>
+      <dgm:t>
+        <a:bodyPr/>
+        <a:lstStyle/>
+        <a:p>
+          <a:endParaRPr lang="en-GB"/>
+        </a:p>
+      </dgm:t>
     </dgm:pt>
     <dgm:pt modelId="{0DD0BB7F-6B11-4693-AA9C-D4A2168B2D4B}" type="pres">
       <dgm:prSet presAssocID="{FF62F358-49CC-488B-8CB9-AC70C3E2359C}" presName="sibTrans" presStyleLbl="sibTrans2D1" presStyleIdx="1" presStyleCnt="3"/>
       <dgm:spPr/>
+      <dgm:t>
+        <a:bodyPr/>
+        <a:lstStyle/>
+        <a:p>
+          <a:endParaRPr lang="en-GB"/>
+        </a:p>
+      </dgm:t>
     </dgm:pt>
     <dgm:pt modelId="{23546BA5-1720-4C29-9E3D-47B8BBA03C54}" type="pres">
       <dgm:prSet presAssocID="{FF62F358-49CC-488B-8CB9-AC70C3E2359C}" presName="connectorText" presStyleLbl="sibTrans2D1" presStyleIdx="1" presStyleCnt="3"/>
       <dgm:spPr/>
+      <dgm:t>
+        <a:bodyPr/>
+        <a:lstStyle/>
+        <a:p>
+          <a:endParaRPr lang="en-GB"/>
+        </a:p>
+      </dgm:t>
     </dgm:pt>
     <dgm:pt modelId="{630B207D-9744-4681-AF68-329F4D5D414A}" type="pres">
       <dgm:prSet presAssocID="{5D82ECFD-1FDA-48FB-AFD8-561F6F624A4D}" presName="node" presStyleLbl="node1" presStyleIdx="2" presStyleCnt="3" custRadScaleRad="104644" custRadScaleInc="2430">
@@ -1219,14 +1261,35 @@
         </dgm:presLayoutVars>
       </dgm:prSet>
       <dgm:spPr/>
+      <dgm:t>
+        <a:bodyPr/>
+        <a:lstStyle/>
+        <a:p>
+          <a:endParaRPr lang="en-GB"/>
+        </a:p>
+      </dgm:t>
     </dgm:pt>
     <dgm:pt modelId="{394D58C0-A685-4129-AA54-53CBE01AB18B}" type="pres">
       <dgm:prSet presAssocID="{FCA7846A-E97D-48C9-8D6E-2AF33C760667}" presName="sibTrans" presStyleLbl="sibTrans2D1" presStyleIdx="2" presStyleCnt="3"/>
       <dgm:spPr/>
+      <dgm:t>
+        <a:bodyPr/>
+        <a:lstStyle/>
+        <a:p>
+          <a:endParaRPr lang="en-GB"/>
+        </a:p>
+      </dgm:t>
     </dgm:pt>
     <dgm:pt modelId="{52D7E38D-2BBA-4D74-BC74-D561672AA724}" type="pres">
       <dgm:prSet presAssocID="{FCA7846A-E97D-48C9-8D6E-2AF33C760667}" presName="connectorText" presStyleLbl="sibTrans2D1" presStyleIdx="2" presStyleCnt="3"/>
       <dgm:spPr/>
+      <dgm:t>
+        <a:bodyPr/>
+        <a:lstStyle/>
+        <a:p>
+          <a:endParaRPr lang="en-GB"/>
+        </a:p>
+      </dgm:t>
     </dgm:pt>
   </dgm:ptLst>
   <dgm:cxnLst>
@@ -1237,8 +1300,8 @@
     <dgm:cxn modelId="{96FCE8A1-B622-44BF-8CEF-E04AE412EABB}" type="presOf" srcId="{5D82ECFD-1FDA-48FB-AFD8-561F6F624A4D}" destId="{630B207D-9744-4681-AF68-329F4D5D414A}" srcOrd="0" destOrd="0" presId="urn:microsoft.com/office/officeart/2005/8/layout/cycle7"/>
     <dgm:cxn modelId="{7758D464-FB17-41D4-BF16-8158705AE217}" type="presOf" srcId="{FF62F358-49CC-488B-8CB9-AC70C3E2359C}" destId="{23546BA5-1720-4C29-9E3D-47B8BBA03C54}" srcOrd="1" destOrd="0" presId="urn:microsoft.com/office/officeart/2005/8/layout/cycle7"/>
     <dgm:cxn modelId="{17795820-1BA0-49AB-ADA1-DB9CD5D1C3DB}" type="presOf" srcId="{BBA8DA42-9C0E-4A79-A5B6-8A142294D300}" destId="{7698213F-A1D5-44DE-B22F-355281BB4C2C}" srcOrd="0" destOrd="0" presId="urn:microsoft.com/office/officeart/2005/8/layout/cycle7"/>
+    <dgm:cxn modelId="{99C0B06B-BC48-4379-8785-D00B645491AE}" type="presOf" srcId="{FF62F358-49CC-488B-8CB9-AC70C3E2359C}" destId="{0DD0BB7F-6B11-4693-AA9C-D4A2168B2D4B}" srcOrd="0" destOrd="0" presId="urn:microsoft.com/office/officeart/2005/8/layout/cycle7"/>
     <dgm:cxn modelId="{458E6659-880F-4CA5-B667-62AB6F60B603}" type="presOf" srcId="{A891DFA7-A942-4384-8638-CF556EAF8589}" destId="{7159C691-860A-4D9C-AE25-CCDC36A991BF}" srcOrd="0" destOrd="0" presId="urn:microsoft.com/office/officeart/2005/8/layout/cycle7"/>
-    <dgm:cxn modelId="{99C0B06B-BC48-4379-8785-D00B645491AE}" type="presOf" srcId="{FF62F358-49CC-488B-8CB9-AC70C3E2359C}" destId="{0DD0BB7F-6B11-4693-AA9C-D4A2168B2D4B}" srcOrd="0" destOrd="0" presId="urn:microsoft.com/office/officeart/2005/8/layout/cycle7"/>
     <dgm:cxn modelId="{775BCD53-316D-4CAB-BE97-C7A91F4935CB}" type="presOf" srcId="{FCA7846A-E97D-48C9-8D6E-2AF33C760667}" destId="{394D58C0-A685-4129-AA54-53CBE01AB18B}" srcOrd="0" destOrd="0" presId="urn:microsoft.com/office/officeart/2005/8/layout/cycle7"/>
     <dgm:cxn modelId="{78ED7ED4-8AB5-44F9-B302-AC09A2CC7ADF}" type="presOf" srcId="{628B6A62-D463-45C2-8DBC-1358E312F45F}" destId="{BF744900-CDE5-4D5A-9709-AFA782F2725C}" srcOrd="0" destOrd="0" presId="urn:microsoft.com/office/officeart/2005/8/layout/cycle7"/>
     <dgm:cxn modelId="{EB6ADBFD-5D34-4E1F-BBC9-07D9299A5A25}" type="presOf" srcId="{FCA7846A-E97D-48C9-8D6E-2AF33C760667}" destId="{52D7E38D-2BBA-4D74-BC74-D561672AA724}" srcOrd="1" destOrd="0" presId="urn:microsoft.com/office/officeart/2005/8/layout/cycle7"/>
@@ -1271,427 +1334,6 @@
       <dsp:cNvGrpSpPr/>
     </dsp:nvGrpSpPr>
     <dsp:grpSpPr/>
-    <dsp:sp modelId="{7159C691-860A-4D9C-AE25-CCDC36A991BF}">
-      <dsp:nvSpPr>
-        <dsp:cNvPr id="0" name=""/>
-        <dsp:cNvSpPr/>
-      </dsp:nvSpPr>
-      <dsp:spPr>
-        <a:xfrm>
-          <a:off x="1995785" y="360043"/>
-          <a:ext cx="2104429" cy="1052214"/>
-        </a:xfrm>
-        <a:prstGeom prst="roundRect">
-          <a:avLst>
-            <a:gd name="adj" fmla="val 10000"/>
-          </a:avLst>
-        </a:prstGeom>
-        <a:solidFill>
-          <a:srgbClr val="00B0F0"/>
-        </a:solidFill>
-        <a:ln>
-          <a:noFill/>
-        </a:ln>
-        <a:effectLst/>
-        <a:sp3d extrusionH="381000" contourW="38100" prstMaterial="matte">
-          <a:contourClr>
-            <a:schemeClr val="lt1"/>
-          </a:contourClr>
-        </a:sp3d>
-      </dsp:spPr>
-      <dsp:style>
-        <a:lnRef idx="0">
-          <a:scrgbClr r="0" g="0" b="0"/>
-        </a:lnRef>
-        <a:fillRef idx="1">
-          <a:scrgbClr r="0" g="0" b="0"/>
-        </a:fillRef>
-        <a:effectRef idx="0">
-          <a:scrgbClr r="0" g="0" b="0"/>
-        </a:effectRef>
-        <a:fontRef idx="minor">
-          <a:schemeClr val="lt1"/>
-        </a:fontRef>
-      </dsp:style>
-      <dsp:txBody>
-        <a:bodyPr spcFirstLastPara="0" vert="horz" wrap="square" lIns="99060" tIns="99060" rIns="99060" bIns="99060" numCol="1" spcCol="1270" anchor="ctr" anchorCtr="0">
-          <a:noAutofit/>
-        </a:bodyPr>
-        <a:lstStyle/>
-        <a:p>
-          <a:pPr lvl="0" algn="ctr" defTabSz="1155700">
-            <a:lnSpc>
-              <a:spcPct val="90000"/>
-            </a:lnSpc>
-            <a:spcBef>
-              <a:spcPct val="0"/>
-            </a:spcBef>
-            <a:spcAft>
-              <a:spcPct val="35000"/>
-            </a:spcAft>
-          </a:pPr>
-          <a:r>
-            <a:rPr lang="en-GB" sz="2600" kern="1200" dirty="0" smtClean="0"/>
-            <a:t>Pure Functions</a:t>
-          </a:r>
-          <a:endParaRPr lang="en-GB" sz="2600" kern="1200" dirty="0"/>
-        </a:p>
-      </dsp:txBody>
-      <dsp:txXfrm>
-        <a:off x="2026603" y="390861"/>
-        <a:ext cx="2042793" cy="990578"/>
-      </dsp:txXfrm>
-    </dsp:sp>
-    <dsp:sp modelId="{BF744900-CDE5-4D5A-9709-AFA782F2725C}">
-      <dsp:nvSpPr>
-        <dsp:cNvPr id="0" name=""/>
-        <dsp:cNvSpPr/>
-      </dsp:nvSpPr>
-      <dsp:spPr>
-        <a:xfrm rot="3181267">
-          <a:off x="3351629" y="2027277"/>
-          <a:ext cx="1388526" cy="368275"/>
-        </a:xfrm>
-        <a:prstGeom prst="leftRightArrow">
-          <a:avLst>
-            <a:gd name="adj1" fmla="val 60000"/>
-            <a:gd name="adj2" fmla="val 50000"/>
-          </a:avLst>
-        </a:prstGeom>
-        <a:solidFill>
-          <a:srgbClr val="00B0F0"/>
-        </a:solidFill>
-        <a:ln>
-          <a:noFill/>
-        </a:ln>
-        <a:effectLst/>
-        <a:sp3d z="-52400" extrusionH="181000" contourW="38100" prstMaterial="matte">
-          <a:contourClr>
-            <a:schemeClr val="lt1"/>
-          </a:contourClr>
-        </a:sp3d>
-      </dsp:spPr>
-      <dsp:style>
-        <a:lnRef idx="0">
-          <a:scrgbClr r="0" g="0" b="0"/>
-        </a:lnRef>
-        <a:fillRef idx="1">
-          <a:scrgbClr r="0" g="0" b="0"/>
-        </a:fillRef>
-        <a:effectRef idx="0">
-          <a:scrgbClr r="0" g="0" b="0"/>
-        </a:effectRef>
-        <a:fontRef idx="minor">
-          <a:schemeClr val="lt1"/>
-        </a:fontRef>
-      </dsp:style>
-      <dsp:txBody>
-        <a:bodyPr spcFirstLastPara="0" vert="horz" wrap="square" lIns="0" tIns="0" rIns="0" bIns="0" numCol="1" spcCol="1270" anchor="ctr" anchorCtr="0">
-          <a:noAutofit/>
-        </a:bodyPr>
-        <a:lstStyle/>
-        <a:p>
-          <a:pPr lvl="0" algn="ctr" defTabSz="666750">
-            <a:lnSpc>
-              <a:spcPct val="90000"/>
-            </a:lnSpc>
-            <a:spcBef>
-              <a:spcPct val="0"/>
-            </a:spcBef>
-            <a:spcAft>
-              <a:spcPct val="35000"/>
-            </a:spcAft>
-          </a:pPr>
-          <a:endParaRPr lang="en-GB" sz="1500" kern="1200"/>
-        </a:p>
-      </dsp:txBody>
-      <dsp:txXfrm>
-        <a:off x="3462112" y="2100932"/>
-        <a:ext cx="1167561" cy="220965"/>
-      </dsp:txXfrm>
-    </dsp:sp>
-    <dsp:sp modelId="{7698213F-A1D5-44DE-B22F-355281BB4C2C}">
-      <dsp:nvSpPr>
-        <dsp:cNvPr id="0" name=""/>
-        <dsp:cNvSpPr/>
-      </dsp:nvSpPr>
-      <dsp:spPr>
-        <a:xfrm>
-          <a:off x="3991570" y="3010572"/>
-          <a:ext cx="2104429" cy="1052214"/>
-        </a:xfrm>
-        <a:prstGeom prst="roundRect">
-          <a:avLst>
-            <a:gd name="adj" fmla="val 10000"/>
-          </a:avLst>
-        </a:prstGeom>
-        <a:solidFill>
-          <a:srgbClr val="00B050"/>
-        </a:solidFill>
-        <a:ln>
-          <a:noFill/>
-        </a:ln>
-        <a:effectLst/>
-        <a:sp3d extrusionH="381000" contourW="38100" prstMaterial="matte">
-          <a:contourClr>
-            <a:schemeClr val="lt1"/>
-          </a:contourClr>
-        </a:sp3d>
-      </dsp:spPr>
-      <dsp:style>
-        <a:lnRef idx="0">
-          <a:scrgbClr r="0" g="0" b="0"/>
-        </a:lnRef>
-        <a:fillRef idx="1">
-          <a:scrgbClr r="0" g="0" b="0"/>
-        </a:fillRef>
-        <a:effectRef idx="0">
-          <a:scrgbClr r="0" g="0" b="0"/>
-        </a:effectRef>
-        <a:fontRef idx="minor">
-          <a:schemeClr val="lt1"/>
-        </a:fontRef>
-      </dsp:style>
-      <dsp:txBody>
-        <a:bodyPr spcFirstLastPara="0" vert="horz" wrap="square" lIns="99060" tIns="99060" rIns="99060" bIns="99060" numCol="1" spcCol="1270" anchor="ctr" anchorCtr="0">
-          <a:noAutofit/>
-        </a:bodyPr>
-        <a:lstStyle/>
-        <a:p>
-          <a:pPr lvl="0" algn="ctr" defTabSz="1155700">
-            <a:lnSpc>
-              <a:spcPct val="90000"/>
-            </a:lnSpc>
-            <a:spcBef>
-              <a:spcPct val="0"/>
-            </a:spcBef>
-            <a:spcAft>
-              <a:spcPct val="35000"/>
-            </a:spcAft>
-          </a:pPr>
-          <a:r>
-            <a:rPr lang="en-GB" sz="2600" kern="1200" dirty="0" smtClean="0"/>
-            <a:t>Immutability</a:t>
-          </a:r>
-          <a:endParaRPr lang="en-GB" sz="2600" kern="1200" dirty="0"/>
-        </a:p>
-      </dsp:txBody>
-      <dsp:txXfrm>
-        <a:off x="4022388" y="3041390"/>
-        <a:ext cx="2042793" cy="990578"/>
-      </dsp:txXfrm>
-    </dsp:sp>
-    <dsp:sp modelId="{0DD0BB7F-6B11-4693-AA9C-D4A2168B2D4B}">
-      <dsp:nvSpPr>
-        <dsp:cNvPr id="0" name=""/>
-        <dsp:cNvSpPr/>
-      </dsp:nvSpPr>
-      <dsp:spPr>
-        <a:xfrm rot="10799984">
-          <a:off x="2429477" y="3352550"/>
-          <a:ext cx="1388526" cy="368275"/>
-        </a:xfrm>
-        <a:prstGeom prst="leftRightArrow">
-          <a:avLst>
-            <a:gd name="adj1" fmla="val 60000"/>
-            <a:gd name="adj2" fmla="val 50000"/>
-          </a:avLst>
-        </a:prstGeom>
-        <a:solidFill>
-          <a:srgbClr val="00B050"/>
-        </a:solidFill>
-        <a:ln>
-          <a:noFill/>
-        </a:ln>
-        <a:effectLst/>
-        <a:sp3d z="-52400" extrusionH="181000" contourW="38100" prstMaterial="matte">
-          <a:contourClr>
-            <a:schemeClr val="lt1"/>
-          </a:contourClr>
-        </a:sp3d>
-      </dsp:spPr>
-      <dsp:style>
-        <a:lnRef idx="0">
-          <a:scrgbClr r="0" g="0" b="0"/>
-        </a:lnRef>
-        <a:fillRef idx="1">
-          <a:scrgbClr r="0" g="0" b="0"/>
-        </a:fillRef>
-        <a:effectRef idx="0">
-          <a:scrgbClr r="0" g="0" b="0"/>
-        </a:effectRef>
-        <a:fontRef idx="minor">
-          <a:schemeClr val="lt1"/>
-        </a:fontRef>
-      </dsp:style>
-      <dsp:txBody>
-        <a:bodyPr spcFirstLastPara="0" vert="horz" wrap="square" lIns="0" tIns="0" rIns="0" bIns="0" numCol="1" spcCol="1270" anchor="ctr" anchorCtr="0">
-          <a:noAutofit/>
-        </a:bodyPr>
-        <a:lstStyle/>
-        <a:p>
-          <a:pPr lvl="0" algn="ctr" defTabSz="666750">
-            <a:lnSpc>
-              <a:spcPct val="90000"/>
-            </a:lnSpc>
-            <a:spcBef>
-              <a:spcPct val="0"/>
-            </a:spcBef>
-            <a:spcAft>
-              <a:spcPct val="35000"/>
-            </a:spcAft>
-          </a:pPr>
-          <a:endParaRPr lang="en-GB" sz="1500" kern="1200"/>
-        </a:p>
-      </dsp:txBody>
-      <dsp:txXfrm rot="10800000">
-        <a:off x="2539959" y="3426205"/>
-        <a:ext cx="1167561" cy="220965"/>
-      </dsp:txXfrm>
-    </dsp:sp>
-    <dsp:sp modelId="{630B207D-9744-4681-AF68-329F4D5D414A}">
-      <dsp:nvSpPr>
-        <dsp:cNvPr id="0" name=""/>
-        <dsp:cNvSpPr/>
-      </dsp:nvSpPr>
-      <dsp:spPr>
-        <a:xfrm>
-          <a:off x="151481" y="3010589"/>
-          <a:ext cx="2104429" cy="1052214"/>
-        </a:xfrm>
-        <a:prstGeom prst="roundRect">
-          <a:avLst>
-            <a:gd name="adj" fmla="val 10000"/>
-          </a:avLst>
-        </a:prstGeom>
-        <a:solidFill>
-          <a:schemeClr val="accent6">
-            <a:lumMod val="75000"/>
-          </a:schemeClr>
-        </a:solidFill>
-        <a:ln>
-          <a:noFill/>
-        </a:ln>
-        <a:effectLst/>
-        <a:sp3d extrusionH="381000" contourW="38100" prstMaterial="matte">
-          <a:contourClr>
-            <a:schemeClr val="lt1"/>
-          </a:contourClr>
-        </a:sp3d>
-      </dsp:spPr>
-      <dsp:style>
-        <a:lnRef idx="0">
-          <a:scrgbClr r="0" g="0" b="0"/>
-        </a:lnRef>
-        <a:fillRef idx="1">
-          <a:scrgbClr r="0" g="0" b="0"/>
-        </a:fillRef>
-        <a:effectRef idx="0">
-          <a:scrgbClr r="0" g="0" b="0"/>
-        </a:effectRef>
-        <a:fontRef idx="minor">
-          <a:schemeClr val="lt1"/>
-        </a:fontRef>
-      </dsp:style>
-      <dsp:txBody>
-        <a:bodyPr spcFirstLastPara="0" vert="horz" wrap="square" lIns="99060" tIns="99060" rIns="99060" bIns="99060" numCol="1" spcCol="1270" anchor="ctr" anchorCtr="0">
-          <a:noAutofit/>
-        </a:bodyPr>
-        <a:lstStyle/>
-        <a:p>
-          <a:pPr lvl="0" algn="ctr" defTabSz="1155700">
-            <a:lnSpc>
-              <a:spcPct val="90000"/>
-            </a:lnSpc>
-            <a:spcBef>
-              <a:spcPct val="0"/>
-            </a:spcBef>
-            <a:spcAft>
-              <a:spcPct val="35000"/>
-            </a:spcAft>
-          </a:pPr>
-          <a:r>
-            <a:rPr lang="en-GB" sz="2600" kern="1200" dirty="0" smtClean="0"/>
-            <a:t>Higher-Order Functions</a:t>
-          </a:r>
-          <a:endParaRPr lang="en-GB" sz="2600" kern="1200" dirty="0"/>
-        </a:p>
-      </dsp:txBody>
-      <dsp:txXfrm>
-        <a:off x="182299" y="3041407"/>
-        <a:ext cx="2042793" cy="990578"/>
-      </dsp:txXfrm>
-    </dsp:sp>
-    <dsp:sp modelId="{394D58C0-A685-4129-AA54-53CBE01AB18B}">
-      <dsp:nvSpPr>
-        <dsp:cNvPr id="0" name=""/>
-        <dsp:cNvSpPr/>
-      </dsp:nvSpPr>
-      <dsp:spPr>
-        <a:xfrm rot="18289858">
-          <a:off x="1431584" y="2027286"/>
-          <a:ext cx="1388526" cy="368275"/>
-        </a:xfrm>
-        <a:prstGeom prst="leftRightArrow">
-          <a:avLst>
-            <a:gd name="adj1" fmla="val 60000"/>
-            <a:gd name="adj2" fmla="val 50000"/>
-          </a:avLst>
-        </a:prstGeom>
-        <a:solidFill>
-          <a:schemeClr val="accent6">
-            <a:lumMod val="75000"/>
-          </a:schemeClr>
-        </a:solidFill>
-        <a:ln>
-          <a:noFill/>
-        </a:ln>
-        <a:effectLst/>
-        <a:sp3d z="-52400" extrusionH="181000" contourW="38100" prstMaterial="matte">
-          <a:contourClr>
-            <a:schemeClr val="lt1"/>
-          </a:contourClr>
-        </a:sp3d>
-      </dsp:spPr>
-      <dsp:style>
-        <a:lnRef idx="0">
-          <a:scrgbClr r="0" g="0" b="0"/>
-        </a:lnRef>
-        <a:fillRef idx="1">
-          <a:scrgbClr r="0" g="0" b="0"/>
-        </a:fillRef>
-        <a:effectRef idx="0">
-          <a:scrgbClr r="0" g="0" b="0"/>
-        </a:effectRef>
-        <a:fontRef idx="minor">
-          <a:schemeClr val="lt1"/>
-        </a:fontRef>
-      </dsp:style>
-      <dsp:txBody>
-        <a:bodyPr spcFirstLastPara="0" vert="horz" wrap="square" lIns="0" tIns="0" rIns="0" bIns="0" numCol="1" spcCol="1270" anchor="ctr" anchorCtr="0">
-          <a:noAutofit/>
-        </a:bodyPr>
-        <a:lstStyle/>
-        <a:p>
-          <a:pPr lvl="0" algn="ctr" defTabSz="666750">
-            <a:lnSpc>
-              <a:spcPct val="90000"/>
-            </a:lnSpc>
-            <a:spcBef>
-              <a:spcPct val="0"/>
-            </a:spcBef>
-            <a:spcAft>
-              <a:spcPct val="35000"/>
-            </a:spcAft>
-          </a:pPr>
-          <a:endParaRPr lang="en-GB" sz="1500" kern="1200"/>
-        </a:p>
-      </dsp:txBody>
-      <dsp:txXfrm>
-        <a:off x="1542067" y="2100941"/>
-        <a:ext cx="1167561" cy="220965"/>
-      </dsp:txXfrm>
-    </dsp:sp>
   </dsp:spTree>
 </dsp:drawing>
 </file>
@@ -3870,7 +3512,7 @@
               <a:rPr lang="de-CH" smtClean="0"/>
               <a:t>Slide </a:t>
             </a:r>
-            <a:fld id="{94B473E1-CDA8-4C3F-A4EA-970059B226ED}" type="slidenum">
+            <a:fld id="{814293EB-8324-4822-93BF-D115C951E99A}" type="slidenum">
               <a:rPr smtClean="0"/>
               <a:pPr/>
               <a:t>‹#›</a:t>
@@ -4194,7 +3836,7 @@
               <a:rPr lang="de-CH" smtClean="0"/>
               <a:t>Slide </a:t>
             </a:r>
-            <a:fld id="{201FB156-5E04-4E11-AB71-D8E8C1355117}" type="slidenum">
+            <a:fld id="{004F4E99-AE5F-4BEF-86CD-DE14D76A3DD2}" type="slidenum">
               <a:rPr smtClean="0"/>
               <a:pPr/>
               <a:t>‹#›</a:t>
@@ -4496,7 +4138,7 @@
               <a:rPr lang="de-CH" smtClean="0"/>
               <a:t>Slide </a:t>
             </a:r>
-            <a:fld id="{7C28420F-8275-4536-B897-0A6CB1A00C98}" type="slidenum">
+            <a:fld id="{307AA94A-DBED-48F4-894F-229164342E11}" type="slidenum">
               <a:rPr smtClean="0"/>
               <a:pPr/>
               <a:t>‹#›</a:t>
@@ -4828,7 +4470,7 @@
               <a:rPr lang="de-CH" smtClean="0"/>
               <a:t>Slide </a:t>
             </a:r>
-            <a:fld id="{0D878CD7-D5AC-4D06-834F-9E3793A85DFA}" type="slidenum">
+            <a:fld id="{F9F88798-08D0-4A2C-AABC-8EC60D431370}" type="slidenum">
               <a:rPr smtClean="0"/>
               <a:pPr/>
               <a:t>‹#›</a:t>
@@ -5162,7 +4804,7 @@
               <a:rPr lang="de-CH" smtClean="0"/>
               <a:t>Slide </a:t>
             </a:r>
-            <a:fld id="{FF288636-1F99-4664-8AE3-4C59DE818E6E}" type="slidenum">
+            <a:fld id="{61AD5474-F7FA-46D3-81E4-9DF2C154DBFF}" type="slidenum">
               <a:rPr smtClean="0"/>
               <a:pPr/>
               <a:t>‹#›</a:t>
@@ -5592,7 +5234,7 @@
               <a:rPr lang="de-CH" smtClean="0"/>
               <a:t>Slide </a:t>
             </a:r>
-            <a:fld id="{8152A0E8-9538-456D-A4D8-99D4FD85B554}" type="slidenum">
+            <a:fld id="{4151FADC-2998-4B83-886E-48A0A87DEEEB}" type="slidenum">
               <a:rPr smtClean="0"/>
               <a:pPr/>
               <a:t>‹#›</a:t>
@@ -6310,7 +5952,7 @@
               <a:rPr lang="de-CH" smtClean="0"/>
               <a:t>Slide </a:t>
             </a:r>
-            <a:fld id="{735EA10E-EF35-468A-BA1F-486CBBF2538C}" type="slidenum">
+            <a:fld id="{A02B7A13-E118-40AF-8CC8-FDE12A9EFAA8}" type="slidenum">
               <a:rPr smtClean="0"/>
               <a:pPr/>
               <a:t>‹#›</a:t>
@@ -6616,7 +6258,7 @@
               <a:rPr lang="de-CH" smtClean="0"/>
               <a:t>Slide </a:t>
             </a:r>
-            <a:fld id="{D0CB7A73-A24A-4A88-B35D-4B44D50F4CBE}" type="slidenum">
+            <a:fld id="{7F3BE8B5-8B9C-4A22-BFB2-0735CED4742E}" type="slidenum">
               <a:rPr smtClean="0"/>
               <a:pPr/>
               <a:t>‹#›</a:t>
@@ -7143,7 +6785,7 @@
               <a:rPr lang="de-CH" smtClean="0"/>
               <a:t>Slide </a:t>
             </a:r>
-            <a:fld id="{6F0D9F6A-8157-4A1B-9E1F-8B619D958CD9}" type="slidenum">
+            <a:fld id="{FF3695AF-1B2B-49EA-ADB3-C5C12D8876EA}" type="slidenum">
               <a:rPr smtClean="0"/>
               <a:pPr/>
               <a:t>‹#›</a:t>
@@ -7541,7 +7183,7 @@
               <a:rPr lang="de-CH" smtClean="0"/>
               <a:t>Slide </a:t>
             </a:r>
-            <a:fld id="{728766B3-EBC5-490F-AA4C-2C660ECB5287}" type="slidenum">
+            <a:fld id="{83EA0EFA-FB74-4B97-A800-317CBC48E8F4}" type="slidenum">
               <a:rPr smtClean="0"/>
               <a:pPr/>
               <a:t>‹#›</a:t>
@@ -7771,7 +7413,7 @@
               <a:rPr lang="de-CH" smtClean="0"/>
               <a:t>Slide </a:t>
             </a:r>
-            <a:fld id="{C60A0BEA-ADEE-4B67-AFAB-2D4F13970D1E}" type="slidenum">
+            <a:fld id="{59BF0A48-9CDC-4239-97B8-210A24C51A1E}" type="slidenum">
               <a:rPr smtClean="0"/>
               <a:pPr/>
               <a:t>‹#›</a:t>
@@ -8049,7 +7691,7 @@
               <a:rPr lang="de-CH" smtClean="0"/>
               <a:t>Slide </a:t>
             </a:r>
-            <a:fld id="{B295BE6E-477B-4EF1-9ADF-6B0483A61DAD}" type="slidenum">
+            <a:fld id="{556D83E5-4303-497D-BDC6-2E0C57F1AD61}" type="slidenum">
               <a:rPr smtClean="0"/>
               <a:pPr/>
               <a:t>‹#›</a:t>
@@ -8524,7 +8166,7 @@
               <a:rPr lang="de-CH" smtClean="0"/>
               <a:t>Slide </a:t>
             </a:r>
-            <a:fld id="{C48B4321-746B-446C-902D-96A39FDF7E78}" type="slidenum">
+            <a:fld id="{2BFDD7F9-AD2D-47D7-8A00-98F108E09E1A}" type="slidenum">
               <a:rPr lang="de-CH" smtClean="0"/>
               <a:t>1</a:t>
             </a:fld>
@@ -8680,7 +8322,7 @@
               <a:rPr lang="de-CH" smtClean="0"/>
               <a:t>Slide </a:t>
             </a:r>
-            <a:fld id="{FC5D5D89-4F13-498B-8072-5AC1DFB597E4}" type="slidenum">
+            <a:fld id="{E391FFB8-35A4-4C6A-9913-67AA70A80C79}" type="slidenum">
               <a:rPr lang="de-CH" smtClean="0"/>
               <a:t>10</a:t>
             </a:fld>
@@ -9319,7 +8961,7 @@
               <a:rPr lang="de-CH" smtClean="0"/>
               <a:t>Slide </a:t>
             </a:r>
-            <a:fld id="{A13A574B-98C2-457D-AF09-4A7FBFF1E06C}" type="slidenum">
+            <a:fld id="{8CC028F7-D2E1-4BE3-9918-4AA2E89CC0CE}" type="slidenum">
               <a:rPr lang="de-CH" smtClean="0"/>
               <a:t>11</a:t>
             </a:fld>
@@ -9553,7 +9195,7 @@
               <a:rPr lang="de-CH" smtClean="0"/>
               <a:t>Slide </a:t>
             </a:r>
-            <a:fld id="{FE4E0A05-F428-4BD1-9272-CF33A1389CF0}" type="slidenum">
+            <a:fld id="{25613985-93DC-4230-A4D1-6BE383DD030C}" type="slidenum">
               <a:rPr lang="de-CH" smtClean="0"/>
               <a:t>12</a:t>
             </a:fld>
@@ -9768,7 +9410,7 @@
               <a:rPr lang="de-CH" smtClean="0"/>
               <a:t>Slide </a:t>
             </a:r>
-            <a:fld id="{BB7E168C-8FF0-40D3-B537-E0263576FD1A}" type="slidenum">
+            <a:fld id="{B141355B-5153-42AA-9365-F77DDA5589AE}" type="slidenum">
               <a:rPr lang="de-CH" smtClean="0"/>
               <a:t>13</a:t>
             </a:fld>
@@ -10029,7 +9671,7 @@
               <a:rPr lang="de-CH" smtClean="0"/>
               <a:t>Slide </a:t>
             </a:r>
-            <a:fld id="{0270879B-1388-43D7-B4BB-98BD41C97BAB}" type="slidenum">
+            <a:fld id="{A2C91F3A-F247-454C-986E-8D55F06E605E}" type="slidenum">
               <a:rPr lang="de-CH" smtClean="0"/>
               <a:t>14</a:t>
             </a:fld>
@@ -10379,7 +10021,7 @@
               <a:rPr lang="de-CH" smtClean="0"/>
               <a:t>Slide </a:t>
             </a:r>
-            <a:fld id="{A6BB15A2-A2E8-4FBE-99D8-AAE43C1D613E}" type="slidenum">
+            <a:fld id="{9DD9E41B-CF98-4CB7-AF48-5A74E43298FB}" type="slidenum">
               <a:rPr lang="de-CH" smtClean="0"/>
               <a:t>15</a:t>
             </a:fld>
@@ -10583,7 +10225,7 @@
               <a:rPr lang="de-CH" smtClean="0"/>
               <a:t>Slide </a:t>
             </a:r>
-            <a:fld id="{3C71E1BE-58F1-44F0-B2A1-9641C489DC58}" type="slidenum">
+            <a:fld id="{902B10C0-4C83-4803-BA35-A0F9A99E8CC8}" type="slidenum">
               <a:rPr lang="de-CH" smtClean="0"/>
               <a:t>16</a:t>
             </a:fld>
@@ -10989,7 +10631,7 @@
               <a:rPr lang="de-CH" smtClean="0"/>
               <a:t>Slide </a:t>
             </a:r>
-            <a:fld id="{6AD4E681-9B73-4D9A-B203-1CE708A9DFD9}" type="slidenum">
+            <a:fld id="{3B37F2FD-F4BB-4658-996A-74C4A74F8944}" type="slidenum">
               <a:rPr lang="de-CH" smtClean="0"/>
               <a:t>17</a:t>
             </a:fld>
@@ -12923,7 +12565,7 @@
               <a:rPr lang="de-CH" smtClean="0"/>
               <a:t>Slide </a:t>
             </a:r>
-            <a:fld id="{E7105706-3D5A-4DDF-9FF4-57DEE0DD76FA}" type="slidenum">
+            <a:fld id="{57847960-711C-45E5-A7DD-7D6023D63D39}" type="slidenum">
               <a:rPr lang="de-CH" smtClean="0"/>
               <a:t>18</a:t>
             </a:fld>
@@ -14629,7 +14271,7 @@
               <a:rPr lang="de-CH" smtClean="0"/>
               <a:t>Slide </a:t>
             </a:r>
-            <a:fld id="{D81FF9D1-24CC-40E9-BE71-2EF0A874A2EF}" type="slidenum">
+            <a:fld id="{060952B5-F9A4-46A6-AEF8-C5D3938EBF86}" type="slidenum">
               <a:rPr lang="de-CH" smtClean="0"/>
               <a:t>19</a:t>
             </a:fld>
@@ -15028,7 +14670,7 @@
               <a:rPr lang="de-CH" smtClean="0"/>
               <a:t>Slide </a:t>
             </a:r>
-            <a:fld id="{FF0E8492-88BC-44B9-BE23-191F70F0C23D}" type="slidenum">
+            <a:fld id="{8A8323CF-A3F6-4D9F-8238-A4E70395D3D6}" type="slidenum">
               <a:rPr lang="de-CH" smtClean="0"/>
               <a:t>2</a:t>
             </a:fld>
@@ -17048,7 +16690,7 @@
               <a:rPr lang="de-CH" smtClean="0"/>
               <a:t>Slide </a:t>
             </a:r>
-            <a:fld id="{00D1F7BC-AE02-40DA-B91D-12B3FB54ACC2}" type="slidenum">
+            <a:fld id="{253F5B39-BD89-4E79-A885-10503A603035}" type="slidenum">
               <a:rPr lang="de-CH" smtClean="0"/>
               <a:t>20</a:t>
             </a:fld>
@@ -17874,7 +17516,7 @@
               <a:rPr lang="de-CH" smtClean="0"/>
               <a:t>Slide </a:t>
             </a:r>
-            <a:fld id="{605FC679-3063-4664-BBC1-2D009F467FE7}" type="slidenum">
+            <a:fld id="{D70E2002-25D1-4881-AE48-447246BFD9AE}" type="slidenum">
               <a:rPr lang="de-CH" smtClean="0"/>
               <a:t>21</a:t>
             </a:fld>
@@ -18287,7 +17929,7 @@
               <a:rPr lang="de-CH" smtClean="0"/>
               <a:t>Slide </a:t>
             </a:r>
-            <a:fld id="{293739F1-7D5B-4F8D-98D4-DACE02C1C41C}" type="slidenum">
+            <a:fld id="{77450D2C-9B95-4252-84A8-2A353F99B09E}" type="slidenum">
               <a:rPr lang="de-CH" smtClean="0"/>
               <a:t>22</a:t>
             </a:fld>
@@ -18353,15 +17995,7 @@
           <a:p>
             <a:r>
               <a:rPr lang="en-GB" dirty="0" smtClean="0"/>
-              <a:t>Context Type: </a:t>
-            </a:r>
-            <a:r>
-              <a:rPr lang="en-GB" dirty="0" smtClean="0"/>
-              <a:t>List[T</a:t>
-            </a:r>
-            <a:r>
-              <a:rPr lang="en-GB" dirty="0" smtClean="0"/>
-              <a:t>]</a:t>
+              <a:t>Context Type: List[T]</a:t>
             </a:r>
             <a:endParaRPr lang="en-GB" dirty="0"/>
           </a:p>
@@ -18392,11 +18026,7 @@
             </a:r>
             <a:r>
               <a:rPr lang="en-GB" dirty="0" smtClean="0"/>
-              <a:t> </a:t>
-            </a:r>
-            <a:r>
-              <a:rPr lang="en-GB" dirty="0" smtClean="0"/>
-              <a:t>Lists</a:t>
+              <a:t> Lists</a:t>
             </a:r>
             <a:endParaRPr lang="en-GB" dirty="0"/>
           </a:p>
@@ -19859,7 +19489,7 @@
               <a:rPr lang="de-CH" smtClean="0"/>
               <a:t>Slide </a:t>
             </a:r>
-            <a:fld id="{F29E430A-F81C-4FF5-B39E-3EB094C53F63}" type="slidenum">
+            <a:fld id="{2DA1D21E-2024-4B33-BC89-543106C779A6}" type="slidenum">
               <a:rPr lang="de-CH" smtClean="0"/>
               <a:t>23</a:t>
             </a:fld>
@@ -19881,11 +19511,11 @@
   <p:clrMapOvr>
     <a:masterClrMapping/>
   </p:clrMapOvr>
-  <mc:AlternateContent xmlns:mc="http://schemas.openxmlformats.org/markup-compatibility/2006">
-    <mc:Choice xmlns:p14="http://schemas.microsoft.com/office/powerpoint/2010/main" Requires="p14">
+  <mc:AlternateContent xmlns:mc="http://schemas.openxmlformats.org/markup-compatibility/2006" xmlns:p14="http://schemas.microsoft.com/office/powerpoint/2010/main">
+    <mc:Choice Requires="p14">
       <p:transition spd="slow" p14:dur="2000"/>
     </mc:Choice>
-    <mc:Fallback>
+    <mc:Fallback xmlns="">
       <p:transition spd="slow"/>
     </mc:Fallback>
   </mc:AlternateContent>
@@ -20453,7 +20083,7 @@
               <a:rPr lang="de-CH" smtClean="0"/>
               <a:t>Slide </a:t>
             </a:r>
-            <a:fld id="{65074B7F-C85B-4E18-9417-57E2876DAB33}" type="slidenum">
+            <a:fld id="{FF6CC8F3-EDA1-420D-A1B8-582B26162598}" type="slidenum">
               <a:rPr lang="de-CH" smtClean="0"/>
               <a:t>24</a:t>
             </a:fld>
@@ -21523,7 +21153,7 @@
               <a:rPr lang="de-CH" smtClean="0"/>
               <a:t>Slide </a:t>
             </a:r>
-            <a:fld id="{35A14ACB-F52D-48F4-9CE6-E1EDBD609853}" type="slidenum">
+            <a:fld id="{D2394D2F-6AF5-45DD-9A39-F1F82B5C5C61}" type="slidenum">
               <a:rPr lang="de-CH" smtClean="0"/>
               <a:t>25</a:t>
             </a:fld>
@@ -23359,7 +22989,7 @@
               <a:rPr lang="de-CH" smtClean="0"/>
               <a:t>Slide </a:t>
             </a:r>
-            <a:fld id="{D1FB5591-024A-42E0-9116-AA59DCEAE168}" type="slidenum">
+            <a:fld id="{0E2975E7-7806-452A-88FB-A1D9329C9353}" type="slidenum">
               <a:rPr lang="de-CH" smtClean="0"/>
               <a:t>26</a:t>
             </a:fld>
@@ -23855,7 +23485,7 @@
               <a:rPr lang="de-CH" smtClean="0"/>
               <a:t>Slide </a:t>
             </a:r>
-            <a:fld id="{E79168BC-8DE9-4315-A37E-29C85121A094}" type="slidenum">
+            <a:fld id="{64BFDD5E-13B0-4492-A815-06F94206A79A}" type="slidenum">
               <a:rPr lang="de-CH" smtClean="0"/>
               <a:t>27</a:t>
             </a:fld>
@@ -25427,7 +25057,7 @@
               <a:rPr lang="de-CH" smtClean="0"/>
               <a:t>Slide </a:t>
             </a:r>
-            <a:fld id="{57549D69-B202-47C5-9F38-F057A5DA30B9}" type="slidenum">
+            <a:fld id="{1EC2154E-636F-4232-8E71-C33B673CC55D}" type="slidenum">
               <a:rPr lang="de-CH" smtClean="0"/>
               <a:t>28</a:t>
             </a:fld>
@@ -26983,7 +26613,7 @@
               <a:rPr lang="de-CH" smtClean="0"/>
               <a:t>Slide </a:t>
             </a:r>
-            <a:fld id="{4B70EBDF-F016-4AFA-B88D-403651D4CC8F}" type="slidenum">
+            <a:fld id="{C2D8F11C-6A06-4E8C-872C-7D58DF5D3DF3}" type="slidenum">
               <a:rPr lang="de-CH" smtClean="0"/>
               <a:t>29</a:t>
             </a:fld>
@@ -27080,11 +26710,7 @@
           <a:p>
             <a:r>
               <a:rPr lang="en-GB" dirty="0" smtClean="0"/>
-              <a:t>We’ve </a:t>
-            </a:r>
-            <a:r>
-              <a:rPr lang="en-GB" dirty="0" smtClean="0"/>
-              <a:t>been thinking about:</a:t>
+              <a:t>We’ve been thinking about:</a:t>
             </a:r>
           </a:p>
           <a:p>
@@ -27094,13 +26720,8 @@
             </a:pPr>
             <a:r>
               <a:rPr lang="en-GB" dirty="0" smtClean="0"/>
-              <a:t>What </a:t>
-            </a:r>
-            <a:r>
-              <a:rPr lang="en-GB" dirty="0" smtClean="0"/>
-              <a:t>is the best part of functional programming?</a:t>
-            </a:r>
-            <a:endParaRPr lang="en-GB" dirty="0" smtClean="0"/>
+              <a:t>What is the best part of functional programming?</a:t>
+            </a:r>
           </a:p>
           <a:p>
             <a:pPr marL="257175" indent="-257175">
@@ -27109,15 +26730,7 @@
             </a:pPr>
             <a:r>
               <a:rPr lang="en-GB" dirty="0" smtClean="0"/>
-              <a:t>Which functional concepts </a:t>
-            </a:r>
-            <a:r>
-              <a:rPr lang="en-GB" dirty="0" smtClean="0"/>
-              <a:t>could be helpful </a:t>
-            </a:r>
-            <a:r>
-              <a:rPr lang="en-GB" dirty="0" smtClean="0"/>
-              <a:t>in an </a:t>
+              <a:t>Which functional concepts could be helpful in an </a:t>
             </a:r>
             <a:r>
               <a:rPr lang="en-GB" dirty="0"/>
@@ -27127,7 +26740,6 @@
               <a:rPr lang="en-GB" dirty="0" smtClean="0"/>
               <a:t>bject-oriented world?</a:t>
             </a:r>
-            <a:endParaRPr lang="en-GB" dirty="0" smtClean="0"/>
           </a:p>
           <a:p>
             <a:endParaRPr lang="en-GB" dirty="0" smtClean="0"/>
@@ -27253,7 +26865,7 @@
               <a:rPr lang="de-CH" smtClean="0"/>
               <a:t>Slide </a:t>
             </a:r>
-            <a:fld id="{1A8FC6C3-F80E-412A-BE29-C0D13B6C2226}" type="slidenum">
+            <a:fld id="{9DD5C29F-951E-4FB3-B8FF-5A7F647F1B8E}" type="slidenum">
               <a:rPr lang="de-CH" smtClean="0"/>
               <a:t>3</a:t>
             </a:fld>
@@ -27384,11 +26996,7 @@
             </a:pPr>
             <a:r>
               <a:rPr lang="en-GB" dirty="0" smtClean="0"/>
-              <a:t>something else</a:t>
-            </a:r>
-            <a:r>
-              <a:rPr lang="en-GB" dirty="0" smtClean="0"/>
-              <a:t>?</a:t>
+              <a:t>something else?</a:t>
             </a:r>
           </a:p>
           <a:p>
@@ -28218,7 +27826,7 @@
               <a:rPr lang="de-CH" smtClean="0"/>
               <a:t>Slide </a:t>
             </a:r>
-            <a:fld id="{B3D985FE-45CC-4563-AF08-4BE9E7E48AB9}" type="slidenum">
+            <a:fld id="{7FF47CED-D8A7-4FA3-83C5-95CDE0B20DF7}" type="slidenum">
               <a:rPr lang="de-CH" smtClean="0"/>
               <a:t>30</a:t>
             </a:fld>
@@ -28490,15 +28098,7 @@
             </a:pPr>
             <a:r>
               <a:rPr lang="en-GB" dirty="0" smtClean="0"/>
-              <a:t>Guess </a:t>
-            </a:r>
-            <a:r>
-              <a:rPr lang="en-GB" dirty="0" smtClean="0"/>
-              <a:t>what, we can map </a:t>
-            </a:r>
-            <a:r>
-              <a:rPr lang="en-GB" dirty="0" smtClean="0"/>
-              <a:t>and </a:t>
+              <a:t>Guess what, we can map and </a:t>
             </a:r>
             <a:r>
               <a:rPr lang="en-GB" dirty="0" err="1" smtClean="0"/>
@@ -28658,7 +28258,7 @@
               <a:rPr lang="de-CH" smtClean="0"/>
               <a:t>Slide </a:t>
             </a:r>
-            <a:fld id="{0F7CD680-E20E-41BA-8AFF-FFA912A0C588}" type="slidenum">
+            <a:fld id="{D0FE2D36-418F-4266-BFEB-EDF4B11EB58E}" type="slidenum">
               <a:rPr lang="de-CH" smtClean="0"/>
               <a:t>31</a:t>
             </a:fld>
@@ -28853,7 +28453,6 @@
               <a:rPr lang="en-GB" dirty="0" smtClean="0"/>
               <a:t>Optional</a:t>
             </a:r>
-            <a:endParaRPr lang="en-GB" dirty="0" smtClean="0"/>
           </a:p>
           <a:p>
             <a:pPr marL="257175" indent="-257175">
@@ -28983,7 +28582,7 @@
               <a:rPr lang="de-CH" smtClean="0"/>
               <a:t>Slide </a:t>
             </a:r>
-            <a:fld id="{F15E156A-DD94-4FD3-B935-60AE76C14262}" type="slidenum">
+            <a:fld id="{6B3094B7-DE3B-4B1C-98AF-72AD49FD20F4}" type="slidenum">
               <a:rPr lang="de-CH" smtClean="0"/>
               <a:t>32</a:t>
             </a:fld>
@@ -29175,7 +28774,7 @@
               <a:rPr lang="de-CH" smtClean="0"/>
               <a:t>Slide </a:t>
             </a:r>
-            <a:fld id="{D38C46BF-1EF6-4CE3-9888-68F8C81DA5BC}" type="slidenum">
+            <a:fld id="{CA359864-73DE-4348-BE03-9EA6C5D58EA2}" type="slidenum">
               <a:rPr lang="de-CH" smtClean="0"/>
               <a:t>33</a:t>
             </a:fld>
@@ -29450,7 +29049,7 @@
               <a:rPr lang="de-CH" smtClean="0"/>
               <a:t>Slide </a:t>
             </a:r>
-            <a:fld id="{E2B419DA-C770-4F9B-9081-0FC62149F55D}" type="slidenum">
+            <a:fld id="{86A89ADE-4219-4E87-A9C7-FD159BB5C229}" type="slidenum">
               <a:rPr lang="de-CH" smtClean="0"/>
               <a:t>34</a:t>
             </a:fld>
@@ -29606,7 +29205,7 @@
               <a:rPr lang="de-CH" smtClean="0"/>
               <a:t>Slide </a:t>
             </a:r>
-            <a:fld id="{6EACA59D-D03A-46BF-9DA7-A4B5629190E2}" type="slidenum">
+            <a:fld id="{7587FE69-9C0C-4E4F-8C8E-4565A2BBE66C}" type="slidenum">
               <a:rPr lang="de-CH" smtClean="0"/>
               <a:t>35</a:t>
             </a:fld>
@@ -30770,7 +30369,7 @@
               <a:rPr lang="de-CH" smtClean="0"/>
               <a:t>Slide </a:t>
             </a:r>
-            <a:fld id="{CA067034-760B-46C1-B64D-1B9BEDC52EC9}" type="slidenum">
+            <a:fld id="{35E1499A-B5E1-4F73-A487-3A3BFEF463C6}" type="slidenum">
               <a:rPr lang="de-CH" smtClean="0"/>
               <a:t>36</a:t>
             </a:fld>
@@ -31449,7 +31048,7 @@
               <a:rPr lang="de-CH" smtClean="0"/>
               <a:t>Slide </a:t>
             </a:r>
-            <a:fld id="{DFFAECBB-70D9-4693-99F1-CB7A643BEA1A}" type="slidenum">
+            <a:fld id="{A329E7C9-B868-4DE0-AFDA-30FDED9391DD}" type="slidenum">
               <a:rPr lang="de-CH" smtClean="0"/>
               <a:t>37</a:t>
             </a:fld>
@@ -32530,7 +32129,7 @@
               <a:rPr lang="de-CH" smtClean="0"/>
               <a:t>Slide </a:t>
             </a:r>
-            <a:fld id="{7B767141-700F-4325-8D56-28B7704F37CD}" type="slidenum">
+            <a:fld id="{F457DE7D-8B1F-48E1-AB65-B55DD400F4EA}" type="slidenum">
               <a:rPr lang="de-CH" smtClean="0"/>
               <a:t>38</a:t>
             </a:fld>
@@ -33346,7 +32945,7 @@
               <a:rPr lang="de-CH" smtClean="0"/>
               <a:t>Slide </a:t>
             </a:r>
-            <a:fld id="{D9136DBB-3782-4EF8-9B67-9202FEBE2F5D}" type="slidenum">
+            <a:fld id="{2CE0DE15-0A74-478C-B853-1BB95F589310}" type="slidenum">
               <a:rPr lang="de-CH" smtClean="0"/>
               <a:t>39</a:t>
             </a:fld>
@@ -34962,7 +34561,7 @@
               <a:rPr lang="de-CH" smtClean="0"/>
               <a:t>Slide </a:t>
             </a:r>
-            <a:fld id="{52F37502-E421-40AF-9DAD-E65CACDF81EE}" type="slidenum">
+            <a:fld id="{B9A3157B-10F8-4464-97F0-0B20594DDCFC}" type="slidenum">
               <a:rPr lang="de-CH" smtClean="0"/>
               <a:t>4</a:t>
             </a:fld>
@@ -34984,11 +34583,11 @@
   <p:clrMapOvr>
     <a:masterClrMapping/>
   </p:clrMapOvr>
-  <mc:AlternateContent xmlns:mc="http://schemas.openxmlformats.org/markup-compatibility/2006">
-    <mc:Choice xmlns:p14="http://schemas.microsoft.com/office/powerpoint/2010/main" Requires="p14">
+  <mc:AlternateContent xmlns:mc="http://schemas.openxmlformats.org/markup-compatibility/2006" xmlns:p14="http://schemas.microsoft.com/office/powerpoint/2010/main">
+    <mc:Choice Requires="p14">
       <p:transition spd="slow" p14:dur="2000"/>
     </mc:Choice>
-    <mc:Fallback>
+    <mc:Fallback xmlns="">
       <p:transition spd="slow"/>
     </mc:Fallback>
   </mc:AlternateContent>
@@ -35905,7 +35504,7 @@
               <a:rPr lang="de-CH" smtClean="0"/>
               <a:t>Slide </a:t>
             </a:r>
-            <a:fld id="{11A55224-18A1-4134-AB97-C919E109EF42}" type="slidenum">
+            <a:fld id="{088D3BE6-36B7-4EFD-905A-5644E1AFDD97}" type="slidenum">
               <a:rPr lang="de-CH" smtClean="0"/>
               <a:t>40</a:t>
             </a:fld>
@@ -36432,7 +36031,7 @@
               <a:rPr lang="de-CH" smtClean="0"/>
               <a:t>Slide </a:t>
             </a:r>
-            <a:fld id="{963EDE77-C08C-4DC4-98CC-A8F032314203}" type="slidenum">
+            <a:fld id="{6F20966C-4BB3-4CD7-97AF-CCEABA802673}" type="slidenum">
               <a:rPr lang="de-CH" smtClean="0"/>
               <a:t>41</a:t>
             </a:fld>
@@ -36648,7 +36247,7 @@
               <a:rPr lang="de-CH" smtClean="0"/>
               <a:t>Slide </a:t>
             </a:r>
-            <a:fld id="{A512BC4A-002B-41F4-9778-9AD821F7AF13}" type="slidenum">
+            <a:fld id="{9765647D-9577-4A52-AF72-12C7B0EEF6EC}" type="slidenum">
               <a:rPr lang="de-CH" smtClean="0"/>
               <a:t>42</a:t>
             </a:fld>
@@ -36797,7 +36396,7 @@
               <a:rPr lang="de-CH" smtClean="0"/>
               <a:t>Slide </a:t>
             </a:r>
-            <a:fld id="{51520022-15B9-45F6-AE4A-F7DA6E9390A8}" type="slidenum">
+            <a:fld id="{B1617B67-CF4D-456B-943B-100680BED0D6}" type="slidenum">
               <a:rPr lang="de-CH" smtClean="0"/>
               <a:t>43</a:t>
             </a:fld>
@@ -37226,7 +36825,12 @@
             <p:ph type="ctrTitle"/>
           </p:nvPr>
         </p:nvSpPr>
-        <p:spPr/>
+        <p:spPr>
+          <a:xfrm>
+            <a:off x="579438" y="2146333"/>
+            <a:ext cx="8412162" cy="1354675"/>
+          </a:xfrm>
+        </p:spPr>
         <p:txBody>
           <a:bodyPr/>
           <a:lstStyle/>
@@ -37316,7 +36920,7 @@
               <a:rPr lang="de-CH" smtClean="0"/>
               <a:t>Slide </a:t>
             </a:r>
-            <a:fld id="{27CAD3CD-274A-4078-ADF9-AE3EEC5AE4A3}" type="slidenum">
+            <a:fld id="{5FC49E90-63C4-4943-9F7A-8452AC6898F1}" type="slidenum">
               <a:rPr lang="de-CH" smtClean="0"/>
               <a:t>44</a:t>
             </a:fld>
@@ -37330,15 +36934,64 @@
       </p:sp>
       <p:sp>
         <p:nvSpPr>
-          <p:cNvPr id="13" name="Picture Placeholder 12"/>
-          <p:cNvSpPr>
-            <a:spLocks noGrp="1"/>
-          </p:cNvSpPr>
-          <p:nvPr>
-            <p:ph type="pic" sz="quarter" idx="10"/>
-          </p:nvPr>
-        </p:nvSpPr>
-        <p:spPr/>
+          <p:cNvPr id="6" name="Rectangle 5"/>
+          <p:cNvSpPr/>
+          <p:nvPr/>
+        </p:nvSpPr>
+        <p:spPr>
+          <a:xfrm>
+            <a:off x="574674" y="4892967"/>
+            <a:ext cx="7813749" cy="1200329"/>
+          </a:xfrm>
+          <a:prstGeom prst="rect">
+            <a:avLst/>
+          </a:prstGeom>
+        </p:spPr>
+        <p:txBody>
+          <a:bodyPr wrap="square">
+            <a:spAutoFit/>
+          </a:bodyPr>
+          <a:lstStyle/>
+          <a:p>
+            <a:r>
+              <a:rPr lang="en-GB" sz="2400" dirty="0"/>
+              <a:t>Download slides and code examples from:</a:t>
+            </a:r>
+          </a:p>
+          <a:p>
+            <a:endParaRPr lang="en-GB" sz="2400" dirty="0" smtClean="0">
+              <a:latin typeface="Consolas" panose="020B0609020204030204" pitchFamily="49" charset="0"/>
+              <a:cs typeface="Consolas" panose="020B0609020204030204" pitchFamily="49" charset="0"/>
+            </a:endParaRPr>
+          </a:p>
+          <a:p>
+            <a:r>
+              <a:rPr lang="en-GB" sz="2400" dirty="0" smtClean="0">
+                <a:latin typeface="Consolas" panose="020B0609020204030204" pitchFamily="49" charset="0"/>
+                <a:cs typeface="Consolas" panose="020B0609020204030204" pitchFamily="49" charset="0"/>
+              </a:rPr>
+              <a:t>https</a:t>
+            </a:r>
+            <a:r>
+              <a:rPr lang="en-GB" sz="2400" dirty="0">
+                <a:latin typeface="Consolas" panose="020B0609020204030204" pitchFamily="49" charset="0"/>
+                <a:cs typeface="Consolas" panose="020B0609020204030204" pitchFamily="49" charset="0"/>
+              </a:rPr>
+              <a:t>://github.com/</a:t>
+            </a:r>
+            <a:r>
+              <a:rPr lang="en-GB" sz="2400" b="1" dirty="0">
+                <a:latin typeface="Consolas" panose="020B0609020204030204" pitchFamily="49" charset="0"/>
+                <a:cs typeface="Consolas" panose="020B0609020204030204" pitchFamily="49" charset="0"/>
+              </a:rPr>
+              <a:t>aax/zdays-fp-patterns</a:t>
+            </a:r>
+            <a:endParaRPr lang="en-GB" sz="2400" b="1" dirty="0">
+              <a:latin typeface="Consolas" panose="020B0609020204030204" pitchFamily="49" charset="0"/>
+              <a:cs typeface="Consolas" panose="020B0609020204030204" pitchFamily="49" charset="0"/>
+            </a:endParaRPr>
+          </a:p>
+        </p:txBody>
       </p:sp>
     </p:spTree>
     <p:extLst>
@@ -37510,7 +37163,7 @@
               <a:rPr lang="de-CH" smtClean="0"/>
               <a:t>Slide </a:t>
             </a:r>
-            <a:fld id="{8F2551B6-3B34-4E9A-9859-A7C945936C1B}" type="slidenum">
+            <a:fld id="{388CB042-EACA-4A75-94C4-49E85B02BBEA}" type="slidenum">
               <a:rPr lang="de-CH" smtClean="0"/>
               <a:t>45</a:t>
             </a:fld>
@@ -37744,7 +37397,7 @@
               <a:rPr lang="de-CH" smtClean="0"/>
               <a:t>Slide </a:t>
             </a:r>
-            <a:fld id="{466F5301-EEDC-4755-9B90-DD81AB4C8C38}" type="slidenum">
+            <a:fld id="{976E63F7-2AD2-4CD0-8A95-8E9414683BE7}" type="slidenum">
               <a:rPr lang="de-CH" smtClean="0"/>
               <a:t>5</a:t>
             </a:fld>
@@ -37847,11 +37500,7 @@
             </a:r>
             <a:r>
               <a:rPr lang="en-GB" dirty="0" smtClean="0"/>
-              <a:t>	How </a:t>
-            </a:r>
-            <a:r>
-              <a:rPr lang="en-GB" dirty="0" smtClean="0"/>
-              <a:t>to raise awareness for side effects</a:t>
+              <a:t>	How to raise awareness for side effects</a:t>
             </a:r>
             <a:endParaRPr lang="en-GB" dirty="0"/>
           </a:p>
@@ -37892,11 +37541,7 @@
             </a:pPr>
             <a:r>
               <a:rPr lang="en-GB" dirty="0" smtClean="0"/>
-              <a:t>	Context </a:t>
-            </a:r>
-            <a:r>
-              <a:rPr lang="en-GB" dirty="0" smtClean="0"/>
-              <a:t>types, function chaining</a:t>
+              <a:t>	Context types, function chaining</a:t>
             </a:r>
           </a:p>
           <a:p>
@@ -37908,11 +37553,7 @@
             </a:pPr>
             <a:r>
               <a:rPr lang="en-GB" dirty="0" smtClean="0"/>
-              <a:t>	Reactive </a:t>
-            </a:r>
-            <a:r>
-              <a:rPr lang="en-GB" dirty="0" smtClean="0"/>
-              <a:t>programming</a:t>
+              <a:t>	Reactive programming</a:t>
             </a:r>
           </a:p>
           <a:p>
@@ -37935,11 +37576,7 @@
             </a:r>
             <a:r>
               <a:rPr lang="en-GB" dirty="0" smtClean="0"/>
-              <a:t>	Structural </a:t>
-            </a:r>
-            <a:r>
-              <a:rPr lang="en-GB" dirty="0" smtClean="0"/>
-              <a:t>sharing</a:t>
+              <a:t>	Structural sharing</a:t>
             </a:r>
           </a:p>
           <a:p>
@@ -37953,7 +37590,6 @@
               <a:rPr lang="en-GB" dirty="0" smtClean="0"/>
               <a:t>	Lenses</a:t>
             </a:r>
-            <a:endParaRPr lang="en-GB" dirty="0" smtClean="0"/>
           </a:p>
         </p:txBody>
       </p:sp>
@@ -38041,7 +37677,7 @@
               <a:rPr lang="de-CH" smtClean="0"/>
               <a:t>Slide </a:t>
             </a:r>
-            <a:fld id="{662F53B7-96BD-40A8-80C3-F6738A5D9E1B}" type="slidenum">
+            <a:fld id="{DC9E5B2B-8EE2-4787-B7AE-3C37FB81BC88}" type="slidenum">
               <a:rPr lang="de-CH" smtClean="0"/>
               <a:t>6</a:t>
             </a:fld>
@@ -38233,7 +37869,7 @@
               <a:rPr lang="de-CH" smtClean="0"/>
               <a:t>Slide </a:t>
             </a:r>
-            <a:fld id="{239844F4-CF4A-4016-8E53-8013BCE21376}" type="slidenum">
+            <a:fld id="{E2DDDDC5-E78E-4B62-841F-D6AF0C0BBE7F}" type="slidenum">
               <a:rPr lang="de-CH" smtClean="0"/>
               <a:t>7</a:t>
             </a:fld>
@@ -38455,7 +38091,7 @@
               <a:rPr lang="de-CH" smtClean="0"/>
               <a:t>Slide </a:t>
             </a:r>
-            <a:fld id="{48D73C39-46D3-4B50-A1FB-B9F3F6CF676D}" type="slidenum">
+            <a:fld id="{83E630D2-88C4-41D6-BABC-2DC89992C38A}" type="slidenum">
               <a:rPr lang="de-CH" smtClean="0"/>
               <a:t>8</a:t>
             </a:fld>
@@ -38634,7 +38270,7 @@
               <a:rPr lang="de-CH" smtClean="0"/>
               <a:t>Slide </a:t>
             </a:r>
-            <a:fld id="{533AD02D-88E7-4724-B0A1-5CF3CBF879C8}" type="slidenum">
+            <a:fld id="{955C38E2-7C2C-4D20-99A4-A215A939CC80}" type="slidenum">
               <a:rPr lang="de-CH" smtClean="0"/>
               <a:t>9</a:t>
             </a:fld>

</xml_diff>

<commit_message>
update pure functions intro slide
</commit_message>
<xml_diff>
--- a/Functional Design Patterns for OO Practitioners.pptx
+++ b/Functional Design Patterns for OO Practitioners.pptx
@@ -3247,6 +3247,91 @@
           <a:bodyPr/>
           <a:lstStyle/>
           <a:p>
+            <a:endParaRPr lang="en-GB" dirty="0"/>
+          </a:p>
+        </p:txBody>
+      </p:sp>
+      <p:sp>
+        <p:nvSpPr>
+          <p:cNvPr id="4" name="Slide Number Placeholder 3"/>
+          <p:cNvSpPr>
+            <a:spLocks noGrp="1"/>
+          </p:cNvSpPr>
+          <p:nvPr>
+            <p:ph type="sldNum" sz="quarter" idx="10"/>
+          </p:nvPr>
+        </p:nvSpPr>
+        <p:spPr/>
+        <p:txBody>
+          <a:bodyPr/>
+          <a:lstStyle/>
+          <a:p>
+            <a:fld id="{04E102C5-3B9C-48EE-BFF0-2E7AF2F2A1F4}" type="slidenum">
+              <a:rPr lang="en-US" smtClean="0"/>
+              <a:pPr/>
+              <a:t>1</a:t>
+            </a:fld>
+            <a:endParaRPr lang="en-US" dirty="0"/>
+          </a:p>
+        </p:txBody>
+      </p:sp>
+    </p:spTree>
+    <p:extLst>
+      <p:ext uri="{BB962C8B-B14F-4D97-AF65-F5344CB8AC3E}">
+        <p14:creationId xmlns:p14="http://schemas.microsoft.com/office/powerpoint/2010/main" val="2515836422"/>
+      </p:ext>
+    </p:extLst>
+  </p:cSld>
+  <p:clrMapOvr>
+    <a:masterClrMapping/>
+  </p:clrMapOvr>
+</p:notes>
+</file>
+
+<file path=ppt/notesSlides/notesSlide2.xml><?xml version="1.0" encoding="utf-8"?>
+<p:notes xmlns:a="http://schemas.openxmlformats.org/drawingml/2006/main" xmlns:r="http://schemas.openxmlformats.org/officeDocument/2006/relationships" xmlns:p="http://schemas.openxmlformats.org/presentationml/2006/main">
+  <p:cSld>
+    <p:spTree>
+      <p:nvGrpSpPr>
+        <p:cNvPr id="1" name=""/>
+        <p:cNvGrpSpPr/>
+        <p:nvPr/>
+      </p:nvGrpSpPr>
+      <p:grpSpPr>
+        <a:xfrm>
+          <a:off x="0" y="0"/>
+          <a:ext cx="0" cy="0"/>
+          <a:chOff x="0" y="0"/>
+          <a:chExt cx="0" cy="0"/>
+        </a:xfrm>
+      </p:grpSpPr>
+      <p:sp>
+        <p:nvSpPr>
+          <p:cNvPr id="2" name="Slide Image Placeholder 1"/>
+          <p:cNvSpPr>
+            <a:spLocks noGrp="1" noRot="1" noChangeAspect="1"/>
+          </p:cNvSpPr>
+          <p:nvPr>
+            <p:ph type="sldImg"/>
+          </p:nvPr>
+        </p:nvSpPr>
+        <p:spPr/>
+      </p:sp>
+      <p:sp>
+        <p:nvSpPr>
+          <p:cNvPr id="3" name="Notes Placeholder 2"/>
+          <p:cNvSpPr>
+            <a:spLocks noGrp="1"/>
+          </p:cNvSpPr>
+          <p:nvPr>
+            <p:ph type="body" idx="1"/>
+          </p:nvPr>
+        </p:nvSpPr>
+        <p:spPr/>
+        <p:txBody>
+          <a:bodyPr/>
+          <a:lstStyle/>
+          <a:p>
             <a:pPr marL="0" marR="0" indent="0" algn="l" defTabSz="914400" rtl="0" eaLnBrk="1" fontAlgn="auto" latinLnBrk="0" hangingPunct="1">
               <a:lnSpc>
                 <a:spcPct val="100000"/>
@@ -3313,7 +3398,7 @@
 </p:notes>
 </file>
 
-<file path=ppt/notesSlides/notesSlide2.xml><?xml version="1.0" encoding="utf-8"?>
+<file path=ppt/notesSlides/notesSlide3.xml><?xml version="1.0" encoding="utf-8"?>
 <p:notes xmlns:a="http://schemas.openxmlformats.org/drawingml/2006/main" xmlns:r="http://schemas.openxmlformats.org/officeDocument/2006/relationships" xmlns:p="http://schemas.openxmlformats.org/presentationml/2006/main">
   <p:cSld>
     <p:spTree>
@@ -3512,7 +3597,7 @@
               <a:rPr lang="de-CH" smtClean="0"/>
               <a:t>Slide </a:t>
             </a:r>
-            <a:fld id="{814293EB-8324-4822-93BF-D115C951E99A}" type="slidenum">
+            <a:fld id="{21C1F861-4106-498D-B09C-D989E46852BB}" type="slidenum">
               <a:rPr smtClean="0"/>
               <a:pPr/>
               <a:t>‹#›</a:t>
@@ -3836,7 +3921,7 @@
               <a:rPr lang="de-CH" smtClean="0"/>
               <a:t>Slide </a:t>
             </a:r>
-            <a:fld id="{004F4E99-AE5F-4BEF-86CD-DE14D76A3DD2}" type="slidenum">
+            <a:fld id="{BA15F283-B3D2-4E17-A870-FBBCFBF1FD54}" type="slidenum">
               <a:rPr smtClean="0"/>
               <a:pPr/>
               <a:t>‹#›</a:t>
@@ -4138,7 +4223,7 @@
               <a:rPr lang="de-CH" smtClean="0"/>
               <a:t>Slide </a:t>
             </a:r>
-            <a:fld id="{307AA94A-DBED-48F4-894F-229164342E11}" type="slidenum">
+            <a:fld id="{FE71C13A-9C70-46A9-9200-A1D9D36AA43A}" type="slidenum">
               <a:rPr smtClean="0"/>
               <a:pPr/>
               <a:t>‹#›</a:t>
@@ -4470,7 +4555,7 @@
               <a:rPr lang="de-CH" smtClean="0"/>
               <a:t>Slide </a:t>
             </a:r>
-            <a:fld id="{F9F88798-08D0-4A2C-AABC-8EC60D431370}" type="slidenum">
+            <a:fld id="{D40EE6C1-7006-4E05-A624-2DCABA005D74}" type="slidenum">
               <a:rPr smtClean="0"/>
               <a:pPr/>
               <a:t>‹#›</a:t>
@@ -4804,7 +4889,7 @@
               <a:rPr lang="de-CH" smtClean="0"/>
               <a:t>Slide </a:t>
             </a:r>
-            <a:fld id="{61AD5474-F7FA-46D3-81E4-9DF2C154DBFF}" type="slidenum">
+            <a:fld id="{1AC1C831-782F-4480-A610-416A3ED42F01}" type="slidenum">
               <a:rPr smtClean="0"/>
               <a:pPr/>
               <a:t>‹#›</a:t>
@@ -5234,7 +5319,7 @@
               <a:rPr lang="de-CH" smtClean="0"/>
               <a:t>Slide </a:t>
             </a:r>
-            <a:fld id="{4151FADC-2998-4B83-886E-48A0A87DEEEB}" type="slidenum">
+            <a:fld id="{7ADA5D3E-5B96-4EE3-9516-424DD7382A1F}" type="slidenum">
               <a:rPr smtClean="0"/>
               <a:pPr/>
               <a:t>‹#›</a:t>
@@ -5952,7 +6037,7 @@
               <a:rPr lang="de-CH" smtClean="0"/>
               <a:t>Slide </a:t>
             </a:r>
-            <a:fld id="{A02B7A13-E118-40AF-8CC8-FDE12A9EFAA8}" type="slidenum">
+            <a:fld id="{A462019B-00D7-4A05-B9CC-D2DB6C29D057}" type="slidenum">
               <a:rPr smtClean="0"/>
               <a:pPr/>
               <a:t>‹#›</a:t>
@@ -6258,7 +6343,7 @@
               <a:rPr lang="de-CH" smtClean="0"/>
               <a:t>Slide </a:t>
             </a:r>
-            <a:fld id="{7F3BE8B5-8B9C-4A22-BFB2-0735CED4742E}" type="slidenum">
+            <a:fld id="{FAB99FF4-8BD2-4219-BF19-B3BD0DF5325C}" type="slidenum">
               <a:rPr smtClean="0"/>
               <a:pPr/>
               <a:t>‹#›</a:t>
@@ -6785,7 +6870,7 @@
               <a:rPr lang="de-CH" smtClean="0"/>
               <a:t>Slide </a:t>
             </a:r>
-            <a:fld id="{FF3695AF-1B2B-49EA-ADB3-C5C12D8876EA}" type="slidenum">
+            <a:fld id="{BC5F90F5-F21D-4813-BF02-1130DABA1EBA}" type="slidenum">
               <a:rPr smtClean="0"/>
               <a:pPr/>
               <a:t>‹#›</a:t>
@@ -7183,7 +7268,7 @@
               <a:rPr lang="de-CH" smtClean="0"/>
               <a:t>Slide </a:t>
             </a:r>
-            <a:fld id="{83EA0EFA-FB74-4B97-A800-317CBC48E8F4}" type="slidenum">
+            <a:fld id="{61BF4F47-FDF4-4095-A8CF-8AD23F12302B}" type="slidenum">
               <a:rPr smtClean="0"/>
               <a:pPr/>
               <a:t>‹#›</a:t>
@@ -7413,7 +7498,7 @@
               <a:rPr lang="de-CH" smtClean="0"/>
               <a:t>Slide </a:t>
             </a:r>
-            <a:fld id="{59BF0A48-9CDC-4239-97B8-210A24C51A1E}" type="slidenum">
+            <a:fld id="{143EA16C-059E-48E2-8B33-9913902B6755}" type="slidenum">
               <a:rPr smtClean="0"/>
               <a:pPr/>
               <a:t>‹#›</a:t>
@@ -7691,7 +7776,7 @@
               <a:rPr lang="de-CH" smtClean="0"/>
               <a:t>Slide </a:t>
             </a:r>
-            <a:fld id="{556D83E5-4303-497D-BDC6-2E0C57F1AD61}" type="slidenum">
+            <a:fld id="{347367A0-4E05-4AED-8819-6EFD7984867A}" type="slidenum">
               <a:rPr smtClean="0"/>
               <a:pPr/>
               <a:t>‹#›</a:t>
@@ -8166,7 +8251,7 @@
               <a:rPr lang="de-CH" smtClean="0"/>
               <a:t>Slide </a:t>
             </a:r>
-            <a:fld id="{2BFDD7F9-AD2D-47D7-8A00-98F108E09E1A}" type="slidenum">
+            <a:fld id="{C0D91BE5-71F6-4024-BF8B-3BF8299DE3B3}" type="slidenum">
               <a:rPr lang="de-CH" smtClean="0"/>
               <a:t>1</a:t>
             </a:fld>
@@ -8322,7 +8407,7 @@
               <a:rPr lang="de-CH" smtClean="0"/>
               <a:t>Slide </a:t>
             </a:r>
-            <a:fld id="{E391FFB8-35A4-4C6A-9913-67AA70A80C79}" type="slidenum">
+            <a:fld id="{EA16C1A2-81DC-44E9-9EB7-195F266EA551}" type="slidenum">
               <a:rPr lang="de-CH" smtClean="0"/>
               <a:t>10</a:t>
             </a:fld>
@@ -8961,7 +9046,7 @@
               <a:rPr lang="de-CH" smtClean="0"/>
               <a:t>Slide </a:t>
             </a:r>
-            <a:fld id="{8CC028F7-D2E1-4BE3-9918-4AA2E89CC0CE}" type="slidenum">
+            <a:fld id="{C9A050F2-1FD8-4479-B1B1-371732CEE2BB}" type="slidenum">
               <a:rPr lang="de-CH" smtClean="0"/>
               <a:t>11</a:t>
             </a:fld>
@@ -9195,7 +9280,7 @@
               <a:rPr lang="de-CH" smtClean="0"/>
               <a:t>Slide </a:t>
             </a:r>
-            <a:fld id="{25613985-93DC-4230-A4D1-6BE383DD030C}" type="slidenum">
+            <a:fld id="{05BDE2ED-250A-4211-830A-0E527824D6E1}" type="slidenum">
               <a:rPr lang="de-CH" smtClean="0"/>
               <a:t>12</a:t>
             </a:fld>
@@ -9410,7 +9495,7 @@
               <a:rPr lang="de-CH" smtClean="0"/>
               <a:t>Slide </a:t>
             </a:r>
-            <a:fld id="{B141355B-5153-42AA-9365-F77DDA5589AE}" type="slidenum">
+            <a:fld id="{D015E497-13D5-46E8-8BB3-822BD096B0A8}" type="slidenum">
               <a:rPr lang="de-CH" smtClean="0"/>
               <a:t>13</a:t>
             </a:fld>
@@ -9671,7 +9756,7 @@
               <a:rPr lang="de-CH" smtClean="0"/>
               <a:t>Slide </a:t>
             </a:r>
-            <a:fld id="{A2C91F3A-F247-454C-986E-8D55F06E605E}" type="slidenum">
+            <a:fld id="{9F648D0E-DFE9-4A17-977A-6AB6D3B96CE0}" type="slidenum">
               <a:rPr lang="de-CH" smtClean="0"/>
               <a:t>14</a:t>
             </a:fld>
@@ -10021,7 +10106,7 @@
               <a:rPr lang="de-CH" smtClean="0"/>
               <a:t>Slide </a:t>
             </a:r>
-            <a:fld id="{9DD9E41B-CF98-4CB7-AF48-5A74E43298FB}" type="slidenum">
+            <a:fld id="{667557DB-B73F-4D3D-B378-56412C284EFB}" type="slidenum">
               <a:rPr lang="de-CH" smtClean="0"/>
               <a:t>15</a:t>
             </a:fld>
@@ -10225,7 +10310,7 @@
               <a:rPr lang="de-CH" smtClean="0"/>
               <a:t>Slide </a:t>
             </a:r>
-            <a:fld id="{902B10C0-4C83-4803-BA35-A0F9A99E8CC8}" type="slidenum">
+            <a:fld id="{9D56E2F9-8FF2-4411-B777-E68F50301D48}" type="slidenum">
               <a:rPr lang="de-CH" smtClean="0"/>
               <a:t>16</a:t>
             </a:fld>
@@ -10631,7 +10716,7 @@
               <a:rPr lang="de-CH" smtClean="0"/>
               <a:t>Slide </a:t>
             </a:r>
-            <a:fld id="{3B37F2FD-F4BB-4658-996A-74C4A74F8944}" type="slidenum">
+            <a:fld id="{91D1F67B-5603-4228-B763-42515028C7A1}" type="slidenum">
               <a:rPr lang="de-CH" smtClean="0"/>
               <a:t>17</a:t>
             </a:fld>
@@ -12565,7 +12650,7 @@
               <a:rPr lang="de-CH" smtClean="0"/>
               <a:t>Slide </a:t>
             </a:r>
-            <a:fld id="{57847960-711C-45E5-A7DD-7D6023D63D39}" type="slidenum">
+            <a:fld id="{3EA92558-C07E-4EBA-9CB3-091BD14F14FF}" type="slidenum">
               <a:rPr lang="de-CH" smtClean="0"/>
               <a:t>18</a:t>
             </a:fld>
@@ -14271,7 +14356,7 @@
               <a:rPr lang="de-CH" smtClean="0"/>
               <a:t>Slide </a:t>
             </a:r>
-            <a:fld id="{060952B5-F9A4-46A6-AEF8-C5D3938EBF86}" type="slidenum">
+            <a:fld id="{5E2B1DCE-5075-4039-BF94-779155EA1757}" type="slidenum">
               <a:rPr lang="de-CH" smtClean="0"/>
               <a:t>19</a:t>
             </a:fld>
@@ -14670,7 +14755,7 @@
               <a:rPr lang="de-CH" smtClean="0"/>
               <a:t>Slide </a:t>
             </a:r>
-            <a:fld id="{8A8323CF-A3F6-4D9F-8238-A4E70395D3D6}" type="slidenum">
+            <a:fld id="{8B991AF1-2215-4953-A59F-426618F65CD6}" type="slidenum">
               <a:rPr lang="de-CH" smtClean="0"/>
               <a:t>2</a:t>
             </a:fld>
@@ -16690,7 +16775,7 @@
               <a:rPr lang="de-CH" smtClean="0"/>
               <a:t>Slide </a:t>
             </a:r>
-            <a:fld id="{253F5B39-BD89-4E79-A885-10503A603035}" type="slidenum">
+            <a:fld id="{640CF677-696E-40C9-817B-8E21AB5CAE04}" type="slidenum">
               <a:rPr lang="de-CH" smtClean="0"/>
               <a:t>20</a:t>
             </a:fld>
@@ -17516,7 +17601,7 @@
               <a:rPr lang="de-CH" smtClean="0"/>
               <a:t>Slide </a:t>
             </a:r>
-            <a:fld id="{D70E2002-25D1-4881-AE48-447246BFD9AE}" type="slidenum">
+            <a:fld id="{42BA5F72-15DD-4847-9285-E24C2E95980F}" type="slidenum">
               <a:rPr lang="de-CH" smtClean="0"/>
               <a:t>21</a:t>
             </a:fld>
@@ -17929,7 +18014,7 @@
               <a:rPr lang="de-CH" smtClean="0"/>
               <a:t>Slide </a:t>
             </a:r>
-            <a:fld id="{77450D2C-9B95-4252-84A8-2A353F99B09E}" type="slidenum">
+            <a:fld id="{4093EC64-6984-42BF-9624-99B51C7DB0A8}" type="slidenum">
               <a:rPr lang="de-CH" smtClean="0"/>
               <a:t>22</a:t>
             </a:fld>
@@ -19489,7 +19574,7 @@
               <a:rPr lang="de-CH" smtClean="0"/>
               <a:t>Slide </a:t>
             </a:r>
-            <a:fld id="{2DA1D21E-2024-4B33-BC89-543106C779A6}" type="slidenum">
+            <a:fld id="{4BB0FDB4-6130-45E8-AC55-E9A7B5468848}" type="slidenum">
               <a:rPr lang="de-CH" smtClean="0"/>
               <a:t>23</a:t>
             </a:fld>
@@ -20083,7 +20168,7 @@
               <a:rPr lang="de-CH" smtClean="0"/>
               <a:t>Slide </a:t>
             </a:r>
-            <a:fld id="{FF6CC8F3-EDA1-420D-A1B8-582B26162598}" type="slidenum">
+            <a:fld id="{5B6B9F81-7C89-4C89-BF22-B3F47D99E157}" type="slidenum">
               <a:rPr lang="de-CH" smtClean="0"/>
               <a:t>24</a:t>
             </a:fld>
@@ -21153,7 +21238,7 @@
               <a:rPr lang="de-CH" smtClean="0"/>
               <a:t>Slide </a:t>
             </a:r>
-            <a:fld id="{D2394D2F-6AF5-45DD-9A39-F1F82B5C5C61}" type="slidenum">
+            <a:fld id="{A82FF70A-B849-499D-90AF-B1722D301B4A}" type="slidenum">
               <a:rPr lang="de-CH" smtClean="0"/>
               <a:t>25</a:t>
             </a:fld>
@@ -22989,7 +23074,7 @@
               <a:rPr lang="de-CH" smtClean="0"/>
               <a:t>Slide </a:t>
             </a:r>
-            <a:fld id="{0E2975E7-7806-452A-88FB-A1D9329C9353}" type="slidenum">
+            <a:fld id="{91FBA15C-D714-4185-BB93-69F424381ABF}" type="slidenum">
               <a:rPr lang="de-CH" smtClean="0"/>
               <a:t>26</a:t>
             </a:fld>
@@ -23485,7 +23570,7 @@
               <a:rPr lang="de-CH" smtClean="0"/>
               <a:t>Slide </a:t>
             </a:r>
-            <a:fld id="{64BFDD5E-13B0-4492-A815-06F94206A79A}" type="slidenum">
+            <a:fld id="{8E560011-70EC-4C5C-8004-DD913C56FEE8}" type="slidenum">
               <a:rPr lang="de-CH" smtClean="0"/>
               <a:t>27</a:t>
             </a:fld>
@@ -25057,7 +25142,7 @@
               <a:rPr lang="de-CH" smtClean="0"/>
               <a:t>Slide </a:t>
             </a:r>
-            <a:fld id="{1EC2154E-636F-4232-8E71-C33B673CC55D}" type="slidenum">
+            <a:fld id="{5F495CA5-575E-4B72-AC84-7916ECDE657F}" type="slidenum">
               <a:rPr lang="de-CH" smtClean="0"/>
               <a:t>28</a:t>
             </a:fld>
@@ -26613,7 +26698,7 @@
               <a:rPr lang="de-CH" smtClean="0"/>
               <a:t>Slide </a:t>
             </a:r>
-            <a:fld id="{C2D8F11C-6A06-4E8C-872C-7D58DF5D3DF3}" type="slidenum">
+            <a:fld id="{64DE4727-FDE6-447D-A082-DC48AE257680}" type="slidenum">
               <a:rPr lang="de-CH" smtClean="0"/>
               <a:t>29</a:t>
             </a:fld>
@@ -26865,7 +26950,7 @@
               <a:rPr lang="de-CH" smtClean="0"/>
               <a:t>Slide </a:t>
             </a:r>
-            <a:fld id="{9DD5C29F-951E-4FB3-B8FF-5A7F647F1B8E}" type="slidenum">
+            <a:fld id="{3547ED0C-C57C-49AB-89F6-426B76214858}" type="slidenum">
               <a:rPr lang="de-CH" smtClean="0"/>
               <a:t>3</a:t>
             </a:fld>
@@ -27826,7 +27911,7 @@
               <a:rPr lang="de-CH" smtClean="0"/>
               <a:t>Slide </a:t>
             </a:r>
-            <a:fld id="{7FF47CED-D8A7-4FA3-83C5-95CDE0B20DF7}" type="slidenum">
+            <a:fld id="{CE1BA00F-6C13-4677-ACD8-1F2ED07E0A87}" type="slidenum">
               <a:rPr lang="de-CH" smtClean="0"/>
               <a:t>30</a:t>
             </a:fld>
@@ -28258,7 +28343,7 @@
               <a:rPr lang="de-CH" smtClean="0"/>
               <a:t>Slide </a:t>
             </a:r>
-            <a:fld id="{D0FE2D36-418F-4266-BFEB-EDF4B11EB58E}" type="slidenum">
+            <a:fld id="{47D84A14-52D1-47E4-B74B-5F2F92F48F5F}" type="slidenum">
               <a:rPr lang="de-CH" smtClean="0"/>
               <a:t>31</a:t>
             </a:fld>
@@ -28582,7 +28667,7 @@
               <a:rPr lang="de-CH" smtClean="0"/>
               <a:t>Slide </a:t>
             </a:r>
-            <a:fld id="{6B3094B7-DE3B-4B1C-98AF-72AD49FD20F4}" type="slidenum">
+            <a:fld id="{64B248A4-56D3-439E-A840-8DE728065B8D}" type="slidenum">
               <a:rPr lang="de-CH" smtClean="0"/>
               <a:t>32</a:t>
             </a:fld>
@@ -28774,7 +28859,7 @@
               <a:rPr lang="de-CH" smtClean="0"/>
               <a:t>Slide </a:t>
             </a:r>
-            <a:fld id="{CA359864-73DE-4348-BE03-9EA6C5D58EA2}" type="slidenum">
+            <a:fld id="{406AB17F-EBB4-4798-9D6D-B27CAF8078E5}" type="slidenum">
               <a:rPr lang="de-CH" smtClean="0"/>
               <a:t>33</a:t>
             </a:fld>
@@ -29049,7 +29134,7 @@
               <a:rPr lang="de-CH" smtClean="0"/>
               <a:t>Slide </a:t>
             </a:r>
-            <a:fld id="{86A89ADE-4219-4E87-A9C7-FD159BB5C229}" type="slidenum">
+            <a:fld id="{A6323A85-2F9A-4FC6-9D8A-3834F67D14DE}" type="slidenum">
               <a:rPr lang="de-CH" smtClean="0"/>
               <a:t>34</a:t>
             </a:fld>
@@ -29205,7 +29290,7 @@
               <a:rPr lang="de-CH" smtClean="0"/>
               <a:t>Slide </a:t>
             </a:r>
-            <a:fld id="{7587FE69-9C0C-4E4F-8C8E-4565A2BBE66C}" type="slidenum">
+            <a:fld id="{2D078C67-222A-4E45-A716-B530D290A8D3}" type="slidenum">
               <a:rPr lang="de-CH" smtClean="0"/>
               <a:t>35</a:t>
             </a:fld>
@@ -30369,7 +30454,7 @@
               <a:rPr lang="de-CH" smtClean="0"/>
               <a:t>Slide </a:t>
             </a:r>
-            <a:fld id="{35E1499A-B5E1-4F73-A487-3A3BFEF463C6}" type="slidenum">
+            <a:fld id="{702CBB4A-A9F8-4258-A5E4-42533BF0EA83}" type="slidenum">
               <a:rPr lang="de-CH" smtClean="0"/>
               <a:t>36</a:t>
             </a:fld>
@@ -31048,7 +31133,7 @@
               <a:rPr lang="de-CH" smtClean="0"/>
               <a:t>Slide </a:t>
             </a:r>
-            <a:fld id="{A329E7C9-B868-4DE0-AFDA-30FDED9391DD}" type="slidenum">
+            <a:fld id="{1A0C4802-F2FB-4054-BC35-2C21B2FAF831}" type="slidenum">
               <a:rPr lang="de-CH" smtClean="0"/>
               <a:t>37</a:t>
             </a:fld>
@@ -32129,7 +32214,7 @@
               <a:rPr lang="de-CH" smtClean="0"/>
               <a:t>Slide </a:t>
             </a:r>
-            <a:fld id="{F457DE7D-8B1F-48E1-AB65-B55DD400F4EA}" type="slidenum">
+            <a:fld id="{61616E89-24FF-427F-AA3E-893155C0FFD8}" type="slidenum">
               <a:rPr lang="de-CH" smtClean="0"/>
               <a:t>38</a:t>
             </a:fld>
@@ -32945,7 +33030,7 @@
               <a:rPr lang="de-CH" smtClean="0"/>
               <a:t>Slide </a:t>
             </a:r>
-            <a:fld id="{2CE0DE15-0A74-478C-B853-1BB95F589310}" type="slidenum">
+            <a:fld id="{5ED7101B-67FB-4263-858F-7AEAD0922BBC}" type="slidenum">
               <a:rPr lang="de-CH" smtClean="0"/>
               <a:t>39</a:t>
             </a:fld>
@@ -34561,7 +34646,7 @@
               <a:rPr lang="de-CH" smtClean="0"/>
               <a:t>Slide </a:t>
             </a:r>
-            <a:fld id="{B9A3157B-10F8-4464-97F0-0B20594DDCFC}" type="slidenum">
+            <a:fld id="{BDA54399-573C-4AF9-831F-F7DD476E9E76}" type="slidenum">
               <a:rPr lang="de-CH" smtClean="0"/>
               <a:t>4</a:t>
             </a:fld>
@@ -35504,7 +35589,7 @@
               <a:rPr lang="de-CH" smtClean="0"/>
               <a:t>Slide </a:t>
             </a:r>
-            <a:fld id="{088D3BE6-36B7-4EFD-905A-5644E1AFDD97}" type="slidenum">
+            <a:fld id="{BCBDAC83-E626-4410-B10D-D5C0CE034A25}" type="slidenum">
               <a:rPr lang="de-CH" smtClean="0"/>
               <a:t>40</a:t>
             </a:fld>
@@ -36031,7 +36116,7 @@
               <a:rPr lang="de-CH" smtClean="0"/>
               <a:t>Slide </a:t>
             </a:r>
-            <a:fld id="{6F20966C-4BB3-4CD7-97AF-CCEABA802673}" type="slidenum">
+            <a:fld id="{38040F36-D180-400C-B4F8-D07F1061B495}" type="slidenum">
               <a:rPr lang="de-CH" smtClean="0"/>
               <a:t>41</a:t>
             </a:fld>
@@ -36247,7 +36332,7 @@
               <a:rPr lang="de-CH" smtClean="0"/>
               <a:t>Slide </a:t>
             </a:r>
-            <a:fld id="{9765647D-9577-4A52-AF72-12C7B0EEF6EC}" type="slidenum">
+            <a:fld id="{59C2FE63-81CE-4202-9035-CEA7FF54B2B0}" type="slidenum">
               <a:rPr lang="de-CH" smtClean="0"/>
               <a:t>42</a:t>
             </a:fld>
@@ -36396,7 +36481,7 @@
               <a:rPr lang="de-CH" smtClean="0"/>
               <a:t>Slide </a:t>
             </a:r>
-            <a:fld id="{B1617B67-CF4D-456B-943B-100680BED0D6}" type="slidenum">
+            <a:fld id="{E233D571-45EF-44A5-9D76-668B5042543B}" type="slidenum">
               <a:rPr lang="de-CH" smtClean="0"/>
               <a:t>43</a:t>
             </a:fld>
@@ -36920,7 +37005,7 @@
               <a:rPr lang="de-CH" smtClean="0"/>
               <a:t>Slide </a:t>
             </a:r>
-            <a:fld id="{5FC49E90-63C4-4943-9F7A-8452AC6898F1}" type="slidenum">
+            <a:fld id="{4047F0DB-9E39-4FFA-BAF2-E7296A7FBDC0}" type="slidenum">
               <a:rPr lang="de-CH" smtClean="0"/>
               <a:t>44</a:t>
             </a:fld>
@@ -36986,10 +37071,6 @@
               </a:rPr>
               <a:t>aax/zdays-fp-patterns</a:t>
             </a:r>
-            <a:endParaRPr lang="en-GB" sz="2400" b="1" dirty="0">
-              <a:latin typeface="Consolas" panose="020B0609020204030204" pitchFamily="49" charset="0"/>
-              <a:cs typeface="Consolas" panose="020B0609020204030204" pitchFamily="49" charset="0"/>
-            </a:endParaRPr>
           </a:p>
         </p:txBody>
       </p:sp>
@@ -37163,7 +37244,7 @@
               <a:rPr lang="de-CH" smtClean="0"/>
               <a:t>Slide </a:t>
             </a:r>
-            <a:fld id="{388CB042-EACA-4A75-94C4-49E85B02BBEA}" type="slidenum">
+            <a:fld id="{3F923887-5B61-4115-9829-616AFB329DE2}" type="slidenum">
               <a:rPr lang="de-CH" smtClean="0"/>
               <a:t>45</a:t>
             </a:fld>
@@ -37397,7 +37478,7 @@
               <a:rPr lang="de-CH" smtClean="0"/>
               <a:t>Slide </a:t>
             </a:r>
-            <a:fld id="{976E63F7-2AD2-4CD0-8A95-8E9414683BE7}" type="slidenum">
+            <a:fld id="{42115482-F811-4BC0-8E24-339377E2A1BF}" type="slidenum">
               <a:rPr lang="de-CH" smtClean="0"/>
               <a:t>5</a:t>
             </a:fld>
@@ -37677,7 +37758,7 @@
               <a:rPr lang="de-CH" smtClean="0"/>
               <a:t>Slide </a:t>
             </a:r>
-            <a:fld id="{DC9E5B2B-8EE2-4787-B7AE-3C37FB81BC88}" type="slidenum">
+            <a:fld id="{FBC9E239-F25C-4297-85FC-D6778F503A2E}" type="slidenum">
               <a:rPr lang="de-CH" smtClean="0"/>
               <a:t>6</a:t>
             </a:fld>
@@ -37869,7 +37950,7 @@
               <a:rPr lang="de-CH" smtClean="0"/>
               <a:t>Slide </a:t>
             </a:r>
-            <a:fld id="{E2DDDDC5-E78E-4B62-841F-D6AF0C0BBE7F}" type="slidenum">
+            <a:fld id="{D4745933-C77E-40D8-80C0-264430929946}" type="slidenum">
               <a:rPr lang="de-CH" smtClean="0"/>
               <a:t>7</a:t>
             </a:fld>
@@ -37956,10 +38037,45 @@
           <a:bodyPr/>
           <a:lstStyle/>
           <a:p>
+            <a:pPr marL="0" lvl="1" indent="0" algn="ctr">
+              <a:buClrTx/>
+              <a:buSzTx/>
+              <a:buNone/>
+            </a:pPr>
+            <a:r>
+              <a:rPr lang="en-GB" i="1" dirty="0"/>
+              <a:t>FP gurus claim they write side effect free programs</a:t>
+            </a:r>
+            <a:r>
+              <a:rPr lang="en-GB" i="1"/>
+              <a:t>. </a:t>
+            </a:r>
+            <a:endParaRPr lang="en-GB" i="1" smtClean="0"/>
+          </a:p>
+          <a:p>
+            <a:pPr marL="0" lvl="1" indent="0" algn="ctr">
+              <a:buClrTx/>
+              <a:buSzTx/>
+              <a:buNone/>
+            </a:pPr>
+            <a:r>
+              <a:rPr lang="en-GB" i="1" smtClean="0"/>
+              <a:t>How </a:t>
+            </a:r>
+            <a:r>
+              <a:rPr lang="en-GB" i="1" dirty="0"/>
+              <a:t>is that possible? Is it at all? Why would that be desirable?</a:t>
+            </a:r>
+          </a:p>
+          <a:p>
+            <a:endParaRPr lang="en-GB" dirty="0"/>
+          </a:p>
+          <a:p>
             <a:r>
               <a:rPr lang="en-GB" dirty="0" smtClean="0"/>
-              <a:t>Definition</a:t>
-            </a:r>
+              <a:t>Definition: Pure Functions</a:t>
+            </a:r>
+            <a:endParaRPr lang="en-GB" dirty="0" smtClean="0"/>
           </a:p>
           <a:p>
             <a:pPr marL="342900" indent="-342900">
@@ -38008,19 +38124,11 @@
             </a:pPr>
             <a:r>
               <a:rPr lang="en-GB" dirty="0"/>
-              <a:t>An invocation of a pure function can always be replaced with its return value</a:t>
-            </a:r>
-          </a:p>
-          <a:p>
-            <a:endParaRPr lang="en-GB" dirty="0" smtClean="0"/>
-          </a:p>
-          <a:p>
-            <a:pPr lvl="1" indent="0">
-              <a:buNone/>
-            </a:pPr>
+              <a:t>An invocation of a pure function can always be replaced with its return </a:t>
+            </a:r>
             <a:r>
               <a:rPr lang="en-GB" dirty="0" smtClean="0"/>
-              <a:t>FP gurus claim they write side effect free programs. How is that possible? Is it at all? Why would that be desirable?</a:t>
+              <a:t>value</a:t>
             </a:r>
             <a:endParaRPr lang="en-GB" dirty="0"/>
           </a:p>
@@ -38091,7 +38199,7 @@
               <a:rPr lang="de-CH" smtClean="0"/>
               <a:t>Slide </a:t>
             </a:r>
-            <a:fld id="{83E630D2-88C4-41D6-BABC-2DC89992C38A}" type="slidenum">
+            <a:fld id="{7EFF3FA4-C2E0-4C88-81C3-444C62F510B6}" type="slidenum">
               <a:rPr lang="de-CH" smtClean="0"/>
               <a:t>8</a:t>
             </a:fld>
@@ -38270,7 +38378,7 @@
               <a:rPr lang="de-CH" smtClean="0"/>
               <a:t>Slide </a:t>
             </a:r>
-            <a:fld id="{955C38E2-7C2C-4D20-99A4-A215A939CC80}" type="slidenum">
+            <a:fld id="{E3F81DC9-F3B4-4958-90D0-F8852A204782}" type="slidenum">
               <a:rPr lang="de-CH" smtClean="0"/>
               <a:t>9</a:t>
             </a:fld>

</xml_diff>

<commit_message>
change typo in pure function slide
</commit_message>
<xml_diff>
--- a/Functional Design Patterns for OO Practitioners.pptx
+++ b/Functional Design Patterns for OO Practitioners.pptx
@@ -1334,6 +1334,427 @@
       <dsp:cNvGrpSpPr/>
     </dsp:nvGrpSpPr>
     <dsp:grpSpPr/>
+    <dsp:sp modelId="{7159C691-860A-4D9C-AE25-CCDC36A991BF}">
+      <dsp:nvSpPr>
+        <dsp:cNvPr id="0" name=""/>
+        <dsp:cNvSpPr/>
+      </dsp:nvSpPr>
+      <dsp:spPr>
+        <a:xfrm>
+          <a:off x="1995785" y="360043"/>
+          <a:ext cx="2104429" cy="1052214"/>
+        </a:xfrm>
+        <a:prstGeom prst="roundRect">
+          <a:avLst>
+            <a:gd name="adj" fmla="val 10000"/>
+          </a:avLst>
+        </a:prstGeom>
+        <a:solidFill>
+          <a:srgbClr val="00B0F0"/>
+        </a:solidFill>
+        <a:ln>
+          <a:noFill/>
+        </a:ln>
+        <a:effectLst/>
+        <a:sp3d extrusionH="381000" contourW="38100" prstMaterial="matte">
+          <a:contourClr>
+            <a:schemeClr val="lt1"/>
+          </a:contourClr>
+        </a:sp3d>
+      </dsp:spPr>
+      <dsp:style>
+        <a:lnRef idx="0">
+          <a:scrgbClr r="0" g="0" b="0"/>
+        </a:lnRef>
+        <a:fillRef idx="1">
+          <a:scrgbClr r="0" g="0" b="0"/>
+        </a:fillRef>
+        <a:effectRef idx="0">
+          <a:scrgbClr r="0" g="0" b="0"/>
+        </a:effectRef>
+        <a:fontRef idx="minor">
+          <a:schemeClr val="lt1"/>
+        </a:fontRef>
+      </dsp:style>
+      <dsp:txBody>
+        <a:bodyPr spcFirstLastPara="0" vert="horz" wrap="square" lIns="99060" tIns="99060" rIns="99060" bIns="99060" numCol="1" spcCol="1270" anchor="ctr" anchorCtr="0">
+          <a:noAutofit/>
+        </a:bodyPr>
+        <a:lstStyle/>
+        <a:p>
+          <a:pPr lvl="0" algn="ctr" defTabSz="1155700">
+            <a:lnSpc>
+              <a:spcPct val="90000"/>
+            </a:lnSpc>
+            <a:spcBef>
+              <a:spcPct val="0"/>
+            </a:spcBef>
+            <a:spcAft>
+              <a:spcPct val="35000"/>
+            </a:spcAft>
+          </a:pPr>
+          <a:r>
+            <a:rPr lang="en-GB" sz="2600" kern="1200" dirty="0" smtClean="0"/>
+            <a:t>Pure Functions</a:t>
+          </a:r>
+          <a:endParaRPr lang="en-GB" sz="2600" kern="1200" dirty="0"/>
+        </a:p>
+      </dsp:txBody>
+      <dsp:txXfrm>
+        <a:off x="2026603" y="390861"/>
+        <a:ext cx="2042793" cy="990578"/>
+      </dsp:txXfrm>
+    </dsp:sp>
+    <dsp:sp modelId="{BF744900-CDE5-4D5A-9709-AFA782F2725C}">
+      <dsp:nvSpPr>
+        <dsp:cNvPr id="0" name=""/>
+        <dsp:cNvSpPr/>
+      </dsp:nvSpPr>
+      <dsp:spPr>
+        <a:xfrm rot="3181267">
+          <a:off x="3351629" y="2027277"/>
+          <a:ext cx="1388526" cy="368275"/>
+        </a:xfrm>
+        <a:prstGeom prst="leftRightArrow">
+          <a:avLst>
+            <a:gd name="adj1" fmla="val 60000"/>
+            <a:gd name="adj2" fmla="val 50000"/>
+          </a:avLst>
+        </a:prstGeom>
+        <a:solidFill>
+          <a:srgbClr val="00B0F0"/>
+        </a:solidFill>
+        <a:ln>
+          <a:noFill/>
+        </a:ln>
+        <a:effectLst/>
+        <a:sp3d z="-52400" extrusionH="181000" contourW="38100" prstMaterial="matte">
+          <a:contourClr>
+            <a:schemeClr val="lt1"/>
+          </a:contourClr>
+        </a:sp3d>
+      </dsp:spPr>
+      <dsp:style>
+        <a:lnRef idx="0">
+          <a:scrgbClr r="0" g="0" b="0"/>
+        </a:lnRef>
+        <a:fillRef idx="1">
+          <a:scrgbClr r="0" g="0" b="0"/>
+        </a:fillRef>
+        <a:effectRef idx="0">
+          <a:scrgbClr r="0" g="0" b="0"/>
+        </a:effectRef>
+        <a:fontRef idx="minor">
+          <a:schemeClr val="lt1"/>
+        </a:fontRef>
+      </dsp:style>
+      <dsp:txBody>
+        <a:bodyPr spcFirstLastPara="0" vert="horz" wrap="square" lIns="0" tIns="0" rIns="0" bIns="0" numCol="1" spcCol="1270" anchor="ctr" anchorCtr="0">
+          <a:noAutofit/>
+        </a:bodyPr>
+        <a:lstStyle/>
+        <a:p>
+          <a:pPr lvl="0" algn="ctr" defTabSz="666750">
+            <a:lnSpc>
+              <a:spcPct val="90000"/>
+            </a:lnSpc>
+            <a:spcBef>
+              <a:spcPct val="0"/>
+            </a:spcBef>
+            <a:spcAft>
+              <a:spcPct val="35000"/>
+            </a:spcAft>
+          </a:pPr>
+          <a:endParaRPr lang="en-GB" sz="1500" kern="1200"/>
+        </a:p>
+      </dsp:txBody>
+      <dsp:txXfrm>
+        <a:off x="3462112" y="2100932"/>
+        <a:ext cx="1167561" cy="220965"/>
+      </dsp:txXfrm>
+    </dsp:sp>
+    <dsp:sp modelId="{7698213F-A1D5-44DE-B22F-355281BB4C2C}">
+      <dsp:nvSpPr>
+        <dsp:cNvPr id="0" name=""/>
+        <dsp:cNvSpPr/>
+      </dsp:nvSpPr>
+      <dsp:spPr>
+        <a:xfrm>
+          <a:off x="3991570" y="3010572"/>
+          <a:ext cx="2104429" cy="1052214"/>
+        </a:xfrm>
+        <a:prstGeom prst="roundRect">
+          <a:avLst>
+            <a:gd name="adj" fmla="val 10000"/>
+          </a:avLst>
+        </a:prstGeom>
+        <a:solidFill>
+          <a:srgbClr val="00B050"/>
+        </a:solidFill>
+        <a:ln>
+          <a:noFill/>
+        </a:ln>
+        <a:effectLst/>
+        <a:sp3d extrusionH="381000" contourW="38100" prstMaterial="matte">
+          <a:contourClr>
+            <a:schemeClr val="lt1"/>
+          </a:contourClr>
+        </a:sp3d>
+      </dsp:spPr>
+      <dsp:style>
+        <a:lnRef idx="0">
+          <a:scrgbClr r="0" g="0" b="0"/>
+        </a:lnRef>
+        <a:fillRef idx="1">
+          <a:scrgbClr r="0" g="0" b="0"/>
+        </a:fillRef>
+        <a:effectRef idx="0">
+          <a:scrgbClr r="0" g="0" b="0"/>
+        </a:effectRef>
+        <a:fontRef idx="minor">
+          <a:schemeClr val="lt1"/>
+        </a:fontRef>
+      </dsp:style>
+      <dsp:txBody>
+        <a:bodyPr spcFirstLastPara="0" vert="horz" wrap="square" lIns="99060" tIns="99060" rIns="99060" bIns="99060" numCol="1" spcCol="1270" anchor="ctr" anchorCtr="0">
+          <a:noAutofit/>
+        </a:bodyPr>
+        <a:lstStyle/>
+        <a:p>
+          <a:pPr lvl="0" algn="ctr" defTabSz="1155700">
+            <a:lnSpc>
+              <a:spcPct val="90000"/>
+            </a:lnSpc>
+            <a:spcBef>
+              <a:spcPct val="0"/>
+            </a:spcBef>
+            <a:spcAft>
+              <a:spcPct val="35000"/>
+            </a:spcAft>
+          </a:pPr>
+          <a:r>
+            <a:rPr lang="en-GB" sz="2600" kern="1200" dirty="0" smtClean="0"/>
+            <a:t>Immutability</a:t>
+          </a:r>
+          <a:endParaRPr lang="en-GB" sz="2600" kern="1200" dirty="0"/>
+        </a:p>
+      </dsp:txBody>
+      <dsp:txXfrm>
+        <a:off x="4022388" y="3041390"/>
+        <a:ext cx="2042793" cy="990578"/>
+      </dsp:txXfrm>
+    </dsp:sp>
+    <dsp:sp modelId="{0DD0BB7F-6B11-4693-AA9C-D4A2168B2D4B}">
+      <dsp:nvSpPr>
+        <dsp:cNvPr id="0" name=""/>
+        <dsp:cNvSpPr/>
+      </dsp:nvSpPr>
+      <dsp:spPr>
+        <a:xfrm rot="10799984">
+          <a:off x="2429477" y="3352550"/>
+          <a:ext cx="1388526" cy="368275"/>
+        </a:xfrm>
+        <a:prstGeom prst="leftRightArrow">
+          <a:avLst>
+            <a:gd name="adj1" fmla="val 60000"/>
+            <a:gd name="adj2" fmla="val 50000"/>
+          </a:avLst>
+        </a:prstGeom>
+        <a:solidFill>
+          <a:srgbClr val="00B050"/>
+        </a:solidFill>
+        <a:ln>
+          <a:noFill/>
+        </a:ln>
+        <a:effectLst/>
+        <a:sp3d z="-52400" extrusionH="181000" contourW="38100" prstMaterial="matte">
+          <a:contourClr>
+            <a:schemeClr val="lt1"/>
+          </a:contourClr>
+        </a:sp3d>
+      </dsp:spPr>
+      <dsp:style>
+        <a:lnRef idx="0">
+          <a:scrgbClr r="0" g="0" b="0"/>
+        </a:lnRef>
+        <a:fillRef idx="1">
+          <a:scrgbClr r="0" g="0" b="0"/>
+        </a:fillRef>
+        <a:effectRef idx="0">
+          <a:scrgbClr r="0" g="0" b="0"/>
+        </a:effectRef>
+        <a:fontRef idx="minor">
+          <a:schemeClr val="lt1"/>
+        </a:fontRef>
+      </dsp:style>
+      <dsp:txBody>
+        <a:bodyPr spcFirstLastPara="0" vert="horz" wrap="square" lIns="0" tIns="0" rIns="0" bIns="0" numCol="1" spcCol="1270" anchor="ctr" anchorCtr="0">
+          <a:noAutofit/>
+        </a:bodyPr>
+        <a:lstStyle/>
+        <a:p>
+          <a:pPr lvl="0" algn="ctr" defTabSz="666750">
+            <a:lnSpc>
+              <a:spcPct val="90000"/>
+            </a:lnSpc>
+            <a:spcBef>
+              <a:spcPct val="0"/>
+            </a:spcBef>
+            <a:spcAft>
+              <a:spcPct val="35000"/>
+            </a:spcAft>
+          </a:pPr>
+          <a:endParaRPr lang="en-GB" sz="1500" kern="1200"/>
+        </a:p>
+      </dsp:txBody>
+      <dsp:txXfrm rot="10800000">
+        <a:off x="2539959" y="3426205"/>
+        <a:ext cx="1167561" cy="220965"/>
+      </dsp:txXfrm>
+    </dsp:sp>
+    <dsp:sp modelId="{630B207D-9744-4681-AF68-329F4D5D414A}">
+      <dsp:nvSpPr>
+        <dsp:cNvPr id="0" name=""/>
+        <dsp:cNvSpPr/>
+      </dsp:nvSpPr>
+      <dsp:spPr>
+        <a:xfrm>
+          <a:off x="151481" y="3010589"/>
+          <a:ext cx="2104429" cy="1052214"/>
+        </a:xfrm>
+        <a:prstGeom prst="roundRect">
+          <a:avLst>
+            <a:gd name="adj" fmla="val 10000"/>
+          </a:avLst>
+        </a:prstGeom>
+        <a:solidFill>
+          <a:schemeClr val="accent6">
+            <a:lumMod val="75000"/>
+          </a:schemeClr>
+        </a:solidFill>
+        <a:ln>
+          <a:noFill/>
+        </a:ln>
+        <a:effectLst/>
+        <a:sp3d extrusionH="381000" contourW="38100" prstMaterial="matte">
+          <a:contourClr>
+            <a:schemeClr val="lt1"/>
+          </a:contourClr>
+        </a:sp3d>
+      </dsp:spPr>
+      <dsp:style>
+        <a:lnRef idx="0">
+          <a:scrgbClr r="0" g="0" b="0"/>
+        </a:lnRef>
+        <a:fillRef idx="1">
+          <a:scrgbClr r="0" g="0" b="0"/>
+        </a:fillRef>
+        <a:effectRef idx="0">
+          <a:scrgbClr r="0" g="0" b="0"/>
+        </a:effectRef>
+        <a:fontRef idx="minor">
+          <a:schemeClr val="lt1"/>
+        </a:fontRef>
+      </dsp:style>
+      <dsp:txBody>
+        <a:bodyPr spcFirstLastPara="0" vert="horz" wrap="square" lIns="99060" tIns="99060" rIns="99060" bIns="99060" numCol="1" spcCol="1270" anchor="ctr" anchorCtr="0">
+          <a:noAutofit/>
+        </a:bodyPr>
+        <a:lstStyle/>
+        <a:p>
+          <a:pPr lvl="0" algn="ctr" defTabSz="1155700">
+            <a:lnSpc>
+              <a:spcPct val="90000"/>
+            </a:lnSpc>
+            <a:spcBef>
+              <a:spcPct val="0"/>
+            </a:spcBef>
+            <a:spcAft>
+              <a:spcPct val="35000"/>
+            </a:spcAft>
+          </a:pPr>
+          <a:r>
+            <a:rPr lang="en-GB" sz="2600" kern="1200" dirty="0" smtClean="0"/>
+            <a:t>Higher-Order Functions</a:t>
+          </a:r>
+          <a:endParaRPr lang="en-GB" sz="2600" kern="1200" dirty="0"/>
+        </a:p>
+      </dsp:txBody>
+      <dsp:txXfrm>
+        <a:off x="182299" y="3041407"/>
+        <a:ext cx="2042793" cy="990578"/>
+      </dsp:txXfrm>
+    </dsp:sp>
+    <dsp:sp modelId="{394D58C0-A685-4129-AA54-53CBE01AB18B}">
+      <dsp:nvSpPr>
+        <dsp:cNvPr id="0" name=""/>
+        <dsp:cNvSpPr/>
+      </dsp:nvSpPr>
+      <dsp:spPr>
+        <a:xfrm rot="18289858">
+          <a:off x="1431584" y="2027286"/>
+          <a:ext cx="1388526" cy="368275"/>
+        </a:xfrm>
+        <a:prstGeom prst="leftRightArrow">
+          <a:avLst>
+            <a:gd name="adj1" fmla="val 60000"/>
+            <a:gd name="adj2" fmla="val 50000"/>
+          </a:avLst>
+        </a:prstGeom>
+        <a:solidFill>
+          <a:schemeClr val="accent6">
+            <a:lumMod val="75000"/>
+          </a:schemeClr>
+        </a:solidFill>
+        <a:ln>
+          <a:noFill/>
+        </a:ln>
+        <a:effectLst/>
+        <a:sp3d z="-52400" extrusionH="181000" contourW="38100" prstMaterial="matte">
+          <a:contourClr>
+            <a:schemeClr val="lt1"/>
+          </a:contourClr>
+        </a:sp3d>
+      </dsp:spPr>
+      <dsp:style>
+        <a:lnRef idx="0">
+          <a:scrgbClr r="0" g="0" b="0"/>
+        </a:lnRef>
+        <a:fillRef idx="1">
+          <a:scrgbClr r="0" g="0" b="0"/>
+        </a:fillRef>
+        <a:effectRef idx="0">
+          <a:scrgbClr r="0" g="0" b="0"/>
+        </a:effectRef>
+        <a:fontRef idx="minor">
+          <a:schemeClr val="lt1"/>
+        </a:fontRef>
+      </dsp:style>
+      <dsp:txBody>
+        <a:bodyPr spcFirstLastPara="0" vert="horz" wrap="square" lIns="0" tIns="0" rIns="0" bIns="0" numCol="1" spcCol="1270" anchor="ctr" anchorCtr="0">
+          <a:noAutofit/>
+        </a:bodyPr>
+        <a:lstStyle/>
+        <a:p>
+          <a:pPr lvl="0" algn="ctr" defTabSz="666750">
+            <a:lnSpc>
+              <a:spcPct val="90000"/>
+            </a:lnSpc>
+            <a:spcBef>
+              <a:spcPct val="0"/>
+            </a:spcBef>
+            <a:spcAft>
+              <a:spcPct val="35000"/>
+            </a:spcAft>
+          </a:pPr>
+          <a:endParaRPr lang="en-GB" sz="1500" kern="1200"/>
+        </a:p>
+      </dsp:txBody>
+      <dsp:txXfrm>
+        <a:off x="1542067" y="2100941"/>
+        <a:ext cx="1167561" cy="220965"/>
+      </dsp:txXfrm>
+    </dsp:sp>
   </dsp:spTree>
 </dsp:drawing>
 </file>
@@ -38043,14 +38464,18 @@
               <a:buNone/>
             </a:pPr>
             <a:r>
+              <a:rPr lang="en-GB" i="1"/>
+              <a:t>FP </a:t>
+            </a:r>
+            <a:r>
+              <a:rPr lang="en-GB" i="1" smtClean="0"/>
+              <a:t>practitioners claim </a:t>
+            </a:r>
+            <a:r>
               <a:rPr lang="en-GB" i="1" dirty="0"/>
-              <a:t>FP gurus claim they write side effect free programs</a:t>
-            </a:r>
-            <a:r>
-              <a:rPr lang="en-GB" i="1"/>
-              <a:t>. </a:t>
-            </a:r>
-            <a:endParaRPr lang="en-GB" i="1" smtClean="0"/>
+              <a:t>they write side effect free programs. </a:t>
+            </a:r>
+            <a:endParaRPr lang="en-GB" i="1" dirty="0" smtClean="0"/>
           </a:p>
           <a:p>
             <a:pPr marL="0" lvl="1" indent="0" algn="ctr">
@@ -38059,7 +38484,7 @@
               <a:buNone/>
             </a:pPr>
             <a:r>
-              <a:rPr lang="en-GB" i="1" smtClean="0"/>
+              <a:rPr lang="en-GB" i="1" dirty="0" smtClean="0"/>
               <a:t>How </a:t>
             </a:r>
             <a:r>

</xml_diff>

<commit_message>
typo and image in title slide
</commit_message>
<xml_diff>
--- a/Functional Design Patterns for OO Practitioners.pptx
+++ b/Functional Design Patterns for OO Practitioners.pptx
@@ -1334,427 +1334,6 @@
       <dsp:cNvGrpSpPr/>
     </dsp:nvGrpSpPr>
     <dsp:grpSpPr/>
-    <dsp:sp modelId="{7159C691-860A-4D9C-AE25-CCDC36A991BF}">
-      <dsp:nvSpPr>
-        <dsp:cNvPr id="0" name=""/>
-        <dsp:cNvSpPr/>
-      </dsp:nvSpPr>
-      <dsp:spPr>
-        <a:xfrm>
-          <a:off x="1995785" y="360043"/>
-          <a:ext cx="2104429" cy="1052214"/>
-        </a:xfrm>
-        <a:prstGeom prst="roundRect">
-          <a:avLst>
-            <a:gd name="adj" fmla="val 10000"/>
-          </a:avLst>
-        </a:prstGeom>
-        <a:solidFill>
-          <a:srgbClr val="00B0F0"/>
-        </a:solidFill>
-        <a:ln>
-          <a:noFill/>
-        </a:ln>
-        <a:effectLst/>
-        <a:sp3d extrusionH="381000" contourW="38100" prstMaterial="matte">
-          <a:contourClr>
-            <a:schemeClr val="lt1"/>
-          </a:contourClr>
-        </a:sp3d>
-      </dsp:spPr>
-      <dsp:style>
-        <a:lnRef idx="0">
-          <a:scrgbClr r="0" g="0" b="0"/>
-        </a:lnRef>
-        <a:fillRef idx="1">
-          <a:scrgbClr r="0" g="0" b="0"/>
-        </a:fillRef>
-        <a:effectRef idx="0">
-          <a:scrgbClr r="0" g="0" b="0"/>
-        </a:effectRef>
-        <a:fontRef idx="minor">
-          <a:schemeClr val="lt1"/>
-        </a:fontRef>
-      </dsp:style>
-      <dsp:txBody>
-        <a:bodyPr spcFirstLastPara="0" vert="horz" wrap="square" lIns="99060" tIns="99060" rIns="99060" bIns="99060" numCol="1" spcCol="1270" anchor="ctr" anchorCtr="0">
-          <a:noAutofit/>
-        </a:bodyPr>
-        <a:lstStyle/>
-        <a:p>
-          <a:pPr lvl="0" algn="ctr" defTabSz="1155700">
-            <a:lnSpc>
-              <a:spcPct val="90000"/>
-            </a:lnSpc>
-            <a:spcBef>
-              <a:spcPct val="0"/>
-            </a:spcBef>
-            <a:spcAft>
-              <a:spcPct val="35000"/>
-            </a:spcAft>
-          </a:pPr>
-          <a:r>
-            <a:rPr lang="en-GB" sz="2600" kern="1200" dirty="0" smtClean="0"/>
-            <a:t>Pure Functions</a:t>
-          </a:r>
-          <a:endParaRPr lang="en-GB" sz="2600" kern="1200" dirty="0"/>
-        </a:p>
-      </dsp:txBody>
-      <dsp:txXfrm>
-        <a:off x="2026603" y="390861"/>
-        <a:ext cx="2042793" cy="990578"/>
-      </dsp:txXfrm>
-    </dsp:sp>
-    <dsp:sp modelId="{BF744900-CDE5-4D5A-9709-AFA782F2725C}">
-      <dsp:nvSpPr>
-        <dsp:cNvPr id="0" name=""/>
-        <dsp:cNvSpPr/>
-      </dsp:nvSpPr>
-      <dsp:spPr>
-        <a:xfrm rot="3181267">
-          <a:off x="3351629" y="2027277"/>
-          <a:ext cx="1388526" cy="368275"/>
-        </a:xfrm>
-        <a:prstGeom prst="leftRightArrow">
-          <a:avLst>
-            <a:gd name="adj1" fmla="val 60000"/>
-            <a:gd name="adj2" fmla="val 50000"/>
-          </a:avLst>
-        </a:prstGeom>
-        <a:solidFill>
-          <a:srgbClr val="00B0F0"/>
-        </a:solidFill>
-        <a:ln>
-          <a:noFill/>
-        </a:ln>
-        <a:effectLst/>
-        <a:sp3d z="-52400" extrusionH="181000" contourW="38100" prstMaterial="matte">
-          <a:contourClr>
-            <a:schemeClr val="lt1"/>
-          </a:contourClr>
-        </a:sp3d>
-      </dsp:spPr>
-      <dsp:style>
-        <a:lnRef idx="0">
-          <a:scrgbClr r="0" g="0" b="0"/>
-        </a:lnRef>
-        <a:fillRef idx="1">
-          <a:scrgbClr r="0" g="0" b="0"/>
-        </a:fillRef>
-        <a:effectRef idx="0">
-          <a:scrgbClr r="0" g="0" b="0"/>
-        </a:effectRef>
-        <a:fontRef idx="minor">
-          <a:schemeClr val="lt1"/>
-        </a:fontRef>
-      </dsp:style>
-      <dsp:txBody>
-        <a:bodyPr spcFirstLastPara="0" vert="horz" wrap="square" lIns="0" tIns="0" rIns="0" bIns="0" numCol="1" spcCol="1270" anchor="ctr" anchorCtr="0">
-          <a:noAutofit/>
-        </a:bodyPr>
-        <a:lstStyle/>
-        <a:p>
-          <a:pPr lvl="0" algn="ctr" defTabSz="666750">
-            <a:lnSpc>
-              <a:spcPct val="90000"/>
-            </a:lnSpc>
-            <a:spcBef>
-              <a:spcPct val="0"/>
-            </a:spcBef>
-            <a:spcAft>
-              <a:spcPct val="35000"/>
-            </a:spcAft>
-          </a:pPr>
-          <a:endParaRPr lang="en-GB" sz="1500" kern="1200"/>
-        </a:p>
-      </dsp:txBody>
-      <dsp:txXfrm>
-        <a:off x="3462112" y="2100932"/>
-        <a:ext cx="1167561" cy="220965"/>
-      </dsp:txXfrm>
-    </dsp:sp>
-    <dsp:sp modelId="{7698213F-A1D5-44DE-B22F-355281BB4C2C}">
-      <dsp:nvSpPr>
-        <dsp:cNvPr id="0" name=""/>
-        <dsp:cNvSpPr/>
-      </dsp:nvSpPr>
-      <dsp:spPr>
-        <a:xfrm>
-          <a:off x="3991570" y="3010572"/>
-          <a:ext cx="2104429" cy="1052214"/>
-        </a:xfrm>
-        <a:prstGeom prst="roundRect">
-          <a:avLst>
-            <a:gd name="adj" fmla="val 10000"/>
-          </a:avLst>
-        </a:prstGeom>
-        <a:solidFill>
-          <a:srgbClr val="00B050"/>
-        </a:solidFill>
-        <a:ln>
-          <a:noFill/>
-        </a:ln>
-        <a:effectLst/>
-        <a:sp3d extrusionH="381000" contourW="38100" prstMaterial="matte">
-          <a:contourClr>
-            <a:schemeClr val="lt1"/>
-          </a:contourClr>
-        </a:sp3d>
-      </dsp:spPr>
-      <dsp:style>
-        <a:lnRef idx="0">
-          <a:scrgbClr r="0" g="0" b="0"/>
-        </a:lnRef>
-        <a:fillRef idx="1">
-          <a:scrgbClr r="0" g="0" b="0"/>
-        </a:fillRef>
-        <a:effectRef idx="0">
-          <a:scrgbClr r="0" g="0" b="0"/>
-        </a:effectRef>
-        <a:fontRef idx="minor">
-          <a:schemeClr val="lt1"/>
-        </a:fontRef>
-      </dsp:style>
-      <dsp:txBody>
-        <a:bodyPr spcFirstLastPara="0" vert="horz" wrap="square" lIns="99060" tIns="99060" rIns="99060" bIns="99060" numCol="1" spcCol="1270" anchor="ctr" anchorCtr="0">
-          <a:noAutofit/>
-        </a:bodyPr>
-        <a:lstStyle/>
-        <a:p>
-          <a:pPr lvl="0" algn="ctr" defTabSz="1155700">
-            <a:lnSpc>
-              <a:spcPct val="90000"/>
-            </a:lnSpc>
-            <a:spcBef>
-              <a:spcPct val="0"/>
-            </a:spcBef>
-            <a:spcAft>
-              <a:spcPct val="35000"/>
-            </a:spcAft>
-          </a:pPr>
-          <a:r>
-            <a:rPr lang="en-GB" sz="2600" kern="1200" dirty="0" smtClean="0"/>
-            <a:t>Immutability</a:t>
-          </a:r>
-          <a:endParaRPr lang="en-GB" sz="2600" kern="1200" dirty="0"/>
-        </a:p>
-      </dsp:txBody>
-      <dsp:txXfrm>
-        <a:off x="4022388" y="3041390"/>
-        <a:ext cx="2042793" cy="990578"/>
-      </dsp:txXfrm>
-    </dsp:sp>
-    <dsp:sp modelId="{0DD0BB7F-6B11-4693-AA9C-D4A2168B2D4B}">
-      <dsp:nvSpPr>
-        <dsp:cNvPr id="0" name=""/>
-        <dsp:cNvSpPr/>
-      </dsp:nvSpPr>
-      <dsp:spPr>
-        <a:xfrm rot="10799984">
-          <a:off x="2429477" y="3352550"/>
-          <a:ext cx="1388526" cy="368275"/>
-        </a:xfrm>
-        <a:prstGeom prst="leftRightArrow">
-          <a:avLst>
-            <a:gd name="adj1" fmla="val 60000"/>
-            <a:gd name="adj2" fmla="val 50000"/>
-          </a:avLst>
-        </a:prstGeom>
-        <a:solidFill>
-          <a:srgbClr val="00B050"/>
-        </a:solidFill>
-        <a:ln>
-          <a:noFill/>
-        </a:ln>
-        <a:effectLst/>
-        <a:sp3d z="-52400" extrusionH="181000" contourW="38100" prstMaterial="matte">
-          <a:contourClr>
-            <a:schemeClr val="lt1"/>
-          </a:contourClr>
-        </a:sp3d>
-      </dsp:spPr>
-      <dsp:style>
-        <a:lnRef idx="0">
-          <a:scrgbClr r="0" g="0" b="0"/>
-        </a:lnRef>
-        <a:fillRef idx="1">
-          <a:scrgbClr r="0" g="0" b="0"/>
-        </a:fillRef>
-        <a:effectRef idx="0">
-          <a:scrgbClr r="0" g="0" b="0"/>
-        </a:effectRef>
-        <a:fontRef idx="minor">
-          <a:schemeClr val="lt1"/>
-        </a:fontRef>
-      </dsp:style>
-      <dsp:txBody>
-        <a:bodyPr spcFirstLastPara="0" vert="horz" wrap="square" lIns="0" tIns="0" rIns="0" bIns="0" numCol="1" spcCol="1270" anchor="ctr" anchorCtr="0">
-          <a:noAutofit/>
-        </a:bodyPr>
-        <a:lstStyle/>
-        <a:p>
-          <a:pPr lvl="0" algn="ctr" defTabSz="666750">
-            <a:lnSpc>
-              <a:spcPct val="90000"/>
-            </a:lnSpc>
-            <a:spcBef>
-              <a:spcPct val="0"/>
-            </a:spcBef>
-            <a:spcAft>
-              <a:spcPct val="35000"/>
-            </a:spcAft>
-          </a:pPr>
-          <a:endParaRPr lang="en-GB" sz="1500" kern="1200"/>
-        </a:p>
-      </dsp:txBody>
-      <dsp:txXfrm rot="10800000">
-        <a:off x="2539959" y="3426205"/>
-        <a:ext cx="1167561" cy="220965"/>
-      </dsp:txXfrm>
-    </dsp:sp>
-    <dsp:sp modelId="{630B207D-9744-4681-AF68-329F4D5D414A}">
-      <dsp:nvSpPr>
-        <dsp:cNvPr id="0" name=""/>
-        <dsp:cNvSpPr/>
-      </dsp:nvSpPr>
-      <dsp:spPr>
-        <a:xfrm>
-          <a:off x="151481" y="3010589"/>
-          <a:ext cx="2104429" cy="1052214"/>
-        </a:xfrm>
-        <a:prstGeom prst="roundRect">
-          <a:avLst>
-            <a:gd name="adj" fmla="val 10000"/>
-          </a:avLst>
-        </a:prstGeom>
-        <a:solidFill>
-          <a:schemeClr val="accent6">
-            <a:lumMod val="75000"/>
-          </a:schemeClr>
-        </a:solidFill>
-        <a:ln>
-          <a:noFill/>
-        </a:ln>
-        <a:effectLst/>
-        <a:sp3d extrusionH="381000" contourW="38100" prstMaterial="matte">
-          <a:contourClr>
-            <a:schemeClr val="lt1"/>
-          </a:contourClr>
-        </a:sp3d>
-      </dsp:spPr>
-      <dsp:style>
-        <a:lnRef idx="0">
-          <a:scrgbClr r="0" g="0" b="0"/>
-        </a:lnRef>
-        <a:fillRef idx="1">
-          <a:scrgbClr r="0" g="0" b="0"/>
-        </a:fillRef>
-        <a:effectRef idx="0">
-          <a:scrgbClr r="0" g="0" b="0"/>
-        </a:effectRef>
-        <a:fontRef idx="minor">
-          <a:schemeClr val="lt1"/>
-        </a:fontRef>
-      </dsp:style>
-      <dsp:txBody>
-        <a:bodyPr spcFirstLastPara="0" vert="horz" wrap="square" lIns="99060" tIns="99060" rIns="99060" bIns="99060" numCol="1" spcCol="1270" anchor="ctr" anchorCtr="0">
-          <a:noAutofit/>
-        </a:bodyPr>
-        <a:lstStyle/>
-        <a:p>
-          <a:pPr lvl="0" algn="ctr" defTabSz="1155700">
-            <a:lnSpc>
-              <a:spcPct val="90000"/>
-            </a:lnSpc>
-            <a:spcBef>
-              <a:spcPct val="0"/>
-            </a:spcBef>
-            <a:spcAft>
-              <a:spcPct val="35000"/>
-            </a:spcAft>
-          </a:pPr>
-          <a:r>
-            <a:rPr lang="en-GB" sz="2600" kern="1200" dirty="0" smtClean="0"/>
-            <a:t>Higher-Order Functions</a:t>
-          </a:r>
-          <a:endParaRPr lang="en-GB" sz="2600" kern="1200" dirty="0"/>
-        </a:p>
-      </dsp:txBody>
-      <dsp:txXfrm>
-        <a:off x="182299" y="3041407"/>
-        <a:ext cx="2042793" cy="990578"/>
-      </dsp:txXfrm>
-    </dsp:sp>
-    <dsp:sp modelId="{394D58C0-A685-4129-AA54-53CBE01AB18B}">
-      <dsp:nvSpPr>
-        <dsp:cNvPr id="0" name=""/>
-        <dsp:cNvSpPr/>
-      </dsp:nvSpPr>
-      <dsp:spPr>
-        <a:xfrm rot="18289858">
-          <a:off x="1431584" y="2027286"/>
-          <a:ext cx="1388526" cy="368275"/>
-        </a:xfrm>
-        <a:prstGeom prst="leftRightArrow">
-          <a:avLst>
-            <a:gd name="adj1" fmla="val 60000"/>
-            <a:gd name="adj2" fmla="val 50000"/>
-          </a:avLst>
-        </a:prstGeom>
-        <a:solidFill>
-          <a:schemeClr val="accent6">
-            <a:lumMod val="75000"/>
-          </a:schemeClr>
-        </a:solidFill>
-        <a:ln>
-          <a:noFill/>
-        </a:ln>
-        <a:effectLst/>
-        <a:sp3d z="-52400" extrusionH="181000" contourW="38100" prstMaterial="matte">
-          <a:contourClr>
-            <a:schemeClr val="lt1"/>
-          </a:contourClr>
-        </a:sp3d>
-      </dsp:spPr>
-      <dsp:style>
-        <a:lnRef idx="0">
-          <a:scrgbClr r="0" g="0" b="0"/>
-        </a:lnRef>
-        <a:fillRef idx="1">
-          <a:scrgbClr r="0" g="0" b="0"/>
-        </a:fillRef>
-        <a:effectRef idx="0">
-          <a:scrgbClr r="0" g="0" b="0"/>
-        </a:effectRef>
-        <a:fontRef idx="minor">
-          <a:schemeClr val="lt1"/>
-        </a:fontRef>
-      </dsp:style>
-      <dsp:txBody>
-        <a:bodyPr spcFirstLastPara="0" vert="horz" wrap="square" lIns="0" tIns="0" rIns="0" bIns="0" numCol="1" spcCol="1270" anchor="ctr" anchorCtr="0">
-          <a:noAutofit/>
-        </a:bodyPr>
-        <a:lstStyle/>
-        <a:p>
-          <a:pPr lvl="0" algn="ctr" defTabSz="666750">
-            <a:lnSpc>
-              <a:spcPct val="90000"/>
-            </a:lnSpc>
-            <a:spcBef>
-              <a:spcPct val="0"/>
-            </a:spcBef>
-            <a:spcAft>
-              <a:spcPct val="35000"/>
-            </a:spcAft>
-          </a:pPr>
-          <a:endParaRPr lang="en-GB" sz="1500" kern="1200"/>
-        </a:p>
-      </dsp:txBody>
-      <dsp:txXfrm>
-        <a:off x="1542067" y="2100941"/>
-        <a:ext cx="1167561" cy="220965"/>
-      </dsp:txXfrm>
-    </dsp:sp>
   </dsp:spTree>
 </dsp:drawing>
 </file>
@@ -4018,7 +3597,7 @@
               <a:rPr lang="de-CH" smtClean="0"/>
               <a:t>Slide </a:t>
             </a:r>
-            <a:fld id="{21C1F861-4106-498D-B09C-D989E46852BB}" type="slidenum">
+            <a:fld id="{9D5E83EC-ED38-43AA-A543-3FF0C9D90BF3}" type="slidenum">
               <a:rPr smtClean="0"/>
               <a:pPr/>
               <a:t>‹#›</a:t>
@@ -4342,7 +3921,7 @@
               <a:rPr lang="de-CH" smtClean="0"/>
               <a:t>Slide </a:t>
             </a:r>
-            <a:fld id="{BA15F283-B3D2-4E17-A870-FBBCFBF1FD54}" type="slidenum">
+            <a:fld id="{3036F423-4AB9-431F-90CF-ABC5D1DF246C}" type="slidenum">
               <a:rPr smtClean="0"/>
               <a:pPr/>
               <a:t>‹#›</a:t>
@@ -4644,7 +4223,7 @@
               <a:rPr lang="de-CH" smtClean="0"/>
               <a:t>Slide </a:t>
             </a:r>
-            <a:fld id="{FE71C13A-9C70-46A9-9200-A1D9D36AA43A}" type="slidenum">
+            <a:fld id="{F72039CF-B119-43BC-A452-FC33E968047D}" type="slidenum">
               <a:rPr smtClean="0"/>
               <a:pPr/>
               <a:t>‹#›</a:t>
@@ -4976,7 +4555,7 @@
               <a:rPr lang="de-CH" smtClean="0"/>
               <a:t>Slide </a:t>
             </a:r>
-            <a:fld id="{D40EE6C1-7006-4E05-A624-2DCABA005D74}" type="slidenum">
+            <a:fld id="{806909EE-C883-4462-89F4-B42A312CA82A}" type="slidenum">
               <a:rPr smtClean="0"/>
               <a:pPr/>
               <a:t>‹#›</a:t>
@@ -5310,7 +4889,7 @@
               <a:rPr lang="de-CH" smtClean="0"/>
               <a:t>Slide </a:t>
             </a:r>
-            <a:fld id="{1AC1C831-782F-4480-A610-416A3ED42F01}" type="slidenum">
+            <a:fld id="{91FBC49D-B19B-462D-848E-2739AD9A6E61}" type="slidenum">
               <a:rPr smtClean="0"/>
               <a:pPr/>
               <a:t>‹#›</a:t>
@@ -5740,7 +5319,7 @@
               <a:rPr lang="de-CH" smtClean="0"/>
               <a:t>Slide </a:t>
             </a:r>
-            <a:fld id="{7ADA5D3E-5B96-4EE3-9516-424DD7382A1F}" type="slidenum">
+            <a:fld id="{E1ECF37E-3035-4E3F-927E-59BAB6C0754B}" type="slidenum">
               <a:rPr smtClean="0"/>
               <a:pPr/>
               <a:t>‹#›</a:t>
@@ -6458,7 +6037,7 @@
               <a:rPr lang="de-CH" smtClean="0"/>
               <a:t>Slide </a:t>
             </a:r>
-            <a:fld id="{A462019B-00D7-4A05-B9CC-D2DB6C29D057}" type="slidenum">
+            <a:fld id="{C84EAA4D-FC30-4814-BE80-0F489C69CA36}" type="slidenum">
               <a:rPr smtClean="0"/>
               <a:pPr/>
               <a:t>‹#›</a:t>
@@ -6764,7 +6343,7 @@
               <a:rPr lang="de-CH" smtClean="0"/>
               <a:t>Slide </a:t>
             </a:r>
-            <a:fld id="{FAB99FF4-8BD2-4219-BF19-B3BD0DF5325C}" type="slidenum">
+            <a:fld id="{3D39D2F5-B66D-46E5-81AC-01F8C52B1714}" type="slidenum">
               <a:rPr smtClean="0"/>
               <a:pPr/>
               <a:t>‹#›</a:t>
@@ -7291,7 +6870,7 @@
               <a:rPr lang="de-CH" smtClean="0"/>
               <a:t>Slide </a:t>
             </a:r>
-            <a:fld id="{BC5F90F5-F21D-4813-BF02-1130DABA1EBA}" type="slidenum">
+            <a:fld id="{657CF2A3-3781-4FAA-89BB-B4B79B5D57DA}" type="slidenum">
               <a:rPr smtClean="0"/>
               <a:pPr/>
               <a:t>‹#›</a:t>
@@ -7689,7 +7268,7 @@
               <a:rPr lang="de-CH" smtClean="0"/>
               <a:t>Slide </a:t>
             </a:r>
-            <a:fld id="{61BF4F47-FDF4-4095-A8CF-8AD23F12302B}" type="slidenum">
+            <a:fld id="{9F477143-B336-40B6-B7D4-CECBCD9B939D}" type="slidenum">
               <a:rPr smtClean="0"/>
               <a:pPr/>
               <a:t>‹#›</a:t>
@@ -7919,7 +7498,7 @@
               <a:rPr lang="de-CH" smtClean="0"/>
               <a:t>Slide </a:t>
             </a:r>
-            <a:fld id="{143EA16C-059E-48E2-8B33-9913902B6755}" type="slidenum">
+            <a:fld id="{1720C2D7-8FAD-4764-B91A-7315E2BF6B57}" type="slidenum">
               <a:rPr smtClean="0"/>
               <a:pPr/>
               <a:t>‹#›</a:t>
@@ -8197,7 +7776,7 @@
               <a:rPr lang="de-CH" smtClean="0"/>
               <a:t>Slide </a:t>
             </a:r>
-            <a:fld id="{347367A0-4E05-4AED-8819-6EFD7984867A}" type="slidenum">
+            <a:fld id="{5A103A73-3207-45CC-90F7-F98DD19CB8BC}" type="slidenum">
               <a:rPr smtClean="0"/>
               <a:pPr/>
               <a:t>‹#›</a:t>
@@ -8588,24 +8167,12 @@
               <a:t>Functional Design Patterns for OO </a:t>
             </a:r>
             <a:r>
-              <a:rPr lang="en-GB" dirty="0" err="1" smtClean="0"/>
-              <a:t>Practicioners</a:t>
+              <a:rPr lang="en-GB" dirty="0" smtClean="0"/>
+              <a:t>Practitioners</a:t>
             </a:r>
             <a:endParaRPr lang="en-GB" dirty="0"/>
           </a:p>
         </p:txBody>
-      </p:sp>
-      <p:sp>
-        <p:nvSpPr>
-          <p:cNvPr id="5" name="Picture Placeholder 4"/>
-          <p:cNvSpPr>
-            <a:spLocks noGrp="1"/>
-          </p:cNvSpPr>
-          <p:nvPr>
-            <p:ph type="pic" sz="quarter" idx="13"/>
-          </p:nvPr>
-        </p:nvSpPr>
-        <p:spPr/>
       </p:sp>
       <p:sp>
         <p:nvSpPr>
@@ -8672,7 +8239,7 @@
               <a:rPr lang="de-CH" smtClean="0"/>
               <a:t>Slide </a:t>
             </a:r>
-            <a:fld id="{C0D91BE5-71F6-4024-BF8B-3BF8299DE3B3}" type="slidenum">
+            <a:fld id="{0CE5A4CF-19CC-4172-B514-ED6C51E26584}" type="slidenum">
               <a:rPr lang="de-CH" smtClean="0"/>
               <a:t>1</a:t>
             </a:fld>
@@ -8684,6 +8251,29 @@
           </a:p>
         </p:txBody>
       </p:sp>
+      <p:pic>
+        <p:nvPicPr>
+          <p:cNvPr id="7" name="Picture 15" descr="http://upload.wikimedia.org/wikipedia/en/1/14/SpiralStairs,ArielRiosBldg.jpg"/>
+          <p:cNvPicPr>
+            <a:picLocks noGrp="1" noChangeAspect="1" noChangeArrowheads="1"/>
+          </p:cNvPicPr>
+          <p:nvPr>
+            <p:ph type="pic" sz="quarter" idx="13"/>
+          </p:nvPr>
+        </p:nvPicPr>
+        <p:blipFill rotWithShape="1">
+          <a:blip r:embed="rId3" cstate="print">
+            <a:extLst>
+              <a:ext uri="{28A0092B-C50C-407E-A947-70E740481C1C}">
+                <a14:useLocalDpi xmlns:a14="http://schemas.microsoft.com/office/drawing/2010/main" val="0"/>
+              </a:ext>
+            </a:extLst>
+          </a:blip>
+          <a:srcRect t="24842" b="24842"/>
+          <a:stretch/>
+        </p:blipFill>
+        <p:spPr/>
+      </p:pic>
     </p:spTree>
     <p:extLst>
       <p:ext uri="{BB962C8B-B14F-4D97-AF65-F5344CB8AC3E}">
@@ -8828,7 +8418,7 @@
               <a:rPr lang="de-CH" smtClean="0"/>
               <a:t>Slide </a:t>
             </a:r>
-            <a:fld id="{EA16C1A2-81DC-44E9-9EB7-195F266EA551}" type="slidenum">
+            <a:fld id="{BBC5C93D-8D01-411E-85BD-0ACA2F7E463D}" type="slidenum">
               <a:rPr lang="de-CH" smtClean="0"/>
               <a:t>10</a:t>
             </a:fld>
@@ -9467,7 +9057,7 @@
               <a:rPr lang="de-CH" smtClean="0"/>
               <a:t>Slide </a:t>
             </a:r>
-            <a:fld id="{C9A050F2-1FD8-4479-B1B1-371732CEE2BB}" type="slidenum">
+            <a:fld id="{8D541617-ED34-4EC1-B2D1-90CE4139E100}" type="slidenum">
               <a:rPr lang="de-CH" smtClean="0"/>
               <a:t>11</a:t>
             </a:fld>
@@ -9701,7 +9291,7 @@
               <a:rPr lang="de-CH" smtClean="0"/>
               <a:t>Slide </a:t>
             </a:r>
-            <a:fld id="{05BDE2ED-250A-4211-830A-0E527824D6E1}" type="slidenum">
+            <a:fld id="{311DA70B-6F5F-4B4E-B085-A57DE9E84793}" type="slidenum">
               <a:rPr lang="de-CH" smtClean="0"/>
               <a:t>12</a:t>
             </a:fld>
@@ -9916,7 +9506,7 @@
               <a:rPr lang="de-CH" smtClean="0"/>
               <a:t>Slide </a:t>
             </a:r>
-            <a:fld id="{D015E497-13D5-46E8-8BB3-822BD096B0A8}" type="slidenum">
+            <a:fld id="{6F76259B-9576-4ED8-837B-DE8DF9662A4A}" type="slidenum">
               <a:rPr lang="de-CH" smtClean="0"/>
               <a:t>13</a:t>
             </a:fld>
@@ -10177,7 +9767,7 @@
               <a:rPr lang="de-CH" smtClean="0"/>
               <a:t>Slide </a:t>
             </a:r>
-            <a:fld id="{9F648D0E-DFE9-4A17-977A-6AB6D3B96CE0}" type="slidenum">
+            <a:fld id="{8963D039-D6DC-4563-AB61-FFEE8C97616D}" type="slidenum">
               <a:rPr lang="de-CH" smtClean="0"/>
               <a:t>14</a:t>
             </a:fld>
@@ -10527,7 +10117,7 @@
               <a:rPr lang="de-CH" smtClean="0"/>
               <a:t>Slide </a:t>
             </a:r>
-            <a:fld id="{667557DB-B73F-4D3D-B378-56412C284EFB}" type="slidenum">
+            <a:fld id="{6DEBC8C2-77EA-432F-B57A-3EFD23489444}" type="slidenum">
               <a:rPr lang="de-CH" smtClean="0"/>
               <a:t>15</a:t>
             </a:fld>
@@ -10731,7 +10321,7 @@
               <a:rPr lang="de-CH" smtClean="0"/>
               <a:t>Slide </a:t>
             </a:r>
-            <a:fld id="{9D56E2F9-8FF2-4411-B777-E68F50301D48}" type="slidenum">
+            <a:fld id="{C497E27C-69E9-4E31-8958-BC2B5D28B5EE}" type="slidenum">
               <a:rPr lang="de-CH" smtClean="0"/>
               <a:t>16</a:t>
             </a:fld>
@@ -11137,7 +10727,7 @@
               <a:rPr lang="de-CH" smtClean="0"/>
               <a:t>Slide </a:t>
             </a:r>
-            <a:fld id="{91D1F67B-5603-4228-B763-42515028C7A1}" type="slidenum">
+            <a:fld id="{D0205D53-84C8-4E3D-9C89-A7982EF6EFE7}" type="slidenum">
               <a:rPr lang="de-CH" smtClean="0"/>
               <a:t>17</a:t>
             </a:fld>
@@ -13071,7 +12661,7 @@
               <a:rPr lang="de-CH" smtClean="0"/>
               <a:t>Slide </a:t>
             </a:r>
-            <a:fld id="{3EA92558-C07E-4EBA-9CB3-091BD14F14FF}" type="slidenum">
+            <a:fld id="{7A9FD644-06C4-496E-97C1-082A311F2861}" type="slidenum">
               <a:rPr lang="de-CH" smtClean="0"/>
               <a:t>18</a:t>
             </a:fld>
@@ -14777,7 +14367,7 @@
               <a:rPr lang="de-CH" smtClean="0"/>
               <a:t>Slide </a:t>
             </a:r>
-            <a:fld id="{5E2B1DCE-5075-4039-BF94-779155EA1757}" type="slidenum">
+            <a:fld id="{8A4FB7E7-7465-4D76-BA6B-37E147F5031C}" type="slidenum">
               <a:rPr lang="de-CH" smtClean="0"/>
               <a:t>19</a:t>
             </a:fld>
@@ -15176,7 +14766,7 @@
               <a:rPr lang="de-CH" smtClean="0"/>
               <a:t>Slide </a:t>
             </a:r>
-            <a:fld id="{8B991AF1-2215-4953-A59F-426618F65CD6}" type="slidenum">
+            <a:fld id="{E681FEB5-6593-4C61-8096-79D0E222CCAC}" type="slidenum">
               <a:rPr lang="de-CH" smtClean="0"/>
               <a:t>2</a:t>
             </a:fld>
@@ -17196,7 +16786,7 @@
               <a:rPr lang="de-CH" smtClean="0"/>
               <a:t>Slide </a:t>
             </a:r>
-            <a:fld id="{640CF677-696E-40C9-817B-8E21AB5CAE04}" type="slidenum">
+            <a:fld id="{0F55931F-1C6B-4D12-9E48-83A33C234C79}" type="slidenum">
               <a:rPr lang="de-CH" smtClean="0"/>
               <a:t>20</a:t>
             </a:fld>
@@ -18022,7 +17612,7 @@
               <a:rPr lang="de-CH" smtClean="0"/>
               <a:t>Slide </a:t>
             </a:r>
-            <a:fld id="{42BA5F72-15DD-4847-9285-E24C2E95980F}" type="slidenum">
+            <a:fld id="{5EF50095-CCE9-4339-BF42-FBE7F84614D5}" type="slidenum">
               <a:rPr lang="de-CH" smtClean="0"/>
               <a:t>21</a:t>
             </a:fld>
@@ -18435,7 +18025,7 @@
               <a:rPr lang="de-CH" smtClean="0"/>
               <a:t>Slide </a:t>
             </a:r>
-            <a:fld id="{4093EC64-6984-42BF-9624-99B51C7DB0A8}" type="slidenum">
+            <a:fld id="{000EEECE-C2D6-4EF5-89E3-79FCF2CFBE20}" type="slidenum">
               <a:rPr lang="de-CH" smtClean="0"/>
               <a:t>22</a:t>
             </a:fld>
@@ -19995,7 +19585,7 @@
               <a:rPr lang="de-CH" smtClean="0"/>
               <a:t>Slide </a:t>
             </a:r>
-            <a:fld id="{4BB0FDB4-6130-45E8-AC55-E9A7B5468848}" type="slidenum">
+            <a:fld id="{4FE21380-CFD8-4EA7-A1CF-B2DE3D8EE177}" type="slidenum">
               <a:rPr lang="de-CH" smtClean="0"/>
               <a:t>23</a:t>
             </a:fld>
@@ -20589,7 +20179,7 @@
               <a:rPr lang="de-CH" smtClean="0"/>
               <a:t>Slide </a:t>
             </a:r>
-            <a:fld id="{5B6B9F81-7C89-4C89-BF22-B3F47D99E157}" type="slidenum">
+            <a:fld id="{5D8382FC-79A4-4AB2-A435-E5A541C7D4E8}" type="slidenum">
               <a:rPr lang="de-CH" smtClean="0"/>
               <a:t>24</a:t>
             </a:fld>
@@ -21659,7 +21249,7 @@
               <a:rPr lang="de-CH" smtClean="0"/>
               <a:t>Slide </a:t>
             </a:r>
-            <a:fld id="{A82FF70A-B849-499D-90AF-B1722D301B4A}" type="slidenum">
+            <a:fld id="{359EAF0B-C7AA-4FF8-A635-165A6E486001}" type="slidenum">
               <a:rPr lang="de-CH" smtClean="0"/>
               <a:t>25</a:t>
             </a:fld>
@@ -23495,7 +23085,7 @@
               <a:rPr lang="de-CH" smtClean="0"/>
               <a:t>Slide </a:t>
             </a:r>
-            <a:fld id="{91FBA15C-D714-4185-BB93-69F424381ABF}" type="slidenum">
+            <a:fld id="{E9F6CB13-7250-4A60-B0C1-E844E7DB64C7}" type="slidenum">
               <a:rPr lang="de-CH" smtClean="0"/>
               <a:t>26</a:t>
             </a:fld>
@@ -23991,7 +23581,7 @@
               <a:rPr lang="de-CH" smtClean="0"/>
               <a:t>Slide </a:t>
             </a:r>
-            <a:fld id="{8E560011-70EC-4C5C-8004-DD913C56FEE8}" type="slidenum">
+            <a:fld id="{3C37182D-EBE2-4051-84F1-457E36E112B8}" type="slidenum">
               <a:rPr lang="de-CH" smtClean="0"/>
               <a:t>27</a:t>
             </a:fld>
@@ -25563,7 +25153,7 @@
               <a:rPr lang="de-CH" smtClean="0"/>
               <a:t>Slide </a:t>
             </a:r>
-            <a:fld id="{5F495CA5-575E-4B72-AC84-7916ECDE657F}" type="slidenum">
+            <a:fld id="{927CD952-C16F-4507-A80E-D8AC5D8F2136}" type="slidenum">
               <a:rPr lang="de-CH" smtClean="0"/>
               <a:t>28</a:t>
             </a:fld>
@@ -27119,7 +26709,7 @@
               <a:rPr lang="de-CH" smtClean="0"/>
               <a:t>Slide </a:t>
             </a:r>
-            <a:fld id="{64DE4727-FDE6-447D-A082-DC48AE257680}" type="slidenum">
+            <a:fld id="{BD36AE2D-1268-4ED0-B54B-6E663180FCB7}" type="slidenum">
               <a:rPr lang="de-CH" smtClean="0"/>
               <a:t>29</a:t>
             </a:fld>
@@ -27371,7 +26961,7 @@
               <a:rPr lang="de-CH" smtClean="0"/>
               <a:t>Slide </a:t>
             </a:r>
-            <a:fld id="{3547ED0C-C57C-49AB-89F6-426B76214858}" type="slidenum">
+            <a:fld id="{E0F36412-6BDB-4C7B-9129-B22E5274EECD}" type="slidenum">
               <a:rPr lang="de-CH" smtClean="0"/>
               <a:t>3</a:t>
             </a:fld>
@@ -28332,7 +27922,7 @@
               <a:rPr lang="de-CH" smtClean="0"/>
               <a:t>Slide </a:t>
             </a:r>
-            <a:fld id="{CE1BA00F-6C13-4677-ACD8-1F2ED07E0A87}" type="slidenum">
+            <a:fld id="{0E0C366E-0974-4CA1-BC7B-F3C3FE8E5D12}" type="slidenum">
               <a:rPr lang="de-CH" smtClean="0"/>
               <a:t>30</a:t>
             </a:fld>
@@ -28764,7 +28354,7 @@
               <a:rPr lang="de-CH" smtClean="0"/>
               <a:t>Slide </a:t>
             </a:r>
-            <a:fld id="{47D84A14-52D1-47E4-B74B-5F2F92F48F5F}" type="slidenum">
+            <a:fld id="{9D989418-EB43-49BF-B744-71EAB6E41057}" type="slidenum">
               <a:rPr lang="de-CH" smtClean="0"/>
               <a:t>31</a:t>
             </a:fld>
@@ -29088,7 +28678,7 @@
               <a:rPr lang="de-CH" smtClean="0"/>
               <a:t>Slide </a:t>
             </a:r>
-            <a:fld id="{64B248A4-56D3-439E-A840-8DE728065B8D}" type="slidenum">
+            <a:fld id="{431D476B-AB37-4193-9631-33A0E96164B1}" type="slidenum">
               <a:rPr lang="de-CH" smtClean="0"/>
               <a:t>32</a:t>
             </a:fld>
@@ -29280,7 +28870,7 @@
               <a:rPr lang="de-CH" smtClean="0"/>
               <a:t>Slide </a:t>
             </a:r>
-            <a:fld id="{406AB17F-EBB4-4798-9D6D-B27CAF8078E5}" type="slidenum">
+            <a:fld id="{3E32FD09-498E-448D-A1D6-93C5E699FE22}" type="slidenum">
               <a:rPr lang="de-CH" smtClean="0"/>
               <a:t>33</a:t>
             </a:fld>
@@ -29555,7 +29145,7 @@
               <a:rPr lang="de-CH" smtClean="0"/>
               <a:t>Slide </a:t>
             </a:r>
-            <a:fld id="{A6323A85-2F9A-4FC6-9D8A-3834F67D14DE}" type="slidenum">
+            <a:fld id="{454C6B73-15B0-4828-BEE7-4E6350D32700}" type="slidenum">
               <a:rPr lang="de-CH" smtClean="0"/>
               <a:t>34</a:t>
             </a:fld>
@@ -29711,7 +29301,7 @@
               <a:rPr lang="de-CH" smtClean="0"/>
               <a:t>Slide </a:t>
             </a:r>
-            <a:fld id="{2D078C67-222A-4E45-A716-B530D290A8D3}" type="slidenum">
+            <a:fld id="{0E2004E8-FD55-45C4-8471-50F44DCCCD8E}" type="slidenum">
               <a:rPr lang="de-CH" smtClean="0"/>
               <a:t>35</a:t>
             </a:fld>
@@ -30875,7 +30465,7 @@
               <a:rPr lang="de-CH" smtClean="0"/>
               <a:t>Slide </a:t>
             </a:r>
-            <a:fld id="{702CBB4A-A9F8-4258-A5E4-42533BF0EA83}" type="slidenum">
+            <a:fld id="{11737FF3-A486-4517-A654-76BE4A99DEC0}" type="slidenum">
               <a:rPr lang="de-CH" smtClean="0"/>
               <a:t>36</a:t>
             </a:fld>
@@ -31554,7 +31144,7 @@
               <a:rPr lang="de-CH" smtClean="0"/>
               <a:t>Slide </a:t>
             </a:r>
-            <a:fld id="{1A0C4802-F2FB-4054-BC35-2C21B2FAF831}" type="slidenum">
+            <a:fld id="{CC46D4F8-B75A-4B47-943A-D5AA1CDFA8CB}" type="slidenum">
               <a:rPr lang="de-CH" smtClean="0"/>
               <a:t>37</a:t>
             </a:fld>
@@ -32635,7 +32225,7 @@
               <a:rPr lang="de-CH" smtClean="0"/>
               <a:t>Slide </a:t>
             </a:r>
-            <a:fld id="{61616E89-24FF-427F-AA3E-893155C0FFD8}" type="slidenum">
+            <a:fld id="{301E0F43-03DD-4192-840A-A4D96FA2CC3E}" type="slidenum">
               <a:rPr lang="de-CH" smtClean="0"/>
               <a:t>38</a:t>
             </a:fld>
@@ -33451,7 +33041,7 @@
               <a:rPr lang="de-CH" smtClean="0"/>
               <a:t>Slide </a:t>
             </a:r>
-            <a:fld id="{5ED7101B-67FB-4263-858F-7AEAD0922BBC}" type="slidenum">
+            <a:fld id="{832A7486-A5C1-4041-BE31-0446A618AF32}" type="slidenum">
               <a:rPr lang="de-CH" smtClean="0"/>
               <a:t>39</a:t>
             </a:fld>
@@ -35067,7 +34657,7 @@
               <a:rPr lang="de-CH" smtClean="0"/>
               <a:t>Slide </a:t>
             </a:r>
-            <a:fld id="{BDA54399-573C-4AF9-831F-F7DD476E9E76}" type="slidenum">
+            <a:fld id="{53975AF2-BA2B-4DB9-A4AC-332FED5716C5}" type="slidenum">
               <a:rPr lang="de-CH" smtClean="0"/>
               <a:t>4</a:t>
             </a:fld>
@@ -36010,7 +35600,7 @@
               <a:rPr lang="de-CH" smtClean="0"/>
               <a:t>Slide </a:t>
             </a:r>
-            <a:fld id="{BCBDAC83-E626-4410-B10D-D5C0CE034A25}" type="slidenum">
+            <a:fld id="{1FB03E91-27FA-48FD-9701-876C9E124AD1}" type="slidenum">
               <a:rPr lang="de-CH" smtClean="0"/>
               <a:t>40</a:t>
             </a:fld>
@@ -36537,7 +36127,7 @@
               <a:rPr lang="de-CH" smtClean="0"/>
               <a:t>Slide </a:t>
             </a:r>
-            <a:fld id="{38040F36-D180-400C-B4F8-D07F1061B495}" type="slidenum">
+            <a:fld id="{07620159-B57D-4AB8-AEE3-9EB06F7FE652}" type="slidenum">
               <a:rPr lang="de-CH" smtClean="0"/>
               <a:t>41</a:t>
             </a:fld>
@@ -36753,7 +36343,7 @@
               <a:rPr lang="de-CH" smtClean="0"/>
               <a:t>Slide </a:t>
             </a:r>
-            <a:fld id="{59C2FE63-81CE-4202-9035-CEA7FF54B2B0}" type="slidenum">
+            <a:fld id="{B5B792EE-1B6F-41AA-88BB-3FA36C090826}" type="slidenum">
               <a:rPr lang="de-CH" smtClean="0"/>
               <a:t>42</a:t>
             </a:fld>
@@ -36902,7 +36492,7 @@
               <a:rPr lang="de-CH" smtClean="0"/>
               <a:t>Slide </a:t>
             </a:r>
-            <a:fld id="{E233D571-45EF-44A5-9D76-668B5042543B}" type="slidenum">
+            <a:fld id="{F1D4FDEA-C0A3-4C60-8C00-6569E5CE2848}" type="slidenum">
               <a:rPr lang="de-CH" smtClean="0"/>
               <a:t>43</a:t>
             </a:fld>
@@ -37426,7 +37016,7 @@
               <a:rPr lang="de-CH" smtClean="0"/>
               <a:t>Slide </a:t>
             </a:r>
-            <a:fld id="{4047F0DB-9E39-4FFA-BAF2-E7296A7FBDC0}" type="slidenum">
+            <a:fld id="{06ED5453-9F74-4C53-BD98-3DA7C6773C3D}" type="slidenum">
               <a:rPr lang="de-CH" smtClean="0"/>
               <a:t>44</a:t>
             </a:fld>
@@ -37665,7 +37255,7 @@
               <a:rPr lang="de-CH" smtClean="0"/>
               <a:t>Slide </a:t>
             </a:r>
-            <a:fld id="{3F923887-5B61-4115-9829-616AFB329DE2}" type="slidenum">
+            <a:fld id="{80365DAD-C174-4348-8E8F-17412DAA8CDD}" type="slidenum">
               <a:rPr lang="de-CH" smtClean="0"/>
               <a:t>45</a:t>
             </a:fld>
@@ -37899,7 +37489,7 @@
               <a:rPr lang="de-CH" smtClean="0"/>
               <a:t>Slide </a:t>
             </a:r>
-            <a:fld id="{42115482-F811-4BC0-8E24-339377E2A1BF}" type="slidenum">
+            <a:fld id="{41599FA1-5DB9-4C2D-8699-1F406D4626FE}" type="slidenum">
               <a:rPr lang="de-CH" smtClean="0"/>
               <a:t>5</a:t>
             </a:fld>
@@ -38179,7 +37769,7 @@
               <a:rPr lang="de-CH" smtClean="0"/>
               <a:t>Slide </a:t>
             </a:r>
-            <a:fld id="{FBC9E239-F25C-4297-85FC-D6778F503A2E}" type="slidenum">
+            <a:fld id="{C539BE46-CAC2-4CE0-9BDD-0C3821797F39}" type="slidenum">
               <a:rPr lang="de-CH" smtClean="0"/>
               <a:t>6</a:t>
             </a:fld>
@@ -38371,7 +37961,7 @@
               <a:rPr lang="de-CH" smtClean="0"/>
               <a:t>Slide </a:t>
             </a:r>
-            <a:fld id="{D4745933-C77E-40D8-80C0-264430929946}" type="slidenum">
+            <a:fld id="{7178ABD1-E99D-467B-81F1-7F47389876DC}" type="slidenum">
               <a:rPr lang="de-CH" smtClean="0"/>
               <a:t>7</a:t>
             </a:fld>
@@ -38500,7 +38090,6 @@
               <a:rPr lang="en-GB" dirty="0" smtClean="0"/>
               <a:t>Definition: Pure Functions</a:t>
             </a:r>
-            <a:endParaRPr lang="en-GB" dirty="0" smtClean="0"/>
           </a:p>
           <a:p>
             <a:pPr marL="342900" indent="-342900">
@@ -38624,7 +38213,7 @@
               <a:rPr lang="de-CH" smtClean="0"/>
               <a:t>Slide </a:t>
             </a:r>
-            <a:fld id="{7EFF3FA4-C2E0-4C88-81C3-444C62F510B6}" type="slidenum">
+            <a:fld id="{2E9D5C75-AC18-4C72-AC16-2FFB5A108AEE}" type="slidenum">
               <a:rPr lang="de-CH" smtClean="0"/>
               <a:t>8</a:t>
             </a:fld>
@@ -38803,7 +38392,7 @@
               <a:rPr lang="de-CH" smtClean="0"/>
               <a:t>Slide </a:t>
             </a:r>
-            <a:fld id="{E3F81DC9-F3B4-4958-90D0-F8852A204782}" type="slidenum">
+            <a:fld id="{41EFEE45-9D56-4C4C-801F-8B19325791D1}" type="slidenum">
               <a:rPr lang="de-CH" smtClean="0"/>
               <a:t>9</a:t>
             </a:fld>

</xml_diff>